<commit_message>
-Filled out most of the slides -Put at least place holders into outline -Found hilarious robot pictures <3
P@

Signed-off-by: P@ <patmaynard452@gmail.com>
</commit_message>
<xml_diff>
--- a/Presentation/Presentation_1.pptx
+++ b/Presentation/Presentation_1.pptx
@@ -9,6 +9,12 @@
     <p:sldId id="257" r:id="rId3"/>
     <p:sldId id="258" r:id="rId4"/>
     <p:sldId id="259" r:id="rId5"/>
+    <p:sldId id="260" r:id="rId6"/>
+    <p:sldId id="261" r:id="rId7"/>
+    <p:sldId id="262" r:id="rId8"/>
+    <p:sldId id="263" r:id="rId9"/>
+    <p:sldId id="264" r:id="rId10"/>
+    <p:sldId id="265" r:id="rId11"/>
   </p:sldIdLst>
   <p:sldSz cx="12192000" cy="6858000"/>
   <p:notesSz cx="6858000" cy="9144000"/>
@@ -3372,10 +3378,10 @@
           <a:lstStyle/>
           <a:p>
             <a:r>
-              <a:rPr lang="en-US" dirty="0"/>
-              <a:t>Predicting House Cost in Canada</a:t>
-            </a:r>
-            <a:endParaRPr lang="en-CA" dirty="0"/>
+              <a:rPr lang="en-US" b="1" dirty="0"/>
+              <a:t>Predicting House Costs in Canada</a:t>
+            </a:r>
+            <a:endParaRPr lang="en-CA" b="1" dirty="0"/>
           </a:p>
         </p:txBody>
       </p:sp>
@@ -3397,8 +3403,8 @@
         </p:nvSpPr>
         <p:spPr>
           <a:xfrm>
-            <a:off x="7810856" y="5315483"/>
-            <a:ext cx="4215925" cy="1395101"/>
+            <a:off x="9981488" y="5819686"/>
+            <a:ext cx="2045293" cy="890898"/>
           </a:xfrm>
         </p:spPr>
         <p:txBody>
@@ -3407,13 +3413,7 @@
           <a:p>
             <a:r>
               <a:rPr lang="en-US" dirty="0"/>
-              <a:t>By:</a:t>
-            </a:r>
-          </a:p>
-          <a:p>
-            <a:r>
-              <a:rPr lang="en-US" dirty="0"/>
-              <a:t> Pat Maynard</a:t>
+              <a:t>Pat Maynard</a:t>
             </a:r>
           </a:p>
           <a:p>
@@ -3425,10 +3425,235 @@
           </a:p>
         </p:txBody>
       </p:sp>
+      <p:pic>
+        <p:nvPicPr>
+          <p:cNvPr id="5" name="Picture 4" descr="Canadian Home">
+            <a:extLst>
+              <a:ext uri="{FF2B5EF4-FFF2-40B4-BE49-F238E27FC236}">
+                <a16:creationId xmlns:a16="http://schemas.microsoft.com/office/drawing/2014/main" id="{3AF0B4E7-9E64-1A73-C333-4F2960F620B3}"/>
+              </a:ext>
+            </a:extLst>
+          </p:cNvPr>
+          <p:cNvPicPr>
+            <a:picLocks noChangeAspect="1"/>
+          </p:cNvPicPr>
+          <p:nvPr/>
+        </p:nvPicPr>
+        <p:blipFill>
+          <a:blip r:embed="rId2">
+            <a:extLst>
+              <a:ext uri="{28A0092B-C50C-407E-A947-70E740481C1C}">
+                <a14:useLocalDpi xmlns:a14="http://schemas.microsoft.com/office/drawing/2010/main" val="0"/>
+              </a:ext>
+            </a:extLst>
+          </a:blip>
+          <a:stretch>
+            <a:fillRect/>
+          </a:stretch>
+        </p:blipFill>
+        <p:spPr>
+          <a:xfrm>
+            <a:off x="812206" y="2535016"/>
+            <a:ext cx="5283794" cy="3522041"/>
+          </a:xfrm>
+          <a:prstGeom prst="ellipse">
+            <a:avLst/>
+          </a:prstGeom>
+          <a:ln w="190500" cap="rnd">
+            <a:solidFill>
+              <a:srgbClr val="C8C6BD"/>
+            </a:solidFill>
+            <a:prstDash val="solid"/>
+          </a:ln>
+          <a:effectLst>
+            <a:outerShdw blurRad="127000" algn="bl" rotWithShape="0">
+              <a:srgbClr val="000000"/>
+            </a:outerShdw>
+          </a:effectLst>
+          <a:scene3d>
+            <a:camera prst="perspectiveFront" fov="5400000"/>
+            <a:lightRig rig="threePt" dir="t">
+              <a:rot lat="0" lon="0" rev="19200000"/>
+            </a:lightRig>
+          </a:scene3d>
+          <a:sp3d extrusionH="25400">
+            <a:bevelT w="304800" h="152400" prst="hardEdge"/>
+            <a:extrusionClr>
+              <a:srgbClr val="000000"/>
+            </a:extrusionClr>
+          </a:sp3d>
+        </p:spPr>
+      </p:pic>
     </p:spTree>
     <p:extLst>
       <p:ext uri="{BB962C8B-B14F-4D97-AF65-F5344CB8AC3E}">
         <p14:creationId xmlns:p14="http://schemas.microsoft.com/office/powerpoint/2010/main" val="1304497034"/>
+      </p:ext>
+    </p:extLst>
+  </p:cSld>
+  <p:clrMapOvr>
+    <a:masterClrMapping/>
+  </p:clrMapOvr>
+</p:sld>
+</file>
+
+<file path=ppt/slides/slide10.xml><?xml version="1.0" encoding="utf-8"?>
+<p:sld xmlns:a="http://schemas.openxmlformats.org/drawingml/2006/main" xmlns:r="http://schemas.openxmlformats.org/officeDocument/2006/relationships" xmlns:p="http://schemas.openxmlformats.org/presentationml/2006/main">
+  <p:cSld>
+    <p:spTree>
+      <p:nvGrpSpPr>
+        <p:cNvPr id="1" name=""/>
+        <p:cNvGrpSpPr/>
+        <p:nvPr/>
+      </p:nvGrpSpPr>
+      <p:grpSpPr>
+        <a:xfrm>
+          <a:off x="0" y="0"/>
+          <a:ext cx="0" cy="0"/>
+          <a:chOff x="0" y="0"/>
+          <a:chExt cx="0" cy="0"/>
+        </a:xfrm>
+      </p:grpSpPr>
+      <p:sp>
+        <p:nvSpPr>
+          <p:cNvPr id="2" name="Title 1">
+            <a:extLst>
+              <a:ext uri="{FF2B5EF4-FFF2-40B4-BE49-F238E27FC236}">
+                <a16:creationId xmlns:a16="http://schemas.microsoft.com/office/drawing/2014/main" id="{4B2B725A-33EB-91CB-5B64-50C7C3A6B768}"/>
+              </a:ext>
+            </a:extLst>
+          </p:cNvPr>
+          <p:cNvSpPr>
+            <a:spLocks noGrp="1"/>
+          </p:cNvSpPr>
+          <p:nvPr>
+            <p:ph type="title"/>
+          </p:nvPr>
+        </p:nvSpPr>
+        <p:spPr/>
+        <p:txBody>
+          <a:bodyPr/>
+          <a:lstStyle/>
+          <a:p>
+            <a:pPr algn="ctr"/>
+            <a:r>
+              <a:rPr lang="en-US" b="1" dirty="0"/>
+              <a:t>Prediction</a:t>
+            </a:r>
+            <a:endParaRPr lang="en-CA" b="1" dirty="0"/>
+          </a:p>
+        </p:txBody>
+      </p:sp>
+      <p:sp>
+        <p:nvSpPr>
+          <p:cNvPr id="3" name="Content Placeholder 2">
+            <a:extLst>
+              <a:ext uri="{FF2B5EF4-FFF2-40B4-BE49-F238E27FC236}">
+                <a16:creationId xmlns:a16="http://schemas.microsoft.com/office/drawing/2014/main" id="{FFADFE04-371F-D6C1-42F3-0BA0ADB73606}"/>
+              </a:ext>
+            </a:extLst>
+          </p:cNvPr>
+          <p:cNvSpPr>
+            <a:spLocks noGrp="1"/>
+          </p:cNvSpPr>
+          <p:nvPr>
+            <p:ph idx="1"/>
+          </p:nvPr>
+        </p:nvSpPr>
+        <p:spPr>
+          <a:xfrm>
+            <a:off x="6854440" y="2262981"/>
+            <a:ext cx="4913120" cy="3163323"/>
+          </a:xfrm>
+        </p:spPr>
+        <p:txBody>
+          <a:bodyPr/>
+          <a:lstStyle/>
+          <a:p>
+            <a:pPr marL="0" indent="0" algn="ctr">
+              <a:buNone/>
+            </a:pPr>
+            <a:r>
+              <a:rPr lang="en-US" dirty="0"/>
+              <a:t>Without even looking too far into the data we assume that the prices are going to continue to climb. </a:t>
+            </a:r>
+          </a:p>
+          <a:p>
+            <a:pPr marL="0" indent="0" algn="ctr">
+              <a:buNone/>
+            </a:pPr>
+            <a:r>
+              <a:rPr lang="en-US" dirty="0"/>
+              <a:t>These prices are linked to larger-scale events such as economic events. </a:t>
+            </a:r>
+            <a:endParaRPr lang="en-CA" dirty="0"/>
+          </a:p>
+        </p:txBody>
+      </p:sp>
+      <p:pic>
+        <p:nvPicPr>
+          <p:cNvPr id="5" name="Picture 4" descr="A Crystal Ball">
+            <a:extLst>
+              <a:ext uri="{FF2B5EF4-FFF2-40B4-BE49-F238E27FC236}">
+                <a16:creationId xmlns:a16="http://schemas.microsoft.com/office/drawing/2014/main" id="{7C287FC7-EDE2-6968-6199-25798197E2C8}"/>
+              </a:ext>
+            </a:extLst>
+          </p:cNvPr>
+          <p:cNvPicPr>
+            <a:picLocks noChangeAspect="1"/>
+          </p:cNvPicPr>
+          <p:nvPr/>
+        </p:nvPicPr>
+        <p:blipFill>
+          <a:blip r:embed="rId2">
+            <a:extLst>
+              <a:ext uri="{28A0092B-C50C-407E-A947-70E740481C1C}">
+                <a14:useLocalDpi xmlns:a14="http://schemas.microsoft.com/office/drawing/2010/main" val="0"/>
+              </a:ext>
+            </a:extLst>
+          </a:blip>
+          <a:stretch>
+            <a:fillRect/>
+          </a:stretch>
+        </p:blipFill>
+        <p:spPr>
+          <a:xfrm>
+            <a:off x="1700806" y="1884159"/>
+            <a:ext cx="3542145" cy="3542145"/>
+          </a:xfrm>
+          <a:prstGeom prst="ellipse">
+            <a:avLst/>
+          </a:prstGeom>
+          <a:ln w="63500" cap="rnd">
+            <a:solidFill>
+              <a:srgbClr val="333333"/>
+            </a:solidFill>
+          </a:ln>
+          <a:effectLst>
+            <a:outerShdw blurRad="381000" dist="292100" dir="5400000" sx="-80000" sy="-18000" rotWithShape="0">
+              <a:srgbClr val="000000">
+                <a:alpha val="22000"/>
+              </a:srgbClr>
+            </a:outerShdw>
+          </a:effectLst>
+          <a:scene3d>
+            <a:camera prst="orthographicFront"/>
+            <a:lightRig rig="contrasting" dir="t">
+              <a:rot lat="0" lon="0" rev="3000000"/>
+            </a:lightRig>
+          </a:scene3d>
+          <a:sp3d contourW="7620">
+            <a:bevelT w="95250" h="31750"/>
+            <a:contourClr>
+              <a:srgbClr val="333333"/>
+            </a:contourClr>
+          </a:sp3d>
+        </p:spPr>
+      </p:pic>
+    </p:spTree>
+    <p:extLst>
+      <p:ext uri="{BB962C8B-B14F-4D97-AF65-F5344CB8AC3E}">
+        <p14:creationId xmlns:p14="http://schemas.microsoft.com/office/powerpoint/2010/main" val="3958786682"/>
       </p:ext>
     </p:extLst>
   </p:cSld>
@@ -3476,11 +3701,12 @@
           <a:bodyPr/>
           <a:lstStyle/>
           <a:p>
-            <a:r>
-              <a:rPr lang="en-US" dirty="0"/>
+            <a:pPr algn="ctr"/>
+            <a:r>
+              <a:rPr lang="en-US" b="1" dirty="0"/>
               <a:t>Introduction – About Us!</a:t>
             </a:r>
-            <a:endParaRPr lang="en-CA" dirty="0"/>
+            <a:endParaRPr lang="en-CA" b="1" dirty="0"/>
           </a:p>
         </p:txBody>
       </p:sp>
@@ -3514,7 +3740,7 @@
               <a:buNone/>
             </a:pPr>
             <a:r>
-              <a:rPr lang="en-US" dirty="0"/>
+              <a:rPr lang="en-US" b="1" u="sng" dirty="0"/>
               <a:t>Raymond Ali</a:t>
             </a:r>
           </a:p>
@@ -3723,7 +3949,7 @@
               <a:buNone/>
             </a:pPr>
             <a:r>
-              <a:rPr lang="en-US" dirty="0"/>
+              <a:rPr lang="en-US" b="1" u="sng" dirty="0"/>
               <a:t>Pat Maynard</a:t>
             </a:r>
           </a:p>
@@ -3819,11 +4045,12 @@
           <a:bodyPr/>
           <a:lstStyle/>
           <a:p>
-            <a:r>
-              <a:rPr lang="en-US" dirty="0"/>
+            <a:pPr algn="ctr"/>
+            <a:r>
+              <a:rPr lang="en-US" b="1" dirty="0"/>
               <a:t>Introduction – The Problem</a:t>
             </a:r>
-            <a:endParaRPr lang="en-CA" dirty="0"/>
+            <a:endParaRPr lang="en-CA" b="1" dirty="0"/>
           </a:p>
         </p:txBody>
       </p:sp>
@@ -3939,34 +4166,301 @@
           <a:bodyPr/>
           <a:lstStyle/>
           <a:p>
-            <a:r>
-              <a:rPr lang="en-US" dirty="0"/>
+            <a:pPr algn="ctr"/>
+            <a:r>
+              <a:rPr lang="en-US" b="1" dirty="0"/>
               <a:t>Literature Review</a:t>
             </a:r>
+            <a:endParaRPr lang="en-CA" b="1" dirty="0"/>
+          </a:p>
+        </p:txBody>
+      </p:sp>
+      <p:sp>
+        <p:nvSpPr>
+          <p:cNvPr id="3" name="Content Placeholder 2">
+            <a:extLst>
+              <a:ext uri="{FF2B5EF4-FFF2-40B4-BE49-F238E27FC236}">
+                <a16:creationId xmlns:a16="http://schemas.microsoft.com/office/drawing/2014/main" id="{1695D992-9339-1D86-1AAF-082037D79AA8}"/>
+              </a:ext>
+            </a:extLst>
+          </p:cNvPr>
+          <p:cNvSpPr>
+            <a:spLocks noGrp="1"/>
+          </p:cNvSpPr>
+          <p:nvPr>
+            <p:ph idx="1"/>
+          </p:nvPr>
+        </p:nvSpPr>
+        <p:spPr>
+          <a:xfrm>
+            <a:off x="838200" y="1825625"/>
+            <a:ext cx="4622563" cy="4351338"/>
+          </a:xfrm>
+        </p:spPr>
+        <p:txBody>
+          <a:bodyPr/>
+          <a:lstStyle/>
+          <a:p>
+            <a:pPr marL="0" indent="0" algn="ctr">
+              <a:buNone/>
+            </a:pPr>
+            <a:r>
+              <a:rPr lang="en-US" b="1" u="sng" dirty="0"/>
+              <a:t>Previous Approaches</a:t>
+            </a:r>
+          </a:p>
+          <a:p>
+            <a:r>
+              <a:rPr lang="en-CA" dirty="0"/>
+              <a:t>Linear Regression models</a:t>
+            </a:r>
+          </a:p>
+          <a:p>
+            <a:r>
+              <a:rPr lang="en-CA" dirty="0"/>
+              <a:t>One-Hot-Encoder, breaking out different attributes of the property</a:t>
+            </a:r>
+          </a:p>
+          <a:p>
+            <a:r>
+              <a:rPr lang="en-CA" dirty="0"/>
+              <a:t>Random Forest was popular for training data sets</a:t>
+            </a:r>
+          </a:p>
+          <a:p>
+            <a:r>
+              <a:rPr lang="en-CA" dirty="0" err="1"/>
+              <a:t>XGBoost</a:t>
+            </a:r>
+            <a:r>
+              <a:rPr lang="en-CA" dirty="0"/>
+              <a:t> to scale and weigh data</a:t>
+            </a:r>
+          </a:p>
+          <a:p>
             <a:endParaRPr lang="en-CA" dirty="0"/>
           </a:p>
         </p:txBody>
       </p:sp>
       <p:sp>
         <p:nvSpPr>
-          <p:cNvPr id="3" name="Content Placeholder 2">
-            <a:extLst>
-              <a:ext uri="{FF2B5EF4-FFF2-40B4-BE49-F238E27FC236}">
-                <a16:creationId xmlns:a16="http://schemas.microsoft.com/office/drawing/2014/main" id="{1695D992-9339-1D86-1AAF-082037D79AA8}"/>
-              </a:ext>
-            </a:extLst>
-          </p:cNvPr>
-          <p:cNvSpPr>
-            <a:spLocks noGrp="1"/>
-          </p:cNvSpPr>
-          <p:nvPr>
-            <p:ph idx="1"/>
-          </p:nvPr>
-        </p:nvSpPr>
-        <p:spPr/>
-        <p:txBody>
-          <a:bodyPr/>
-          <a:lstStyle/>
+          <p:cNvPr id="4" name="Content Placeholder 2">
+            <a:extLst>
+              <a:ext uri="{FF2B5EF4-FFF2-40B4-BE49-F238E27FC236}">
+                <a16:creationId xmlns:a16="http://schemas.microsoft.com/office/drawing/2014/main" id="{B51398BC-0E18-114B-0A5D-93C06426F967}"/>
+              </a:ext>
+            </a:extLst>
+          </p:cNvPr>
+          <p:cNvSpPr txBox="1">
+            <a:spLocks/>
+          </p:cNvSpPr>
+          <p:nvPr/>
+        </p:nvSpPr>
+        <p:spPr>
+          <a:xfrm>
+            <a:off x="6731237" y="1690688"/>
+            <a:ext cx="4622563" cy="4351338"/>
+          </a:xfrm>
+          <a:prstGeom prst="rect">
+            <a:avLst/>
+          </a:prstGeom>
+        </p:spPr>
+        <p:txBody>
+          <a:bodyPr vert="horz" lIns="91440" tIns="45720" rIns="91440" bIns="45720" rtlCol="0">
+            <a:normAutofit/>
+          </a:bodyPr>
+          <a:lstStyle>
+            <a:lvl1pPr marL="228600" indent="-228600" algn="l" defTabSz="914400" rtl="0" eaLnBrk="1" latinLnBrk="0" hangingPunct="1">
+              <a:lnSpc>
+                <a:spcPct val="90000"/>
+              </a:lnSpc>
+              <a:spcBef>
+                <a:spcPts val="1000"/>
+              </a:spcBef>
+              <a:buFont typeface="Arial" panose="020B0604020202020204" pitchFamily="34" charset="0"/>
+              <a:buChar char="•"/>
+              <a:defRPr sz="2800" kern="1200">
+                <a:solidFill>
+                  <a:schemeClr val="tx1"/>
+                </a:solidFill>
+                <a:latin typeface="+mn-lt"/>
+                <a:ea typeface="+mn-ea"/>
+                <a:cs typeface="+mn-cs"/>
+              </a:defRPr>
+            </a:lvl1pPr>
+            <a:lvl2pPr marL="685800" indent="-228600" algn="l" defTabSz="914400" rtl="0" eaLnBrk="1" latinLnBrk="0" hangingPunct="1">
+              <a:lnSpc>
+                <a:spcPct val="90000"/>
+              </a:lnSpc>
+              <a:spcBef>
+                <a:spcPts val="500"/>
+              </a:spcBef>
+              <a:buFont typeface="Arial" panose="020B0604020202020204" pitchFamily="34" charset="0"/>
+              <a:buChar char="•"/>
+              <a:defRPr sz="2400" kern="1200">
+                <a:solidFill>
+                  <a:schemeClr val="tx1"/>
+                </a:solidFill>
+                <a:latin typeface="+mn-lt"/>
+                <a:ea typeface="+mn-ea"/>
+                <a:cs typeface="+mn-cs"/>
+              </a:defRPr>
+            </a:lvl2pPr>
+            <a:lvl3pPr marL="1143000" indent="-228600" algn="l" defTabSz="914400" rtl="0" eaLnBrk="1" latinLnBrk="0" hangingPunct="1">
+              <a:lnSpc>
+                <a:spcPct val="90000"/>
+              </a:lnSpc>
+              <a:spcBef>
+                <a:spcPts val="500"/>
+              </a:spcBef>
+              <a:buFont typeface="Arial" panose="020B0604020202020204" pitchFamily="34" charset="0"/>
+              <a:buChar char="•"/>
+              <a:defRPr sz="2000" kern="1200">
+                <a:solidFill>
+                  <a:schemeClr val="tx1"/>
+                </a:solidFill>
+                <a:latin typeface="+mn-lt"/>
+                <a:ea typeface="+mn-ea"/>
+                <a:cs typeface="+mn-cs"/>
+              </a:defRPr>
+            </a:lvl3pPr>
+            <a:lvl4pPr marL="1600200" indent="-228600" algn="l" defTabSz="914400" rtl="0" eaLnBrk="1" latinLnBrk="0" hangingPunct="1">
+              <a:lnSpc>
+                <a:spcPct val="90000"/>
+              </a:lnSpc>
+              <a:spcBef>
+                <a:spcPts val="500"/>
+              </a:spcBef>
+              <a:buFont typeface="Arial" panose="020B0604020202020204" pitchFamily="34" charset="0"/>
+              <a:buChar char="•"/>
+              <a:defRPr sz="1800" kern="1200">
+                <a:solidFill>
+                  <a:schemeClr val="tx1"/>
+                </a:solidFill>
+                <a:latin typeface="+mn-lt"/>
+                <a:ea typeface="+mn-ea"/>
+                <a:cs typeface="+mn-cs"/>
+              </a:defRPr>
+            </a:lvl4pPr>
+            <a:lvl5pPr marL="2057400" indent="-228600" algn="l" defTabSz="914400" rtl="0" eaLnBrk="1" latinLnBrk="0" hangingPunct="1">
+              <a:lnSpc>
+                <a:spcPct val="90000"/>
+              </a:lnSpc>
+              <a:spcBef>
+                <a:spcPts val="500"/>
+              </a:spcBef>
+              <a:buFont typeface="Arial" panose="020B0604020202020204" pitchFamily="34" charset="0"/>
+              <a:buChar char="•"/>
+              <a:defRPr sz="1800" kern="1200">
+                <a:solidFill>
+                  <a:schemeClr val="tx1"/>
+                </a:solidFill>
+                <a:latin typeface="+mn-lt"/>
+                <a:ea typeface="+mn-ea"/>
+                <a:cs typeface="+mn-cs"/>
+              </a:defRPr>
+            </a:lvl5pPr>
+            <a:lvl6pPr marL="2514600" indent="-228600" algn="l" defTabSz="914400" rtl="0" eaLnBrk="1" latinLnBrk="0" hangingPunct="1">
+              <a:lnSpc>
+                <a:spcPct val="90000"/>
+              </a:lnSpc>
+              <a:spcBef>
+                <a:spcPts val="500"/>
+              </a:spcBef>
+              <a:buFont typeface="Arial" panose="020B0604020202020204" pitchFamily="34" charset="0"/>
+              <a:buChar char="•"/>
+              <a:defRPr sz="1800" kern="1200">
+                <a:solidFill>
+                  <a:schemeClr val="tx1"/>
+                </a:solidFill>
+                <a:latin typeface="+mn-lt"/>
+                <a:ea typeface="+mn-ea"/>
+                <a:cs typeface="+mn-cs"/>
+              </a:defRPr>
+            </a:lvl6pPr>
+            <a:lvl7pPr marL="2971800" indent="-228600" algn="l" defTabSz="914400" rtl="0" eaLnBrk="1" latinLnBrk="0" hangingPunct="1">
+              <a:lnSpc>
+                <a:spcPct val="90000"/>
+              </a:lnSpc>
+              <a:spcBef>
+                <a:spcPts val="500"/>
+              </a:spcBef>
+              <a:buFont typeface="Arial" panose="020B0604020202020204" pitchFamily="34" charset="0"/>
+              <a:buChar char="•"/>
+              <a:defRPr sz="1800" kern="1200">
+                <a:solidFill>
+                  <a:schemeClr val="tx1"/>
+                </a:solidFill>
+                <a:latin typeface="+mn-lt"/>
+                <a:ea typeface="+mn-ea"/>
+                <a:cs typeface="+mn-cs"/>
+              </a:defRPr>
+            </a:lvl7pPr>
+            <a:lvl8pPr marL="3429000" indent="-228600" algn="l" defTabSz="914400" rtl="0" eaLnBrk="1" latinLnBrk="0" hangingPunct="1">
+              <a:lnSpc>
+                <a:spcPct val="90000"/>
+              </a:lnSpc>
+              <a:spcBef>
+                <a:spcPts val="500"/>
+              </a:spcBef>
+              <a:buFont typeface="Arial" panose="020B0604020202020204" pitchFamily="34" charset="0"/>
+              <a:buChar char="•"/>
+              <a:defRPr sz="1800" kern="1200">
+                <a:solidFill>
+                  <a:schemeClr val="tx1"/>
+                </a:solidFill>
+                <a:latin typeface="+mn-lt"/>
+                <a:ea typeface="+mn-ea"/>
+                <a:cs typeface="+mn-cs"/>
+              </a:defRPr>
+            </a:lvl8pPr>
+            <a:lvl9pPr marL="3886200" indent="-228600" algn="l" defTabSz="914400" rtl="0" eaLnBrk="1" latinLnBrk="0" hangingPunct="1">
+              <a:lnSpc>
+                <a:spcPct val="90000"/>
+              </a:lnSpc>
+              <a:spcBef>
+                <a:spcPts val="500"/>
+              </a:spcBef>
+              <a:buFont typeface="Arial" panose="020B0604020202020204" pitchFamily="34" charset="0"/>
+              <a:buChar char="•"/>
+              <a:defRPr sz="1800" kern="1200">
+                <a:solidFill>
+                  <a:schemeClr val="tx1"/>
+                </a:solidFill>
+                <a:latin typeface="+mn-lt"/>
+                <a:ea typeface="+mn-ea"/>
+                <a:cs typeface="+mn-cs"/>
+              </a:defRPr>
+            </a:lvl9pPr>
+          </a:lstStyle>
+          <a:p>
+            <a:pPr marL="0" indent="0" algn="ctr">
+              <a:buFont typeface="Arial" panose="020B0604020202020204" pitchFamily="34" charset="0"/>
+              <a:buNone/>
+            </a:pPr>
+            <a:r>
+              <a:rPr lang="en-US" b="1" u="sng" dirty="0"/>
+              <a:t>Previous Challenges</a:t>
+            </a:r>
+          </a:p>
+          <a:p>
+            <a:r>
+              <a:rPr lang="en-CA" dirty="0"/>
+              <a:t>Computer efficiency</a:t>
+            </a:r>
+          </a:p>
+          <a:p>
+            <a:r>
+              <a:rPr lang="en-CA" dirty="0"/>
+              <a:t>External Parameters affecting data</a:t>
+            </a:r>
+          </a:p>
+          <a:p>
+            <a:r>
+              <a:rPr lang="en-CA" dirty="0"/>
+              <a:t>Potential Overfitting</a:t>
+            </a:r>
+          </a:p>
           <a:p>
             <a:endParaRPr lang="en-CA" dirty="0"/>
           </a:p>
@@ -3976,6 +4470,1636 @@
     <p:extLst>
       <p:ext uri="{BB962C8B-B14F-4D97-AF65-F5344CB8AC3E}">
         <p14:creationId xmlns:p14="http://schemas.microsoft.com/office/powerpoint/2010/main" val="3648359254"/>
+      </p:ext>
+    </p:extLst>
+  </p:cSld>
+  <p:clrMapOvr>
+    <a:masterClrMapping/>
+  </p:clrMapOvr>
+</p:sld>
+</file>
+
+<file path=ppt/slides/slide5.xml><?xml version="1.0" encoding="utf-8"?>
+<p:sld xmlns:a="http://schemas.openxmlformats.org/drawingml/2006/main" xmlns:r="http://schemas.openxmlformats.org/officeDocument/2006/relationships" xmlns:p="http://schemas.openxmlformats.org/presentationml/2006/main">
+  <p:cSld>
+    <p:spTree>
+      <p:nvGrpSpPr>
+        <p:cNvPr id="1" name=""/>
+        <p:cNvGrpSpPr/>
+        <p:nvPr/>
+      </p:nvGrpSpPr>
+      <p:grpSpPr>
+        <a:xfrm>
+          <a:off x="0" y="0"/>
+          <a:ext cx="0" cy="0"/>
+          <a:chOff x="0" y="0"/>
+          <a:chExt cx="0" cy="0"/>
+        </a:xfrm>
+      </p:grpSpPr>
+      <p:sp>
+        <p:nvSpPr>
+          <p:cNvPr id="2" name="Title 1">
+            <a:extLst>
+              <a:ext uri="{FF2B5EF4-FFF2-40B4-BE49-F238E27FC236}">
+                <a16:creationId xmlns:a16="http://schemas.microsoft.com/office/drawing/2014/main" id="{3C2B2C58-8271-6D98-52AE-331CD0F9EA20}"/>
+              </a:ext>
+            </a:extLst>
+          </p:cNvPr>
+          <p:cNvSpPr>
+            <a:spLocks noGrp="1"/>
+          </p:cNvSpPr>
+          <p:nvPr>
+            <p:ph type="title"/>
+          </p:nvPr>
+        </p:nvSpPr>
+        <p:spPr/>
+        <p:txBody>
+          <a:bodyPr/>
+          <a:lstStyle/>
+          <a:p>
+            <a:pPr algn="ctr"/>
+            <a:r>
+              <a:rPr lang="en-US" b="1" dirty="0"/>
+              <a:t>Methodology –Gathering Data</a:t>
+            </a:r>
+            <a:endParaRPr lang="en-CA" b="1" dirty="0"/>
+          </a:p>
+        </p:txBody>
+      </p:sp>
+      <p:sp>
+        <p:nvSpPr>
+          <p:cNvPr id="3" name="Content Placeholder 2">
+            <a:extLst>
+              <a:ext uri="{FF2B5EF4-FFF2-40B4-BE49-F238E27FC236}">
+                <a16:creationId xmlns:a16="http://schemas.microsoft.com/office/drawing/2014/main" id="{CF3BD96B-F760-A187-DF0C-6BCFF8E9F9CD}"/>
+              </a:ext>
+            </a:extLst>
+          </p:cNvPr>
+          <p:cNvSpPr>
+            <a:spLocks noGrp="1"/>
+          </p:cNvSpPr>
+          <p:nvPr>
+            <p:ph idx="1"/>
+          </p:nvPr>
+        </p:nvSpPr>
+        <p:spPr>
+          <a:xfrm>
+            <a:off x="838200" y="1825625"/>
+            <a:ext cx="4545650" cy="4351338"/>
+          </a:xfrm>
+        </p:spPr>
+        <p:txBody>
+          <a:bodyPr/>
+          <a:lstStyle/>
+          <a:p>
+            <a:pPr marL="0" indent="0" algn="ctr">
+              <a:buNone/>
+            </a:pPr>
+            <a:r>
+              <a:rPr lang="en-US" b="1" u="sng" dirty="0"/>
+              <a:t>Data Sources</a:t>
+            </a:r>
+          </a:p>
+          <a:p>
+            <a:r>
+              <a:rPr lang="en-US" dirty="0"/>
+              <a:t>Statistics Canada – House Price Index</a:t>
+            </a:r>
+          </a:p>
+          <a:p>
+            <a:r>
+              <a:rPr lang="en-US" dirty="0"/>
+              <a:t>Stats CREA – MLS Home Price Index </a:t>
+            </a:r>
+          </a:p>
+          <a:p>
+            <a:endParaRPr lang="en-CA" dirty="0"/>
+          </a:p>
+        </p:txBody>
+      </p:sp>
+      <p:pic>
+        <p:nvPicPr>
+          <p:cNvPr id="5" name="Picture 4" descr="Data Gathering">
+            <a:extLst>
+              <a:ext uri="{FF2B5EF4-FFF2-40B4-BE49-F238E27FC236}">
+                <a16:creationId xmlns:a16="http://schemas.microsoft.com/office/drawing/2014/main" id="{90CACAC0-7B8E-FA3F-2084-F1DDEFFF7EBF}"/>
+              </a:ext>
+            </a:extLst>
+          </p:cNvPr>
+          <p:cNvPicPr>
+            <a:picLocks noChangeAspect="1"/>
+          </p:cNvPicPr>
+          <p:nvPr/>
+        </p:nvPicPr>
+        <p:blipFill>
+          <a:blip r:embed="rId2">
+            <a:extLst>
+              <a:ext uri="{28A0092B-C50C-407E-A947-70E740481C1C}">
+                <a14:useLocalDpi xmlns:a14="http://schemas.microsoft.com/office/drawing/2010/main" val="0"/>
+              </a:ext>
+            </a:extLst>
+          </a:blip>
+          <a:stretch>
+            <a:fillRect/>
+          </a:stretch>
+        </p:blipFill>
+        <p:spPr>
+          <a:xfrm>
+            <a:off x="6447678" y="2704703"/>
+            <a:ext cx="5186362" cy="2593181"/>
+          </a:xfrm>
+          <a:prstGeom prst="snip2DiagRect">
+            <a:avLst/>
+          </a:prstGeom>
+          <a:solidFill>
+            <a:srgbClr val="FFFFFF">
+              <a:shade val="85000"/>
+            </a:srgbClr>
+          </a:solidFill>
+          <a:ln w="88900" cap="sq">
+            <a:solidFill>
+              <a:srgbClr val="FFFFFF"/>
+            </a:solidFill>
+            <a:miter lim="800000"/>
+          </a:ln>
+          <a:effectLst>
+            <a:outerShdw blurRad="88900" algn="tl" rotWithShape="0">
+              <a:srgbClr val="000000">
+                <a:alpha val="45000"/>
+              </a:srgbClr>
+            </a:outerShdw>
+          </a:effectLst>
+          <a:scene3d>
+            <a:camera prst="orthographicFront"/>
+            <a:lightRig rig="twoPt" dir="t">
+              <a:rot lat="0" lon="0" rev="7200000"/>
+            </a:lightRig>
+          </a:scene3d>
+          <a:sp3d>
+            <a:bevelT w="25400" h="19050"/>
+            <a:contourClr>
+              <a:srgbClr val="FFFFFF"/>
+            </a:contourClr>
+          </a:sp3d>
+        </p:spPr>
+      </p:pic>
+    </p:spTree>
+    <p:extLst>
+      <p:ext uri="{BB962C8B-B14F-4D97-AF65-F5344CB8AC3E}">
+        <p14:creationId xmlns:p14="http://schemas.microsoft.com/office/powerpoint/2010/main" val="1038605886"/>
+      </p:ext>
+    </p:extLst>
+  </p:cSld>
+  <p:clrMapOvr>
+    <a:masterClrMapping/>
+  </p:clrMapOvr>
+</p:sld>
+</file>
+
+<file path=ppt/slides/slide6.xml><?xml version="1.0" encoding="utf-8"?>
+<p:sld xmlns:a="http://schemas.openxmlformats.org/drawingml/2006/main" xmlns:r="http://schemas.openxmlformats.org/officeDocument/2006/relationships" xmlns:p="http://schemas.openxmlformats.org/presentationml/2006/main">
+  <p:cSld>
+    <p:spTree>
+      <p:nvGrpSpPr>
+        <p:cNvPr id="1" name=""/>
+        <p:cNvGrpSpPr/>
+        <p:nvPr/>
+      </p:nvGrpSpPr>
+      <p:grpSpPr>
+        <a:xfrm>
+          <a:off x="0" y="0"/>
+          <a:ext cx="0" cy="0"/>
+          <a:chOff x="0" y="0"/>
+          <a:chExt cx="0" cy="0"/>
+        </a:xfrm>
+      </p:grpSpPr>
+      <p:sp>
+        <p:nvSpPr>
+          <p:cNvPr id="2" name="Title 1">
+            <a:extLst>
+              <a:ext uri="{FF2B5EF4-FFF2-40B4-BE49-F238E27FC236}">
+                <a16:creationId xmlns:a16="http://schemas.microsoft.com/office/drawing/2014/main" id="{261DCFC1-0E03-0379-0F32-2F229D141B04}"/>
+              </a:ext>
+            </a:extLst>
+          </p:cNvPr>
+          <p:cNvSpPr>
+            <a:spLocks noGrp="1"/>
+          </p:cNvSpPr>
+          <p:nvPr>
+            <p:ph type="title"/>
+          </p:nvPr>
+        </p:nvSpPr>
+        <p:spPr/>
+        <p:txBody>
+          <a:bodyPr/>
+          <a:lstStyle/>
+          <a:p>
+            <a:pPr algn="ctr"/>
+            <a:r>
+              <a:rPr lang="en-US" b="1" dirty="0"/>
+              <a:t>Methodology – Prepare the Data</a:t>
+            </a:r>
+            <a:endParaRPr lang="en-CA" b="1" dirty="0"/>
+          </a:p>
+        </p:txBody>
+      </p:sp>
+      <p:sp>
+        <p:nvSpPr>
+          <p:cNvPr id="3" name="Content Placeholder 2">
+            <a:extLst>
+              <a:ext uri="{FF2B5EF4-FFF2-40B4-BE49-F238E27FC236}">
+                <a16:creationId xmlns:a16="http://schemas.microsoft.com/office/drawing/2014/main" id="{5802C370-A89D-7F3F-B128-DF42BAF2F3B6}"/>
+              </a:ext>
+            </a:extLst>
+          </p:cNvPr>
+          <p:cNvSpPr>
+            <a:spLocks noGrp="1"/>
+          </p:cNvSpPr>
+          <p:nvPr>
+            <p:ph idx="1"/>
+          </p:nvPr>
+        </p:nvSpPr>
+        <p:spPr>
+          <a:xfrm>
+            <a:off x="838200" y="1825625"/>
+            <a:ext cx="4699475" cy="4351338"/>
+          </a:xfrm>
+        </p:spPr>
+        <p:txBody>
+          <a:bodyPr/>
+          <a:lstStyle/>
+          <a:p>
+            <a:pPr marL="0" indent="0" algn="ctr">
+              <a:buNone/>
+            </a:pPr>
+            <a:r>
+              <a:rPr lang="en-US" b="1" u="sng" dirty="0"/>
+              <a:t>Problems</a:t>
+            </a:r>
+          </a:p>
+          <a:p>
+            <a:r>
+              <a:rPr lang="en-US" dirty="0"/>
+              <a:t>Outside factors affecting HPI</a:t>
+            </a:r>
+          </a:p>
+          <a:p>
+            <a:r>
+              <a:rPr lang="en-US" dirty="0"/>
+              <a:t>Different property characteristics</a:t>
+            </a:r>
+          </a:p>
+          <a:p>
+            <a:r>
+              <a:rPr lang="en-US" dirty="0"/>
+              <a:t>Overfitting data</a:t>
+            </a:r>
+          </a:p>
+          <a:p>
+            <a:pPr marL="0" indent="0" algn="ctr">
+              <a:buNone/>
+            </a:pPr>
+            <a:endParaRPr lang="en-CA" b="1" u="sng" dirty="0"/>
+          </a:p>
+        </p:txBody>
+      </p:sp>
+      <p:sp>
+        <p:nvSpPr>
+          <p:cNvPr id="4" name="Content Placeholder 2">
+            <a:extLst>
+              <a:ext uri="{FF2B5EF4-FFF2-40B4-BE49-F238E27FC236}">
+                <a16:creationId xmlns:a16="http://schemas.microsoft.com/office/drawing/2014/main" id="{D59E8A22-BEFE-2532-6306-2A34377E8392}"/>
+              </a:ext>
+            </a:extLst>
+          </p:cNvPr>
+          <p:cNvSpPr txBox="1">
+            <a:spLocks/>
+          </p:cNvSpPr>
+          <p:nvPr/>
+        </p:nvSpPr>
+        <p:spPr>
+          <a:xfrm>
+            <a:off x="6654325" y="1825625"/>
+            <a:ext cx="4699475" cy="4351338"/>
+          </a:xfrm>
+          <a:prstGeom prst="rect">
+            <a:avLst/>
+          </a:prstGeom>
+        </p:spPr>
+        <p:txBody>
+          <a:bodyPr vert="horz" lIns="91440" tIns="45720" rIns="91440" bIns="45720" rtlCol="0">
+            <a:normAutofit/>
+          </a:bodyPr>
+          <a:lstStyle>
+            <a:lvl1pPr marL="228600" indent="-228600" algn="l" defTabSz="914400" rtl="0" eaLnBrk="1" latinLnBrk="0" hangingPunct="1">
+              <a:lnSpc>
+                <a:spcPct val="90000"/>
+              </a:lnSpc>
+              <a:spcBef>
+                <a:spcPts val="1000"/>
+              </a:spcBef>
+              <a:buFont typeface="Arial" panose="020B0604020202020204" pitchFamily="34" charset="0"/>
+              <a:buChar char="•"/>
+              <a:defRPr sz="2800" kern="1200">
+                <a:solidFill>
+                  <a:schemeClr val="tx1"/>
+                </a:solidFill>
+                <a:latin typeface="+mn-lt"/>
+                <a:ea typeface="+mn-ea"/>
+                <a:cs typeface="+mn-cs"/>
+              </a:defRPr>
+            </a:lvl1pPr>
+            <a:lvl2pPr marL="685800" indent="-228600" algn="l" defTabSz="914400" rtl="0" eaLnBrk="1" latinLnBrk="0" hangingPunct="1">
+              <a:lnSpc>
+                <a:spcPct val="90000"/>
+              </a:lnSpc>
+              <a:spcBef>
+                <a:spcPts val="500"/>
+              </a:spcBef>
+              <a:buFont typeface="Arial" panose="020B0604020202020204" pitchFamily="34" charset="0"/>
+              <a:buChar char="•"/>
+              <a:defRPr sz="2400" kern="1200">
+                <a:solidFill>
+                  <a:schemeClr val="tx1"/>
+                </a:solidFill>
+                <a:latin typeface="+mn-lt"/>
+                <a:ea typeface="+mn-ea"/>
+                <a:cs typeface="+mn-cs"/>
+              </a:defRPr>
+            </a:lvl2pPr>
+            <a:lvl3pPr marL="1143000" indent="-228600" algn="l" defTabSz="914400" rtl="0" eaLnBrk="1" latinLnBrk="0" hangingPunct="1">
+              <a:lnSpc>
+                <a:spcPct val="90000"/>
+              </a:lnSpc>
+              <a:spcBef>
+                <a:spcPts val="500"/>
+              </a:spcBef>
+              <a:buFont typeface="Arial" panose="020B0604020202020204" pitchFamily="34" charset="0"/>
+              <a:buChar char="•"/>
+              <a:defRPr sz="2000" kern="1200">
+                <a:solidFill>
+                  <a:schemeClr val="tx1"/>
+                </a:solidFill>
+                <a:latin typeface="+mn-lt"/>
+                <a:ea typeface="+mn-ea"/>
+                <a:cs typeface="+mn-cs"/>
+              </a:defRPr>
+            </a:lvl3pPr>
+            <a:lvl4pPr marL="1600200" indent="-228600" algn="l" defTabSz="914400" rtl="0" eaLnBrk="1" latinLnBrk="0" hangingPunct="1">
+              <a:lnSpc>
+                <a:spcPct val="90000"/>
+              </a:lnSpc>
+              <a:spcBef>
+                <a:spcPts val="500"/>
+              </a:spcBef>
+              <a:buFont typeface="Arial" panose="020B0604020202020204" pitchFamily="34" charset="0"/>
+              <a:buChar char="•"/>
+              <a:defRPr sz="1800" kern="1200">
+                <a:solidFill>
+                  <a:schemeClr val="tx1"/>
+                </a:solidFill>
+                <a:latin typeface="+mn-lt"/>
+                <a:ea typeface="+mn-ea"/>
+                <a:cs typeface="+mn-cs"/>
+              </a:defRPr>
+            </a:lvl4pPr>
+            <a:lvl5pPr marL="2057400" indent="-228600" algn="l" defTabSz="914400" rtl="0" eaLnBrk="1" latinLnBrk="0" hangingPunct="1">
+              <a:lnSpc>
+                <a:spcPct val="90000"/>
+              </a:lnSpc>
+              <a:spcBef>
+                <a:spcPts val="500"/>
+              </a:spcBef>
+              <a:buFont typeface="Arial" panose="020B0604020202020204" pitchFamily="34" charset="0"/>
+              <a:buChar char="•"/>
+              <a:defRPr sz="1800" kern="1200">
+                <a:solidFill>
+                  <a:schemeClr val="tx1"/>
+                </a:solidFill>
+                <a:latin typeface="+mn-lt"/>
+                <a:ea typeface="+mn-ea"/>
+                <a:cs typeface="+mn-cs"/>
+              </a:defRPr>
+            </a:lvl5pPr>
+            <a:lvl6pPr marL="2514600" indent="-228600" algn="l" defTabSz="914400" rtl="0" eaLnBrk="1" latinLnBrk="0" hangingPunct="1">
+              <a:lnSpc>
+                <a:spcPct val="90000"/>
+              </a:lnSpc>
+              <a:spcBef>
+                <a:spcPts val="500"/>
+              </a:spcBef>
+              <a:buFont typeface="Arial" panose="020B0604020202020204" pitchFamily="34" charset="0"/>
+              <a:buChar char="•"/>
+              <a:defRPr sz="1800" kern="1200">
+                <a:solidFill>
+                  <a:schemeClr val="tx1"/>
+                </a:solidFill>
+                <a:latin typeface="+mn-lt"/>
+                <a:ea typeface="+mn-ea"/>
+                <a:cs typeface="+mn-cs"/>
+              </a:defRPr>
+            </a:lvl6pPr>
+            <a:lvl7pPr marL="2971800" indent="-228600" algn="l" defTabSz="914400" rtl="0" eaLnBrk="1" latinLnBrk="0" hangingPunct="1">
+              <a:lnSpc>
+                <a:spcPct val="90000"/>
+              </a:lnSpc>
+              <a:spcBef>
+                <a:spcPts val="500"/>
+              </a:spcBef>
+              <a:buFont typeface="Arial" panose="020B0604020202020204" pitchFamily="34" charset="0"/>
+              <a:buChar char="•"/>
+              <a:defRPr sz="1800" kern="1200">
+                <a:solidFill>
+                  <a:schemeClr val="tx1"/>
+                </a:solidFill>
+                <a:latin typeface="+mn-lt"/>
+                <a:ea typeface="+mn-ea"/>
+                <a:cs typeface="+mn-cs"/>
+              </a:defRPr>
+            </a:lvl7pPr>
+            <a:lvl8pPr marL="3429000" indent="-228600" algn="l" defTabSz="914400" rtl="0" eaLnBrk="1" latinLnBrk="0" hangingPunct="1">
+              <a:lnSpc>
+                <a:spcPct val="90000"/>
+              </a:lnSpc>
+              <a:spcBef>
+                <a:spcPts val="500"/>
+              </a:spcBef>
+              <a:buFont typeface="Arial" panose="020B0604020202020204" pitchFamily="34" charset="0"/>
+              <a:buChar char="•"/>
+              <a:defRPr sz="1800" kern="1200">
+                <a:solidFill>
+                  <a:schemeClr val="tx1"/>
+                </a:solidFill>
+                <a:latin typeface="+mn-lt"/>
+                <a:ea typeface="+mn-ea"/>
+                <a:cs typeface="+mn-cs"/>
+              </a:defRPr>
+            </a:lvl8pPr>
+            <a:lvl9pPr marL="3886200" indent="-228600" algn="l" defTabSz="914400" rtl="0" eaLnBrk="1" latinLnBrk="0" hangingPunct="1">
+              <a:lnSpc>
+                <a:spcPct val="90000"/>
+              </a:lnSpc>
+              <a:spcBef>
+                <a:spcPts val="500"/>
+              </a:spcBef>
+              <a:buFont typeface="Arial" panose="020B0604020202020204" pitchFamily="34" charset="0"/>
+              <a:buChar char="•"/>
+              <a:defRPr sz="1800" kern="1200">
+                <a:solidFill>
+                  <a:schemeClr val="tx1"/>
+                </a:solidFill>
+                <a:latin typeface="+mn-lt"/>
+                <a:ea typeface="+mn-ea"/>
+                <a:cs typeface="+mn-cs"/>
+              </a:defRPr>
+            </a:lvl9pPr>
+          </a:lstStyle>
+          <a:p>
+            <a:pPr marL="0" indent="0" algn="ctr">
+              <a:buFont typeface="Arial" panose="020B0604020202020204" pitchFamily="34" charset="0"/>
+              <a:buNone/>
+            </a:pPr>
+            <a:r>
+              <a:rPr lang="en-US" b="1" u="sng" dirty="0"/>
+              <a:t>Solutions</a:t>
+            </a:r>
+          </a:p>
+          <a:p>
+            <a:r>
+              <a:rPr lang="en-US" dirty="0"/>
+              <a:t>Pick a specific group of issues to address</a:t>
+            </a:r>
+          </a:p>
+          <a:p>
+            <a:r>
+              <a:rPr lang="en-US" dirty="0"/>
+              <a:t>One-Hot-Encoder to break out characteristics into Boolean value tables</a:t>
+            </a:r>
+          </a:p>
+          <a:p>
+            <a:r>
+              <a:rPr lang="en-CA" b="1" u="sng" dirty="0"/>
+              <a:t>Not sure yet</a:t>
+            </a:r>
+          </a:p>
+        </p:txBody>
+      </p:sp>
+    </p:spTree>
+    <p:extLst>
+      <p:ext uri="{BB962C8B-B14F-4D97-AF65-F5344CB8AC3E}">
+        <p14:creationId xmlns:p14="http://schemas.microsoft.com/office/powerpoint/2010/main" val="2383202837"/>
+      </p:ext>
+    </p:extLst>
+  </p:cSld>
+  <p:clrMapOvr>
+    <a:masterClrMapping/>
+  </p:clrMapOvr>
+</p:sld>
+</file>
+
+<file path=ppt/slides/slide7.xml><?xml version="1.0" encoding="utf-8"?>
+<p:sld xmlns:a="http://schemas.openxmlformats.org/drawingml/2006/main" xmlns:r="http://schemas.openxmlformats.org/officeDocument/2006/relationships" xmlns:p="http://schemas.openxmlformats.org/presentationml/2006/main">
+  <p:cSld>
+    <p:spTree>
+      <p:nvGrpSpPr>
+        <p:cNvPr id="1" name=""/>
+        <p:cNvGrpSpPr/>
+        <p:nvPr/>
+      </p:nvGrpSpPr>
+      <p:grpSpPr>
+        <a:xfrm>
+          <a:off x="0" y="0"/>
+          <a:ext cx="0" cy="0"/>
+          <a:chOff x="0" y="0"/>
+          <a:chExt cx="0" cy="0"/>
+        </a:xfrm>
+      </p:grpSpPr>
+      <p:sp>
+        <p:nvSpPr>
+          <p:cNvPr id="2" name="Title 1">
+            <a:extLst>
+              <a:ext uri="{FF2B5EF4-FFF2-40B4-BE49-F238E27FC236}">
+                <a16:creationId xmlns:a16="http://schemas.microsoft.com/office/drawing/2014/main" id="{B0DB744A-A8C0-BCC5-6F99-06DB37F07168}"/>
+              </a:ext>
+            </a:extLst>
+          </p:cNvPr>
+          <p:cNvSpPr>
+            <a:spLocks noGrp="1"/>
+          </p:cNvSpPr>
+          <p:nvPr>
+            <p:ph type="title"/>
+          </p:nvPr>
+        </p:nvSpPr>
+        <p:spPr/>
+        <p:txBody>
+          <a:bodyPr/>
+          <a:lstStyle/>
+          <a:p>
+            <a:pPr algn="ctr"/>
+            <a:r>
+              <a:rPr lang="en-US" b="1" dirty="0"/>
+              <a:t>Methodology – Choose a Model</a:t>
+            </a:r>
+            <a:endParaRPr lang="en-CA" b="1" dirty="0"/>
+          </a:p>
+        </p:txBody>
+      </p:sp>
+      <p:sp>
+        <p:nvSpPr>
+          <p:cNvPr id="3" name="Content Placeholder 2">
+            <a:extLst>
+              <a:ext uri="{FF2B5EF4-FFF2-40B4-BE49-F238E27FC236}">
+                <a16:creationId xmlns:a16="http://schemas.microsoft.com/office/drawing/2014/main" id="{CCD258DB-F0E8-992A-5FA7-749FA614890A}"/>
+              </a:ext>
+            </a:extLst>
+          </p:cNvPr>
+          <p:cNvSpPr>
+            <a:spLocks noGrp="1"/>
+          </p:cNvSpPr>
+          <p:nvPr>
+            <p:ph idx="1"/>
+          </p:nvPr>
+        </p:nvSpPr>
+        <p:spPr>
+          <a:xfrm>
+            <a:off x="838200" y="1825625"/>
+            <a:ext cx="4836207" cy="4351338"/>
+          </a:xfrm>
+        </p:spPr>
+        <p:txBody>
+          <a:bodyPr/>
+          <a:lstStyle/>
+          <a:p>
+            <a:pPr marL="0" indent="0" algn="ctr">
+              <a:buNone/>
+            </a:pPr>
+            <a:r>
+              <a:rPr lang="en-US" b="1" dirty="0"/>
+              <a:t>Options based on the Problem</a:t>
+            </a:r>
+          </a:p>
+          <a:p>
+            <a:r>
+              <a:rPr lang="en-US" dirty="0"/>
+              <a:t>Linear Regression</a:t>
+            </a:r>
+          </a:p>
+          <a:p>
+            <a:r>
+              <a:rPr lang="en-US" dirty="0"/>
+              <a:t>Decision Tree Regression</a:t>
+            </a:r>
+          </a:p>
+          <a:p>
+            <a:r>
+              <a:rPr lang="en-US" dirty="0"/>
+              <a:t>Random Forest Regression</a:t>
+            </a:r>
+          </a:p>
+          <a:p>
+            <a:r>
+              <a:rPr lang="en-US" dirty="0"/>
+              <a:t>Lasso regression</a:t>
+            </a:r>
+            <a:endParaRPr lang="en-CA" dirty="0"/>
+          </a:p>
+        </p:txBody>
+      </p:sp>
+      <p:pic>
+        <p:nvPicPr>
+          <p:cNvPr id="6" name="Picture 5" descr="Linear Regression&#10;">
+            <a:extLst>
+              <a:ext uri="{FF2B5EF4-FFF2-40B4-BE49-F238E27FC236}">
+                <a16:creationId xmlns:a16="http://schemas.microsoft.com/office/drawing/2014/main" id="{9F37D033-1F00-1178-1903-BD06C4FB4C96}"/>
+              </a:ext>
+            </a:extLst>
+          </p:cNvPr>
+          <p:cNvPicPr>
+            <a:picLocks noChangeAspect="1"/>
+          </p:cNvPicPr>
+          <p:nvPr/>
+        </p:nvPicPr>
+        <p:blipFill>
+          <a:blip r:embed="rId2">
+            <a:extLst>
+              <a:ext uri="{28A0092B-C50C-407E-A947-70E740481C1C}">
+                <a14:useLocalDpi xmlns:a14="http://schemas.microsoft.com/office/drawing/2010/main" val="0"/>
+              </a:ext>
+            </a:extLst>
+          </a:blip>
+          <a:stretch>
+            <a:fillRect/>
+          </a:stretch>
+        </p:blipFill>
+        <p:spPr>
+          <a:xfrm>
+            <a:off x="6096000" y="1585912"/>
+            <a:ext cx="2257174" cy="1843088"/>
+          </a:xfrm>
+          <a:prstGeom prst="rect">
+            <a:avLst/>
+          </a:prstGeom>
+          <a:solidFill>
+            <a:srgbClr val="FFFFFF">
+              <a:shade val="85000"/>
+            </a:srgbClr>
+          </a:solidFill>
+          <a:ln w="88900" cap="sq">
+            <a:solidFill>
+              <a:srgbClr val="FFFFFF"/>
+            </a:solidFill>
+            <a:miter lim="800000"/>
+          </a:ln>
+          <a:effectLst>
+            <a:outerShdw blurRad="55000" dist="18000" dir="5400000" algn="tl" rotWithShape="0">
+              <a:srgbClr val="000000">
+                <a:alpha val="40000"/>
+              </a:srgbClr>
+            </a:outerShdw>
+          </a:effectLst>
+          <a:scene3d>
+            <a:camera prst="orthographicFront"/>
+            <a:lightRig rig="twoPt" dir="t">
+              <a:rot lat="0" lon="0" rev="7200000"/>
+            </a:lightRig>
+          </a:scene3d>
+          <a:sp3d>
+            <a:bevelT w="25400" h="19050"/>
+            <a:contourClr>
+              <a:srgbClr val="FFFFFF"/>
+            </a:contourClr>
+          </a:sp3d>
+        </p:spPr>
+      </p:pic>
+      <p:pic>
+        <p:nvPicPr>
+          <p:cNvPr id="8" name="Picture 7" descr="Random Forest">
+            <a:extLst>
+              <a:ext uri="{FF2B5EF4-FFF2-40B4-BE49-F238E27FC236}">
+                <a16:creationId xmlns:a16="http://schemas.microsoft.com/office/drawing/2014/main" id="{A478C277-A4E8-E87D-088F-272F9725D76F}"/>
+              </a:ext>
+            </a:extLst>
+          </p:cNvPr>
+          <p:cNvPicPr>
+            <a:picLocks noChangeAspect="1"/>
+          </p:cNvPicPr>
+          <p:nvPr/>
+        </p:nvPicPr>
+        <p:blipFill>
+          <a:blip r:embed="rId3">
+            <a:extLst>
+              <a:ext uri="{28A0092B-C50C-407E-A947-70E740481C1C}">
+                <a14:useLocalDpi xmlns:a14="http://schemas.microsoft.com/office/drawing/2010/main" val="0"/>
+              </a:ext>
+            </a:extLst>
+          </a:blip>
+          <a:stretch>
+            <a:fillRect/>
+          </a:stretch>
+        </p:blipFill>
+        <p:spPr>
+          <a:xfrm>
+            <a:off x="8774767" y="2449772"/>
+            <a:ext cx="3067680" cy="1946715"/>
+          </a:xfrm>
+          <a:prstGeom prst="rect">
+            <a:avLst/>
+          </a:prstGeom>
+          <a:solidFill>
+            <a:srgbClr val="FFFFFF">
+              <a:shade val="85000"/>
+            </a:srgbClr>
+          </a:solidFill>
+          <a:ln w="88900" cap="sq">
+            <a:solidFill>
+              <a:srgbClr val="FFFFFF"/>
+            </a:solidFill>
+            <a:miter lim="800000"/>
+          </a:ln>
+          <a:effectLst>
+            <a:outerShdw blurRad="55000" dist="18000" dir="5400000" algn="tl" rotWithShape="0">
+              <a:srgbClr val="000000">
+                <a:alpha val="40000"/>
+              </a:srgbClr>
+            </a:outerShdw>
+          </a:effectLst>
+          <a:scene3d>
+            <a:camera prst="orthographicFront"/>
+            <a:lightRig rig="twoPt" dir="t">
+              <a:rot lat="0" lon="0" rev="7200000"/>
+            </a:lightRig>
+          </a:scene3d>
+          <a:sp3d>
+            <a:bevelT w="25400" h="19050"/>
+            <a:contourClr>
+              <a:srgbClr val="FFFFFF"/>
+            </a:contourClr>
+          </a:sp3d>
+        </p:spPr>
+      </p:pic>
+    </p:spTree>
+    <p:extLst>
+      <p:ext uri="{BB962C8B-B14F-4D97-AF65-F5344CB8AC3E}">
+        <p14:creationId xmlns:p14="http://schemas.microsoft.com/office/powerpoint/2010/main" val="4197115086"/>
+      </p:ext>
+    </p:extLst>
+  </p:cSld>
+  <p:clrMapOvr>
+    <a:masterClrMapping/>
+  </p:clrMapOvr>
+</p:sld>
+</file>
+
+<file path=ppt/slides/slide8.xml><?xml version="1.0" encoding="utf-8"?>
+<p:sld xmlns:a="http://schemas.openxmlformats.org/drawingml/2006/main" xmlns:r="http://schemas.openxmlformats.org/officeDocument/2006/relationships" xmlns:p="http://schemas.openxmlformats.org/presentationml/2006/main">
+  <p:cSld>
+    <p:spTree>
+      <p:nvGrpSpPr>
+        <p:cNvPr id="1" name=""/>
+        <p:cNvGrpSpPr/>
+        <p:nvPr/>
+      </p:nvGrpSpPr>
+      <p:grpSpPr>
+        <a:xfrm>
+          <a:off x="0" y="0"/>
+          <a:ext cx="0" cy="0"/>
+          <a:chOff x="0" y="0"/>
+          <a:chExt cx="0" cy="0"/>
+        </a:xfrm>
+      </p:grpSpPr>
+      <p:sp>
+        <p:nvSpPr>
+          <p:cNvPr id="2" name="Title 1">
+            <a:extLst>
+              <a:ext uri="{FF2B5EF4-FFF2-40B4-BE49-F238E27FC236}">
+                <a16:creationId xmlns:a16="http://schemas.microsoft.com/office/drawing/2014/main" id="{8CA3F4DF-B77D-78FA-CA32-EBCC9E326589}"/>
+              </a:ext>
+            </a:extLst>
+          </p:cNvPr>
+          <p:cNvSpPr>
+            <a:spLocks noGrp="1"/>
+          </p:cNvSpPr>
+          <p:nvPr>
+            <p:ph type="title"/>
+          </p:nvPr>
+        </p:nvSpPr>
+        <p:spPr/>
+        <p:txBody>
+          <a:bodyPr/>
+          <a:lstStyle/>
+          <a:p>
+            <a:pPr algn="ctr"/>
+            <a:r>
+              <a:rPr lang="en-US" b="1" dirty="0"/>
+              <a:t>Methodology – Training &amp; Evaluation</a:t>
+            </a:r>
+            <a:endParaRPr lang="en-CA" b="1" dirty="0"/>
+          </a:p>
+        </p:txBody>
+      </p:sp>
+      <p:sp>
+        <p:nvSpPr>
+          <p:cNvPr id="3" name="Content Placeholder 2">
+            <a:extLst>
+              <a:ext uri="{FF2B5EF4-FFF2-40B4-BE49-F238E27FC236}">
+                <a16:creationId xmlns:a16="http://schemas.microsoft.com/office/drawing/2014/main" id="{01FD789D-3103-87D0-945F-5B69D9719CA2}"/>
+              </a:ext>
+            </a:extLst>
+          </p:cNvPr>
+          <p:cNvSpPr>
+            <a:spLocks noGrp="1"/>
+          </p:cNvSpPr>
+          <p:nvPr>
+            <p:ph idx="1"/>
+          </p:nvPr>
+        </p:nvSpPr>
+        <p:spPr>
+          <a:xfrm>
+            <a:off x="6594505" y="1834171"/>
+            <a:ext cx="4759295" cy="4351338"/>
+          </a:xfrm>
+        </p:spPr>
+        <p:txBody>
+          <a:bodyPr/>
+          <a:lstStyle/>
+          <a:p>
+            <a:pPr marL="0" indent="0" algn="ctr">
+              <a:buNone/>
+            </a:pPr>
+            <a:r>
+              <a:rPr lang="en-US" b="1" dirty="0"/>
+              <a:t>Place holder</a:t>
+            </a:r>
+            <a:endParaRPr lang="en-CA" b="1" dirty="0"/>
+          </a:p>
+        </p:txBody>
+      </p:sp>
+      <p:pic>
+        <p:nvPicPr>
+          <p:cNvPr id="5" name="Picture 4" descr="A robot sitting on the floor reading a book&#10;&#10;Description automatically generated">
+            <a:extLst>
+              <a:ext uri="{FF2B5EF4-FFF2-40B4-BE49-F238E27FC236}">
+                <a16:creationId xmlns:a16="http://schemas.microsoft.com/office/drawing/2014/main" id="{0F7FF917-CF64-F4F1-B64F-2CD83163FA4A}"/>
+              </a:ext>
+            </a:extLst>
+          </p:cNvPr>
+          <p:cNvPicPr>
+            <a:picLocks noChangeAspect="1"/>
+          </p:cNvPicPr>
+          <p:nvPr/>
+        </p:nvPicPr>
+        <p:blipFill>
+          <a:blip r:embed="rId2">
+            <a:extLst>
+              <a:ext uri="{28A0092B-C50C-407E-A947-70E740481C1C}">
+                <a14:useLocalDpi xmlns:a14="http://schemas.microsoft.com/office/drawing/2010/main" val="0"/>
+              </a:ext>
+            </a:extLst>
+          </a:blip>
+          <a:stretch>
+            <a:fillRect/>
+          </a:stretch>
+        </p:blipFill>
+        <p:spPr>
+          <a:xfrm>
+            <a:off x="257409" y="1540820"/>
+            <a:ext cx="3048000" cy="2033016"/>
+          </a:xfrm>
+          <a:prstGeom prst="rect">
+            <a:avLst/>
+          </a:prstGeom>
+          <a:solidFill>
+            <a:srgbClr val="FFFFFF">
+              <a:shade val="85000"/>
+            </a:srgbClr>
+          </a:solidFill>
+          <a:ln w="190500" cap="sq">
+            <a:solidFill>
+              <a:srgbClr val="FFFFFF"/>
+            </a:solidFill>
+            <a:miter lim="800000"/>
+          </a:ln>
+          <a:effectLst>
+            <a:outerShdw blurRad="65000" dist="50800" dir="12900000" kx="195000" ky="145000" algn="tl" rotWithShape="0">
+              <a:srgbClr val="000000">
+                <a:alpha val="30000"/>
+              </a:srgbClr>
+            </a:outerShdw>
+          </a:effectLst>
+          <a:scene3d>
+            <a:camera prst="orthographicFront">
+              <a:rot lat="0" lon="0" rev="360000"/>
+            </a:camera>
+            <a:lightRig rig="twoPt" dir="t">
+              <a:rot lat="0" lon="0" rev="7200000"/>
+            </a:lightRig>
+          </a:scene3d>
+          <a:sp3d contourW="12700">
+            <a:bevelT w="25400" h="19050"/>
+            <a:contourClr>
+              <a:srgbClr val="969696"/>
+            </a:contourClr>
+          </a:sp3d>
+        </p:spPr>
+      </p:pic>
+      <p:pic>
+        <p:nvPicPr>
+          <p:cNvPr id="7" name="Picture 6" descr="A robot lifting a barbell&#10;&#10;Description automatically generated">
+            <a:extLst>
+              <a:ext uri="{FF2B5EF4-FFF2-40B4-BE49-F238E27FC236}">
+                <a16:creationId xmlns:a16="http://schemas.microsoft.com/office/drawing/2014/main" id="{FA7FC328-BB44-A201-0A2B-56240A1BAF0E}"/>
+              </a:ext>
+            </a:extLst>
+          </p:cNvPr>
+          <p:cNvPicPr>
+            <a:picLocks noChangeAspect="1"/>
+          </p:cNvPicPr>
+          <p:nvPr/>
+        </p:nvPicPr>
+        <p:blipFill>
+          <a:blip r:embed="rId3">
+            <a:extLst>
+              <a:ext uri="{28A0092B-C50C-407E-A947-70E740481C1C}">
+                <a14:useLocalDpi xmlns:a14="http://schemas.microsoft.com/office/drawing/2010/main" val="0"/>
+              </a:ext>
+            </a:extLst>
+          </a:blip>
+          <a:stretch>
+            <a:fillRect/>
+          </a:stretch>
+        </p:blipFill>
+        <p:spPr>
+          <a:xfrm>
+            <a:off x="2549496" y="3429000"/>
+            <a:ext cx="3048000" cy="1716024"/>
+          </a:xfrm>
+          <a:prstGeom prst="rect">
+            <a:avLst/>
+          </a:prstGeom>
+          <a:solidFill>
+            <a:srgbClr val="FFFFFF">
+              <a:shade val="85000"/>
+            </a:srgbClr>
+          </a:solidFill>
+          <a:ln w="101600" cap="sq">
+            <a:solidFill>
+              <a:srgbClr val="FDFDFD"/>
+            </a:solidFill>
+            <a:miter lim="800000"/>
+          </a:ln>
+          <a:effectLst>
+            <a:outerShdw blurRad="57150" dist="37500" dir="7560000" sy="98000" kx="110000" ky="200000" algn="tl" rotWithShape="0">
+              <a:srgbClr val="000000">
+                <a:alpha val="20000"/>
+              </a:srgbClr>
+            </a:outerShdw>
+          </a:effectLst>
+          <a:scene3d>
+            <a:camera prst="perspectiveRelaxed">
+              <a:rot lat="18960000" lon="0" rev="0"/>
+            </a:camera>
+            <a:lightRig rig="twoPt" dir="t">
+              <a:rot lat="0" lon="0" rev="7200000"/>
+            </a:lightRig>
+          </a:scene3d>
+          <a:sp3d prstMaterial="matte">
+            <a:bevelT w="22860" h="12700"/>
+            <a:contourClr>
+              <a:srgbClr val="FFFFFF"/>
+            </a:contourClr>
+          </a:sp3d>
+        </p:spPr>
+      </p:pic>
+      <p:pic>
+        <p:nvPicPr>
+          <p:cNvPr id="9" name="Picture 8" descr="A white robot with arms raised&#10;&#10;Description automatically generated">
+            <a:extLst>
+              <a:ext uri="{FF2B5EF4-FFF2-40B4-BE49-F238E27FC236}">
+                <a16:creationId xmlns:a16="http://schemas.microsoft.com/office/drawing/2014/main" id="{F7728B97-8C51-3F4C-EACB-4EFB832CFE6A}"/>
+              </a:ext>
+            </a:extLst>
+          </p:cNvPr>
+          <p:cNvPicPr>
+            <a:picLocks noChangeAspect="1"/>
+          </p:cNvPicPr>
+          <p:nvPr/>
+        </p:nvPicPr>
+        <p:blipFill>
+          <a:blip r:embed="rId4">
+            <a:extLst>
+              <a:ext uri="{28A0092B-C50C-407E-A947-70E740481C1C}">
+                <a14:useLocalDpi xmlns:a14="http://schemas.microsoft.com/office/drawing/2010/main" val="0"/>
+              </a:ext>
+            </a:extLst>
+          </a:blip>
+          <a:stretch>
+            <a:fillRect/>
+          </a:stretch>
+        </p:blipFill>
+        <p:spPr>
+          <a:xfrm>
+            <a:off x="440176" y="4215941"/>
+            <a:ext cx="1846470" cy="1969568"/>
+          </a:xfrm>
+          <a:prstGeom prst="rect">
+            <a:avLst/>
+          </a:prstGeom>
+          <a:solidFill>
+            <a:srgbClr val="FFFFFF">
+              <a:shade val="85000"/>
+            </a:srgbClr>
+          </a:solidFill>
+          <a:ln w="190500" cap="rnd">
+            <a:solidFill>
+              <a:srgbClr val="FFFFFF"/>
+            </a:solidFill>
+          </a:ln>
+          <a:effectLst>
+            <a:outerShdw blurRad="36195" dist="12700" dir="11400000" algn="tl" rotWithShape="0">
+              <a:srgbClr val="000000">
+                <a:alpha val="33000"/>
+              </a:srgbClr>
+            </a:outerShdw>
+          </a:effectLst>
+          <a:scene3d>
+            <a:camera prst="perspectiveContrastingLeftFacing">
+              <a:rot lat="540000" lon="2100000" rev="0"/>
+            </a:camera>
+            <a:lightRig rig="soft" dir="t"/>
+          </a:scene3d>
+          <a:sp3d contourW="12700" prstMaterial="matte">
+            <a:bevelT w="63500" h="50800"/>
+            <a:contourClr>
+              <a:srgbClr val="C0C0C0"/>
+            </a:contourClr>
+          </a:sp3d>
+        </p:spPr>
+      </p:pic>
+    </p:spTree>
+    <p:extLst>
+      <p:ext uri="{BB962C8B-B14F-4D97-AF65-F5344CB8AC3E}">
+        <p14:creationId xmlns:p14="http://schemas.microsoft.com/office/powerpoint/2010/main" val="865718683"/>
+      </p:ext>
+    </p:extLst>
+  </p:cSld>
+  <p:clrMapOvr>
+    <a:masterClrMapping/>
+  </p:clrMapOvr>
+</p:sld>
+</file>
+
+<file path=ppt/slides/slide9.xml><?xml version="1.0" encoding="utf-8"?>
+<p:sld xmlns:a="http://schemas.openxmlformats.org/drawingml/2006/main" xmlns:r="http://schemas.openxmlformats.org/officeDocument/2006/relationships" xmlns:p="http://schemas.openxmlformats.org/presentationml/2006/main">
+  <p:cSld>
+    <p:spTree>
+      <p:nvGrpSpPr>
+        <p:cNvPr id="1" name=""/>
+        <p:cNvGrpSpPr/>
+        <p:nvPr/>
+      </p:nvGrpSpPr>
+      <p:grpSpPr>
+        <a:xfrm>
+          <a:off x="0" y="0"/>
+          <a:ext cx="0" cy="0"/>
+          <a:chOff x="0" y="0"/>
+          <a:chExt cx="0" cy="0"/>
+        </a:xfrm>
+      </p:grpSpPr>
+      <p:sp>
+        <p:nvSpPr>
+          <p:cNvPr id="2" name="Title 1">
+            <a:extLst>
+              <a:ext uri="{FF2B5EF4-FFF2-40B4-BE49-F238E27FC236}">
+                <a16:creationId xmlns:a16="http://schemas.microsoft.com/office/drawing/2014/main" id="{52AC7041-8E7C-B59E-FEC1-4B16CE386AE0}"/>
+              </a:ext>
+            </a:extLst>
+          </p:cNvPr>
+          <p:cNvSpPr>
+            <a:spLocks noGrp="1"/>
+          </p:cNvSpPr>
+          <p:nvPr>
+            <p:ph type="title"/>
+          </p:nvPr>
+        </p:nvSpPr>
+        <p:spPr/>
+        <p:txBody>
+          <a:bodyPr/>
+          <a:lstStyle/>
+          <a:p>
+            <a:pPr algn="ctr"/>
+            <a:r>
+              <a:rPr lang="en-US" b="1" dirty="0"/>
+              <a:t>Methodology – Hyperparameter Tuning</a:t>
+            </a:r>
+            <a:endParaRPr lang="en-CA" b="1" dirty="0"/>
+          </a:p>
+        </p:txBody>
+      </p:sp>
+      <p:sp>
+        <p:nvSpPr>
+          <p:cNvPr id="3" name="Content Placeholder 2">
+            <a:extLst>
+              <a:ext uri="{FF2B5EF4-FFF2-40B4-BE49-F238E27FC236}">
+                <a16:creationId xmlns:a16="http://schemas.microsoft.com/office/drawing/2014/main" id="{FDE586A0-8DCF-408E-9ECB-45EF619B717D}"/>
+              </a:ext>
+            </a:extLst>
+          </p:cNvPr>
+          <p:cNvSpPr>
+            <a:spLocks noGrp="1"/>
+          </p:cNvSpPr>
+          <p:nvPr>
+            <p:ph idx="1"/>
+          </p:nvPr>
+        </p:nvSpPr>
+        <p:spPr>
+          <a:xfrm>
+            <a:off x="393818" y="1687514"/>
+            <a:ext cx="3708163" cy="2635280"/>
+          </a:xfrm>
+        </p:spPr>
+        <p:txBody>
+          <a:bodyPr/>
+          <a:lstStyle/>
+          <a:p>
+            <a:pPr marL="0" indent="0" algn="ctr">
+              <a:buNone/>
+            </a:pPr>
+            <a:r>
+              <a:rPr lang="en-US" b="1" u="sng" dirty="0"/>
+              <a:t>Options</a:t>
+            </a:r>
+          </a:p>
+          <a:p>
+            <a:r>
+              <a:rPr lang="en-US" dirty="0"/>
+              <a:t>Manual or Automated</a:t>
+            </a:r>
+          </a:p>
+          <a:p>
+            <a:r>
+              <a:rPr lang="en-US" dirty="0"/>
+              <a:t>Bayesian Optimization</a:t>
+            </a:r>
+          </a:p>
+          <a:p>
+            <a:r>
+              <a:rPr lang="en-US" dirty="0"/>
+              <a:t>Grid Search</a:t>
+            </a:r>
+          </a:p>
+          <a:p>
+            <a:r>
+              <a:rPr lang="en-US" dirty="0"/>
+              <a:t>Random Search</a:t>
+            </a:r>
+          </a:p>
+        </p:txBody>
+      </p:sp>
+      <p:sp>
+        <p:nvSpPr>
+          <p:cNvPr id="4" name="Content Placeholder 2">
+            <a:extLst>
+              <a:ext uri="{FF2B5EF4-FFF2-40B4-BE49-F238E27FC236}">
+                <a16:creationId xmlns:a16="http://schemas.microsoft.com/office/drawing/2014/main" id="{6F78DA9B-8BDF-BCB8-9B08-17CC6EC6466E}"/>
+              </a:ext>
+            </a:extLst>
+          </p:cNvPr>
+          <p:cNvSpPr txBox="1">
+            <a:spLocks/>
+          </p:cNvSpPr>
+          <p:nvPr/>
+        </p:nvSpPr>
+        <p:spPr>
+          <a:xfrm>
+            <a:off x="8471022" y="1911566"/>
+            <a:ext cx="3327160" cy="2187175"/>
+          </a:xfrm>
+          <a:prstGeom prst="rect">
+            <a:avLst/>
+          </a:prstGeom>
+        </p:spPr>
+        <p:txBody>
+          <a:bodyPr vert="horz" lIns="91440" tIns="45720" rIns="91440" bIns="45720" rtlCol="0">
+            <a:normAutofit fontScale="92500" lnSpcReduction="10000"/>
+          </a:bodyPr>
+          <a:lstStyle>
+            <a:lvl1pPr marL="228600" indent="-228600" algn="l" defTabSz="914400" rtl="0" eaLnBrk="1" latinLnBrk="0" hangingPunct="1">
+              <a:lnSpc>
+                <a:spcPct val="90000"/>
+              </a:lnSpc>
+              <a:spcBef>
+                <a:spcPts val="1000"/>
+              </a:spcBef>
+              <a:buFont typeface="Arial" panose="020B0604020202020204" pitchFamily="34" charset="0"/>
+              <a:buChar char="•"/>
+              <a:defRPr sz="2800" kern="1200">
+                <a:solidFill>
+                  <a:schemeClr val="tx1"/>
+                </a:solidFill>
+                <a:latin typeface="+mn-lt"/>
+                <a:ea typeface="+mn-ea"/>
+                <a:cs typeface="+mn-cs"/>
+              </a:defRPr>
+            </a:lvl1pPr>
+            <a:lvl2pPr marL="685800" indent="-228600" algn="l" defTabSz="914400" rtl="0" eaLnBrk="1" latinLnBrk="0" hangingPunct="1">
+              <a:lnSpc>
+                <a:spcPct val="90000"/>
+              </a:lnSpc>
+              <a:spcBef>
+                <a:spcPts val="500"/>
+              </a:spcBef>
+              <a:buFont typeface="Arial" panose="020B0604020202020204" pitchFamily="34" charset="0"/>
+              <a:buChar char="•"/>
+              <a:defRPr sz="2400" kern="1200">
+                <a:solidFill>
+                  <a:schemeClr val="tx1"/>
+                </a:solidFill>
+                <a:latin typeface="+mn-lt"/>
+                <a:ea typeface="+mn-ea"/>
+                <a:cs typeface="+mn-cs"/>
+              </a:defRPr>
+            </a:lvl2pPr>
+            <a:lvl3pPr marL="1143000" indent="-228600" algn="l" defTabSz="914400" rtl="0" eaLnBrk="1" latinLnBrk="0" hangingPunct="1">
+              <a:lnSpc>
+                <a:spcPct val="90000"/>
+              </a:lnSpc>
+              <a:spcBef>
+                <a:spcPts val="500"/>
+              </a:spcBef>
+              <a:buFont typeface="Arial" panose="020B0604020202020204" pitchFamily="34" charset="0"/>
+              <a:buChar char="•"/>
+              <a:defRPr sz="2000" kern="1200">
+                <a:solidFill>
+                  <a:schemeClr val="tx1"/>
+                </a:solidFill>
+                <a:latin typeface="+mn-lt"/>
+                <a:ea typeface="+mn-ea"/>
+                <a:cs typeface="+mn-cs"/>
+              </a:defRPr>
+            </a:lvl3pPr>
+            <a:lvl4pPr marL="1600200" indent="-228600" algn="l" defTabSz="914400" rtl="0" eaLnBrk="1" latinLnBrk="0" hangingPunct="1">
+              <a:lnSpc>
+                <a:spcPct val="90000"/>
+              </a:lnSpc>
+              <a:spcBef>
+                <a:spcPts val="500"/>
+              </a:spcBef>
+              <a:buFont typeface="Arial" panose="020B0604020202020204" pitchFamily="34" charset="0"/>
+              <a:buChar char="•"/>
+              <a:defRPr sz="1800" kern="1200">
+                <a:solidFill>
+                  <a:schemeClr val="tx1"/>
+                </a:solidFill>
+                <a:latin typeface="+mn-lt"/>
+                <a:ea typeface="+mn-ea"/>
+                <a:cs typeface="+mn-cs"/>
+              </a:defRPr>
+            </a:lvl4pPr>
+            <a:lvl5pPr marL="2057400" indent="-228600" algn="l" defTabSz="914400" rtl="0" eaLnBrk="1" latinLnBrk="0" hangingPunct="1">
+              <a:lnSpc>
+                <a:spcPct val="90000"/>
+              </a:lnSpc>
+              <a:spcBef>
+                <a:spcPts val="500"/>
+              </a:spcBef>
+              <a:buFont typeface="Arial" panose="020B0604020202020204" pitchFamily="34" charset="0"/>
+              <a:buChar char="•"/>
+              <a:defRPr sz="1800" kern="1200">
+                <a:solidFill>
+                  <a:schemeClr val="tx1"/>
+                </a:solidFill>
+                <a:latin typeface="+mn-lt"/>
+                <a:ea typeface="+mn-ea"/>
+                <a:cs typeface="+mn-cs"/>
+              </a:defRPr>
+            </a:lvl5pPr>
+            <a:lvl6pPr marL="2514600" indent="-228600" algn="l" defTabSz="914400" rtl="0" eaLnBrk="1" latinLnBrk="0" hangingPunct="1">
+              <a:lnSpc>
+                <a:spcPct val="90000"/>
+              </a:lnSpc>
+              <a:spcBef>
+                <a:spcPts val="500"/>
+              </a:spcBef>
+              <a:buFont typeface="Arial" panose="020B0604020202020204" pitchFamily="34" charset="0"/>
+              <a:buChar char="•"/>
+              <a:defRPr sz="1800" kern="1200">
+                <a:solidFill>
+                  <a:schemeClr val="tx1"/>
+                </a:solidFill>
+                <a:latin typeface="+mn-lt"/>
+                <a:ea typeface="+mn-ea"/>
+                <a:cs typeface="+mn-cs"/>
+              </a:defRPr>
+            </a:lvl6pPr>
+            <a:lvl7pPr marL="2971800" indent="-228600" algn="l" defTabSz="914400" rtl="0" eaLnBrk="1" latinLnBrk="0" hangingPunct="1">
+              <a:lnSpc>
+                <a:spcPct val="90000"/>
+              </a:lnSpc>
+              <a:spcBef>
+                <a:spcPts val="500"/>
+              </a:spcBef>
+              <a:buFont typeface="Arial" panose="020B0604020202020204" pitchFamily="34" charset="0"/>
+              <a:buChar char="•"/>
+              <a:defRPr sz="1800" kern="1200">
+                <a:solidFill>
+                  <a:schemeClr val="tx1"/>
+                </a:solidFill>
+                <a:latin typeface="+mn-lt"/>
+                <a:ea typeface="+mn-ea"/>
+                <a:cs typeface="+mn-cs"/>
+              </a:defRPr>
+            </a:lvl7pPr>
+            <a:lvl8pPr marL="3429000" indent="-228600" algn="l" defTabSz="914400" rtl="0" eaLnBrk="1" latinLnBrk="0" hangingPunct="1">
+              <a:lnSpc>
+                <a:spcPct val="90000"/>
+              </a:lnSpc>
+              <a:spcBef>
+                <a:spcPts val="500"/>
+              </a:spcBef>
+              <a:buFont typeface="Arial" panose="020B0604020202020204" pitchFamily="34" charset="0"/>
+              <a:buChar char="•"/>
+              <a:defRPr sz="1800" kern="1200">
+                <a:solidFill>
+                  <a:schemeClr val="tx1"/>
+                </a:solidFill>
+                <a:latin typeface="+mn-lt"/>
+                <a:ea typeface="+mn-ea"/>
+                <a:cs typeface="+mn-cs"/>
+              </a:defRPr>
+            </a:lvl8pPr>
+            <a:lvl9pPr marL="3886200" indent="-228600" algn="l" defTabSz="914400" rtl="0" eaLnBrk="1" latinLnBrk="0" hangingPunct="1">
+              <a:lnSpc>
+                <a:spcPct val="90000"/>
+              </a:lnSpc>
+              <a:spcBef>
+                <a:spcPts val="500"/>
+              </a:spcBef>
+              <a:buFont typeface="Arial" panose="020B0604020202020204" pitchFamily="34" charset="0"/>
+              <a:buChar char="•"/>
+              <a:defRPr sz="1800" kern="1200">
+                <a:solidFill>
+                  <a:schemeClr val="tx1"/>
+                </a:solidFill>
+                <a:latin typeface="+mn-lt"/>
+                <a:ea typeface="+mn-ea"/>
+                <a:cs typeface="+mn-cs"/>
+              </a:defRPr>
+            </a:lvl9pPr>
+          </a:lstStyle>
+          <a:p>
+            <a:pPr marL="0" indent="0" algn="ctr">
+              <a:buFont typeface="Arial" panose="020B0604020202020204" pitchFamily="34" charset="0"/>
+              <a:buNone/>
+            </a:pPr>
+            <a:r>
+              <a:rPr lang="en-US" b="1" u="sng" dirty="0"/>
+              <a:t>End Goal</a:t>
+            </a:r>
+          </a:p>
+          <a:p>
+            <a:pPr marL="0" indent="0">
+              <a:buFont typeface="Arial" panose="020B0604020202020204" pitchFamily="34" charset="0"/>
+              <a:buNone/>
+            </a:pPr>
+            <a:r>
+              <a:rPr lang="en-US" dirty="0"/>
+              <a:t>    To have a more efficient model with more accurate results. And not need a super-computer to process.</a:t>
+            </a:r>
+            <a:endParaRPr lang="en-US" b="1" u="sng" dirty="0"/>
+          </a:p>
+        </p:txBody>
+      </p:sp>
+      <p:sp>
+        <p:nvSpPr>
+          <p:cNvPr id="5" name="Content Placeholder 2">
+            <a:extLst>
+              <a:ext uri="{FF2B5EF4-FFF2-40B4-BE49-F238E27FC236}">
+                <a16:creationId xmlns:a16="http://schemas.microsoft.com/office/drawing/2014/main" id="{F4A16E5B-D7D9-49AD-AE31-A1F158320F3F}"/>
+              </a:ext>
+            </a:extLst>
+          </p:cNvPr>
+          <p:cNvSpPr txBox="1">
+            <a:spLocks/>
+          </p:cNvSpPr>
+          <p:nvPr/>
+        </p:nvSpPr>
+        <p:spPr>
+          <a:xfrm>
+            <a:off x="4876089" y="1687513"/>
+            <a:ext cx="2820824" cy="2635280"/>
+          </a:xfrm>
+          <a:prstGeom prst="rect">
+            <a:avLst/>
+          </a:prstGeom>
+        </p:spPr>
+        <p:txBody>
+          <a:bodyPr vert="horz" lIns="91440" tIns="45720" rIns="91440" bIns="45720" rtlCol="0">
+            <a:normAutofit/>
+          </a:bodyPr>
+          <a:lstStyle>
+            <a:lvl1pPr marL="228600" indent="-228600" algn="l" defTabSz="914400" rtl="0" eaLnBrk="1" latinLnBrk="0" hangingPunct="1">
+              <a:lnSpc>
+                <a:spcPct val="90000"/>
+              </a:lnSpc>
+              <a:spcBef>
+                <a:spcPts val="1000"/>
+              </a:spcBef>
+              <a:buFont typeface="Arial" panose="020B0604020202020204" pitchFamily="34" charset="0"/>
+              <a:buChar char="•"/>
+              <a:defRPr sz="2800" kern="1200">
+                <a:solidFill>
+                  <a:schemeClr val="tx1"/>
+                </a:solidFill>
+                <a:latin typeface="+mn-lt"/>
+                <a:ea typeface="+mn-ea"/>
+                <a:cs typeface="+mn-cs"/>
+              </a:defRPr>
+            </a:lvl1pPr>
+            <a:lvl2pPr marL="685800" indent="-228600" algn="l" defTabSz="914400" rtl="0" eaLnBrk="1" latinLnBrk="0" hangingPunct="1">
+              <a:lnSpc>
+                <a:spcPct val="90000"/>
+              </a:lnSpc>
+              <a:spcBef>
+                <a:spcPts val="500"/>
+              </a:spcBef>
+              <a:buFont typeface="Arial" panose="020B0604020202020204" pitchFamily="34" charset="0"/>
+              <a:buChar char="•"/>
+              <a:defRPr sz="2400" kern="1200">
+                <a:solidFill>
+                  <a:schemeClr val="tx1"/>
+                </a:solidFill>
+                <a:latin typeface="+mn-lt"/>
+                <a:ea typeface="+mn-ea"/>
+                <a:cs typeface="+mn-cs"/>
+              </a:defRPr>
+            </a:lvl2pPr>
+            <a:lvl3pPr marL="1143000" indent="-228600" algn="l" defTabSz="914400" rtl="0" eaLnBrk="1" latinLnBrk="0" hangingPunct="1">
+              <a:lnSpc>
+                <a:spcPct val="90000"/>
+              </a:lnSpc>
+              <a:spcBef>
+                <a:spcPts val="500"/>
+              </a:spcBef>
+              <a:buFont typeface="Arial" panose="020B0604020202020204" pitchFamily="34" charset="0"/>
+              <a:buChar char="•"/>
+              <a:defRPr sz="2000" kern="1200">
+                <a:solidFill>
+                  <a:schemeClr val="tx1"/>
+                </a:solidFill>
+                <a:latin typeface="+mn-lt"/>
+                <a:ea typeface="+mn-ea"/>
+                <a:cs typeface="+mn-cs"/>
+              </a:defRPr>
+            </a:lvl3pPr>
+            <a:lvl4pPr marL="1600200" indent="-228600" algn="l" defTabSz="914400" rtl="0" eaLnBrk="1" latinLnBrk="0" hangingPunct="1">
+              <a:lnSpc>
+                <a:spcPct val="90000"/>
+              </a:lnSpc>
+              <a:spcBef>
+                <a:spcPts val="500"/>
+              </a:spcBef>
+              <a:buFont typeface="Arial" panose="020B0604020202020204" pitchFamily="34" charset="0"/>
+              <a:buChar char="•"/>
+              <a:defRPr sz="1800" kern="1200">
+                <a:solidFill>
+                  <a:schemeClr val="tx1"/>
+                </a:solidFill>
+                <a:latin typeface="+mn-lt"/>
+                <a:ea typeface="+mn-ea"/>
+                <a:cs typeface="+mn-cs"/>
+              </a:defRPr>
+            </a:lvl4pPr>
+            <a:lvl5pPr marL="2057400" indent="-228600" algn="l" defTabSz="914400" rtl="0" eaLnBrk="1" latinLnBrk="0" hangingPunct="1">
+              <a:lnSpc>
+                <a:spcPct val="90000"/>
+              </a:lnSpc>
+              <a:spcBef>
+                <a:spcPts val="500"/>
+              </a:spcBef>
+              <a:buFont typeface="Arial" panose="020B0604020202020204" pitchFamily="34" charset="0"/>
+              <a:buChar char="•"/>
+              <a:defRPr sz="1800" kern="1200">
+                <a:solidFill>
+                  <a:schemeClr val="tx1"/>
+                </a:solidFill>
+                <a:latin typeface="+mn-lt"/>
+                <a:ea typeface="+mn-ea"/>
+                <a:cs typeface="+mn-cs"/>
+              </a:defRPr>
+            </a:lvl5pPr>
+            <a:lvl6pPr marL="2514600" indent="-228600" algn="l" defTabSz="914400" rtl="0" eaLnBrk="1" latinLnBrk="0" hangingPunct="1">
+              <a:lnSpc>
+                <a:spcPct val="90000"/>
+              </a:lnSpc>
+              <a:spcBef>
+                <a:spcPts val="500"/>
+              </a:spcBef>
+              <a:buFont typeface="Arial" panose="020B0604020202020204" pitchFamily="34" charset="0"/>
+              <a:buChar char="•"/>
+              <a:defRPr sz="1800" kern="1200">
+                <a:solidFill>
+                  <a:schemeClr val="tx1"/>
+                </a:solidFill>
+                <a:latin typeface="+mn-lt"/>
+                <a:ea typeface="+mn-ea"/>
+                <a:cs typeface="+mn-cs"/>
+              </a:defRPr>
+            </a:lvl6pPr>
+            <a:lvl7pPr marL="2971800" indent="-228600" algn="l" defTabSz="914400" rtl="0" eaLnBrk="1" latinLnBrk="0" hangingPunct="1">
+              <a:lnSpc>
+                <a:spcPct val="90000"/>
+              </a:lnSpc>
+              <a:spcBef>
+                <a:spcPts val="500"/>
+              </a:spcBef>
+              <a:buFont typeface="Arial" panose="020B0604020202020204" pitchFamily="34" charset="0"/>
+              <a:buChar char="•"/>
+              <a:defRPr sz="1800" kern="1200">
+                <a:solidFill>
+                  <a:schemeClr val="tx1"/>
+                </a:solidFill>
+                <a:latin typeface="+mn-lt"/>
+                <a:ea typeface="+mn-ea"/>
+                <a:cs typeface="+mn-cs"/>
+              </a:defRPr>
+            </a:lvl7pPr>
+            <a:lvl8pPr marL="3429000" indent="-228600" algn="l" defTabSz="914400" rtl="0" eaLnBrk="1" latinLnBrk="0" hangingPunct="1">
+              <a:lnSpc>
+                <a:spcPct val="90000"/>
+              </a:lnSpc>
+              <a:spcBef>
+                <a:spcPts val="500"/>
+              </a:spcBef>
+              <a:buFont typeface="Arial" panose="020B0604020202020204" pitchFamily="34" charset="0"/>
+              <a:buChar char="•"/>
+              <a:defRPr sz="1800" kern="1200">
+                <a:solidFill>
+                  <a:schemeClr val="tx1"/>
+                </a:solidFill>
+                <a:latin typeface="+mn-lt"/>
+                <a:ea typeface="+mn-ea"/>
+                <a:cs typeface="+mn-cs"/>
+              </a:defRPr>
+            </a:lvl8pPr>
+            <a:lvl9pPr marL="3886200" indent="-228600" algn="l" defTabSz="914400" rtl="0" eaLnBrk="1" latinLnBrk="0" hangingPunct="1">
+              <a:lnSpc>
+                <a:spcPct val="90000"/>
+              </a:lnSpc>
+              <a:spcBef>
+                <a:spcPts val="500"/>
+              </a:spcBef>
+              <a:buFont typeface="Arial" panose="020B0604020202020204" pitchFamily="34" charset="0"/>
+              <a:buChar char="•"/>
+              <a:defRPr sz="1800" kern="1200">
+                <a:solidFill>
+                  <a:schemeClr val="tx1"/>
+                </a:solidFill>
+                <a:latin typeface="+mn-lt"/>
+                <a:ea typeface="+mn-ea"/>
+                <a:cs typeface="+mn-cs"/>
+              </a:defRPr>
+            </a:lvl9pPr>
+          </a:lstStyle>
+          <a:p>
+            <a:pPr marL="0" indent="0" algn="ctr">
+              <a:buFont typeface="Arial" panose="020B0604020202020204" pitchFamily="34" charset="0"/>
+              <a:buNone/>
+            </a:pPr>
+            <a:r>
+              <a:rPr lang="en-US" b="1" u="sng" dirty="0"/>
+              <a:t>Available Tweaks</a:t>
+            </a:r>
+          </a:p>
+          <a:p>
+            <a:r>
+              <a:rPr lang="en-US" dirty="0"/>
+              <a:t>Learning Rate</a:t>
+            </a:r>
+          </a:p>
+          <a:p>
+            <a:r>
+              <a:rPr lang="en-US" dirty="0"/>
+              <a:t>Rate Decay</a:t>
+            </a:r>
+          </a:p>
+          <a:p>
+            <a:r>
+              <a:rPr lang="en-US" dirty="0"/>
+              <a:t>Momentum</a:t>
+            </a:r>
+          </a:p>
+          <a:p>
+            <a:r>
+              <a:rPr lang="en-US" dirty="0"/>
+              <a:t>Data Sizes</a:t>
+            </a:r>
+          </a:p>
+        </p:txBody>
+      </p:sp>
+    </p:spTree>
+    <p:extLst>
+      <p:ext uri="{BB962C8B-B14F-4D97-AF65-F5344CB8AC3E}">
+        <p14:creationId xmlns:p14="http://schemas.microsoft.com/office/powerpoint/2010/main" val="3327013567"/>
       </p:ext>
     </p:extLst>
   </p:cSld>

</xml_diff>

<commit_message>
-changed the last slide slightly
P@

Signed-off-by: P@ <patmaynard452@gmail.com>
</commit_message>
<xml_diff>
--- a/Presentation/Presentation_1.pptx
+++ b/Presentation/Presentation_1.pptx
@@ -113,6 +113,11 @@
       </a:defRPr>
     </a:lvl9pPr>
   </p:defaultTextStyle>
+  <p:extLst>
+    <p:ext uri="{EFAFB233-063F-42B5-8137-9DF3F51BA10A}">
+      <p15:sldGuideLst xmlns:p15="http://schemas.microsoft.com/office/powerpoint/2012/main"/>
+    </p:ext>
+  </p:extLst>
 </p:presentation>
 </file>
 
@@ -265,7 +270,7 @@
           <a:p>
             <a:fld id="{B8925DE7-249B-45F1-B0F9-77BC9CF6C486}" type="datetimeFigureOut">
               <a:rPr lang="en-CA" smtClean="0"/>
-              <a:t>2024-02-04</a:t>
+              <a:t>2024-02-10</a:t>
             </a:fld>
             <a:endParaRPr lang="en-CA"/>
           </a:p>
@@ -465,7 +470,7 @@
           <a:p>
             <a:fld id="{B8925DE7-249B-45F1-B0F9-77BC9CF6C486}" type="datetimeFigureOut">
               <a:rPr lang="en-CA" smtClean="0"/>
-              <a:t>2024-02-04</a:t>
+              <a:t>2024-02-10</a:t>
             </a:fld>
             <a:endParaRPr lang="en-CA"/>
           </a:p>
@@ -675,7 +680,7 @@
           <a:p>
             <a:fld id="{B8925DE7-249B-45F1-B0F9-77BC9CF6C486}" type="datetimeFigureOut">
               <a:rPr lang="en-CA" smtClean="0"/>
-              <a:t>2024-02-04</a:t>
+              <a:t>2024-02-10</a:t>
             </a:fld>
             <a:endParaRPr lang="en-CA"/>
           </a:p>
@@ -875,7 +880,7 @@
           <a:p>
             <a:fld id="{B8925DE7-249B-45F1-B0F9-77BC9CF6C486}" type="datetimeFigureOut">
               <a:rPr lang="en-CA" smtClean="0"/>
-              <a:t>2024-02-04</a:t>
+              <a:t>2024-02-10</a:t>
             </a:fld>
             <a:endParaRPr lang="en-CA"/>
           </a:p>
@@ -1151,7 +1156,7 @@
           <a:p>
             <a:fld id="{B8925DE7-249B-45F1-B0F9-77BC9CF6C486}" type="datetimeFigureOut">
               <a:rPr lang="en-CA" smtClean="0"/>
-              <a:t>2024-02-04</a:t>
+              <a:t>2024-02-10</a:t>
             </a:fld>
             <a:endParaRPr lang="en-CA"/>
           </a:p>
@@ -1419,7 +1424,7 @@
           <a:p>
             <a:fld id="{B8925DE7-249B-45F1-B0F9-77BC9CF6C486}" type="datetimeFigureOut">
               <a:rPr lang="en-CA" smtClean="0"/>
-              <a:t>2024-02-04</a:t>
+              <a:t>2024-02-10</a:t>
             </a:fld>
             <a:endParaRPr lang="en-CA"/>
           </a:p>
@@ -1834,7 +1839,7 @@
           <a:p>
             <a:fld id="{B8925DE7-249B-45F1-B0F9-77BC9CF6C486}" type="datetimeFigureOut">
               <a:rPr lang="en-CA" smtClean="0"/>
-              <a:t>2024-02-04</a:t>
+              <a:t>2024-02-10</a:t>
             </a:fld>
             <a:endParaRPr lang="en-CA"/>
           </a:p>
@@ -1976,7 +1981,7 @@
           <a:p>
             <a:fld id="{B8925DE7-249B-45F1-B0F9-77BC9CF6C486}" type="datetimeFigureOut">
               <a:rPr lang="en-CA" smtClean="0"/>
-              <a:t>2024-02-04</a:t>
+              <a:t>2024-02-10</a:t>
             </a:fld>
             <a:endParaRPr lang="en-CA"/>
           </a:p>
@@ -2089,7 +2094,7 @@
           <a:p>
             <a:fld id="{B8925DE7-249B-45F1-B0F9-77BC9CF6C486}" type="datetimeFigureOut">
               <a:rPr lang="en-CA" smtClean="0"/>
-              <a:t>2024-02-04</a:t>
+              <a:t>2024-02-10</a:t>
             </a:fld>
             <a:endParaRPr lang="en-CA"/>
           </a:p>
@@ -2402,7 +2407,7 @@
           <a:p>
             <a:fld id="{B8925DE7-249B-45F1-B0F9-77BC9CF6C486}" type="datetimeFigureOut">
               <a:rPr lang="en-CA" smtClean="0"/>
-              <a:t>2024-02-04</a:t>
+              <a:t>2024-02-10</a:t>
             </a:fld>
             <a:endParaRPr lang="en-CA"/>
           </a:p>
@@ -2691,7 +2696,7 @@
           <a:p>
             <a:fld id="{B8925DE7-249B-45F1-B0F9-77BC9CF6C486}" type="datetimeFigureOut">
               <a:rPr lang="en-CA" smtClean="0"/>
-              <a:t>2024-02-04</a:t>
+              <a:t>2024-02-10</a:t>
             </a:fld>
             <a:endParaRPr lang="en-CA"/>
           </a:p>
@@ -2934,7 +2939,7 @@
           <a:p>
             <a:fld id="{B8925DE7-249B-45F1-B0F9-77BC9CF6C486}" type="datetimeFigureOut">
               <a:rPr lang="en-CA" smtClean="0"/>
-              <a:t>2024-02-04</a:t>
+              <a:t>2024-02-10</a:t>
             </a:fld>
             <a:endParaRPr lang="en-CA"/>
           </a:p>
@@ -3584,7 +3589,7 @@
             </a:pPr>
             <a:r>
               <a:rPr lang="en-US" dirty="0"/>
-              <a:t>These prices are linked to larger-scale events such as economic events. </a:t>
+              <a:t>These prices are linked to larger-scale events such as economic and political events. </a:t>
             </a:r>
             <a:endParaRPr lang="en-CA" dirty="0"/>
           </a:p>

</xml_diff>

<commit_message>
-Updated some slides for more depth -Added Charts to visualize some data we are working with -Added timeline to the slide show
P@

Signed-off-by: P@ <patmaynard452@gmail.com>
</commit_message>
<xml_diff>
--- a/Presentation/Presentation_1.pptx
+++ b/Presentation/Presentation_1.pptx
@@ -8,13 +8,14 @@
     <p:sldId id="256" r:id="rId2"/>
     <p:sldId id="257" r:id="rId3"/>
     <p:sldId id="258" r:id="rId4"/>
-    <p:sldId id="259" r:id="rId5"/>
-    <p:sldId id="260" r:id="rId6"/>
-    <p:sldId id="261" r:id="rId7"/>
-    <p:sldId id="262" r:id="rId8"/>
-    <p:sldId id="263" r:id="rId9"/>
-    <p:sldId id="264" r:id="rId10"/>
-    <p:sldId id="265" r:id="rId11"/>
+    <p:sldId id="266" r:id="rId5"/>
+    <p:sldId id="259" r:id="rId6"/>
+    <p:sldId id="260" r:id="rId7"/>
+    <p:sldId id="261" r:id="rId8"/>
+    <p:sldId id="262" r:id="rId9"/>
+    <p:sldId id="263" r:id="rId10"/>
+    <p:sldId id="264" r:id="rId11"/>
+    <p:sldId id="265" r:id="rId12"/>
   </p:sldIdLst>
   <p:sldSz cx="12192000" cy="6858000"/>
   <p:notesSz cx="6858000" cy="9144000"/>
@@ -270,7 +271,7 @@
           <a:p>
             <a:fld id="{B8925DE7-249B-45F1-B0F9-77BC9CF6C486}" type="datetimeFigureOut">
               <a:rPr lang="en-CA" smtClean="0"/>
-              <a:t>2024-02-10</a:t>
+              <a:t>2024-02-11</a:t>
             </a:fld>
             <a:endParaRPr lang="en-CA"/>
           </a:p>
@@ -470,7 +471,7 @@
           <a:p>
             <a:fld id="{B8925DE7-249B-45F1-B0F9-77BC9CF6C486}" type="datetimeFigureOut">
               <a:rPr lang="en-CA" smtClean="0"/>
-              <a:t>2024-02-10</a:t>
+              <a:t>2024-02-11</a:t>
             </a:fld>
             <a:endParaRPr lang="en-CA"/>
           </a:p>
@@ -680,7 +681,7 @@
           <a:p>
             <a:fld id="{B8925DE7-249B-45F1-B0F9-77BC9CF6C486}" type="datetimeFigureOut">
               <a:rPr lang="en-CA" smtClean="0"/>
-              <a:t>2024-02-10</a:t>
+              <a:t>2024-02-11</a:t>
             </a:fld>
             <a:endParaRPr lang="en-CA"/>
           </a:p>
@@ -880,7 +881,7 @@
           <a:p>
             <a:fld id="{B8925DE7-249B-45F1-B0F9-77BC9CF6C486}" type="datetimeFigureOut">
               <a:rPr lang="en-CA" smtClean="0"/>
-              <a:t>2024-02-10</a:t>
+              <a:t>2024-02-11</a:t>
             </a:fld>
             <a:endParaRPr lang="en-CA"/>
           </a:p>
@@ -1156,7 +1157,7 @@
           <a:p>
             <a:fld id="{B8925DE7-249B-45F1-B0F9-77BC9CF6C486}" type="datetimeFigureOut">
               <a:rPr lang="en-CA" smtClean="0"/>
-              <a:t>2024-02-10</a:t>
+              <a:t>2024-02-11</a:t>
             </a:fld>
             <a:endParaRPr lang="en-CA"/>
           </a:p>
@@ -1424,7 +1425,7 @@
           <a:p>
             <a:fld id="{B8925DE7-249B-45F1-B0F9-77BC9CF6C486}" type="datetimeFigureOut">
               <a:rPr lang="en-CA" smtClean="0"/>
-              <a:t>2024-02-10</a:t>
+              <a:t>2024-02-11</a:t>
             </a:fld>
             <a:endParaRPr lang="en-CA"/>
           </a:p>
@@ -1839,7 +1840,7 @@
           <a:p>
             <a:fld id="{B8925DE7-249B-45F1-B0F9-77BC9CF6C486}" type="datetimeFigureOut">
               <a:rPr lang="en-CA" smtClean="0"/>
-              <a:t>2024-02-10</a:t>
+              <a:t>2024-02-11</a:t>
             </a:fld>
             <a:endParaRPr lang="en-CA"/>
           </a:p>
@@ -1981,7 +1982,7 @@
           <a:p>
             <a:fld id="{B8925DE7-249B-45F1-B0F9-77BC9CF6C486}" type="datetimeFigureOut">
               <a:rPr lang="en-CA" smtClean="0"/>
-              <a:t>2024-02-10</a:t>
+              <a:t>2024-02-11</a:t>
             </a:fld>
             <a:endParaRPr lang="en-CA"/>
           </a:p>
@@ -2094,7 +2095,7 @@
           <a:p>
             <a:fld id="{B8925DE7-249B-45F1-B0F9-77BC9CF6C486}" type="datetimeFigureOut">
               <a:rPr lang="en-CA" smtClean="0"/>
-              <a:t>2024-02-10</a:t>
+              <a:t>2024-02-11</a:t>
             </a:fld>
             <a:endParaRPr lang="en-CA"/>
           </a:p>
@@ -2407,7 +2408,7 @@
           <a:p>
             <a:fld id="{B8925DE7-249B-45F1-B0F9-77BC9CF6C486}" type="datetimeFigureOut">
               <a:rPr lang="en-CA" smtClean="0"/>
-              <a:t>2024-02-10</a:t>
+              <a:t>2024-02-11</a:t>
             </a:fld>
             <a:endParaRPr lang="en-CA"/>
           </a:p>
@@ -2696,7 +2697,7 @@
           <a:p>
             <a:fld id="{B8925DE7-249B-45F1-B0F9-77BC9CF6C486}" type="datetimeFigureOut">
               <a:rPr lang="en-CA" smtClean="0"/>
-              <a:t>2024-02-10</a:t>
+              <a:t>2024-02-11</a:t>
             </a:fld>
             <a:endParaRPr lang="en-CA"/>
           </a:p>
@@ -2939,7 +2940,7 @@
           <a:p>
             <a:fld id="{B8925DE7-249B-45F1-B0F9-77BC9CF6C486}" type="datetimeFigureOut">
               <a:rPr lang="en-CA" smtClean="0"/>
-              <a:t>2024-02-10</a:t>
+              <a:t>2024-02-11</a:t>
             </a:fld>
             <a:endParaRPr lang="en-CA"/>
           </a:p>
@@ -3524,7 +3525,7 @@
           <p:cNvPr id="2" name="Title 1">
             <a:extLst>
               <a:ext uri="{FF2B5EF4-FFF2-40B4-BE49-F238E27FC236}">
-                <a16:creationId xmlns:a16="http://schemas.microsoft.com/office/drawing/2014/main" id="{4B2B725A-33EB-91CB-5B64-50C7C3A6B768}"/>
+                <a16:creationId xmlns:a16="http://schemas.microsoft.com/office/drawing/2014/main" id="{52AC7041-8E7C-B59E-FEC1-4B16CE386AE0}"/>
               </a:ext>
             </a:extLst>
           </p:cNvPr>
@@ -3543,7 +3544,7 @@
             <a:pPr algn="ctr"/>
             <a:r>
               <a:rPr lang="en-US" b="1" dirty="0"/>
-              <a:t>Prediction</a:t>
+              <a:t>Methodology – Hyperparameter Tuning</a:t>
             </a:r>
             <a:endParaRPr lang="en-CA" b="1" dirty="0"/>
           </a:p>
@@ -3554,7 +3555,7 @@
           <p:cNvPr id="3" name="Content Placeholder 2">
             <a:extLst>
               <a:ext uri="{FF2B5EF4-FFF2-40B4-BE49-F238E27FC236}">
-                <a16:creationId xmlns:a16="http://schemas.microsoft.com/office/drawing/2014/main" id="{FFADFE04-371F-D6C1-42F3-0BA0ADB73606}"/>
+                <a16:creationId xmlns:a16="http://schemas.microsoft.com/office/drawing/2014/main" id="{FDE586A0-8DCF-408E-9ECB-45EF619B717D}"/>
               </a:ext>
             </a:extLst>
           </p:cNvPr>
@@ -3567,40 +3568,491 @@
         </p:nvSpPr>
         <p:spPr>
           <a:xfrm>
-            <a:off x="6854440" y="2262981"/>
-            <a:ext cx="4913120" cy="3163323"/>
+            <a:off x="393818" y="1687514"/>
+            <a:ext cx="3708163" cy="3147533"/>
           </a:xfrm>
         </p:spPr>
         <p:txBody>
-          <a:bodyPr/>
+          <a:bodyPr>
+            <a:normAutofit fontScale="77500" lnSpcReduction="20000"/>
+          </a:bodyPr>
           <a:lstStyle/>
           <a:p>
             <a:pPr marL="0" indent="0" algn="ctr">
               <a:buNone/>
             </a:pPr>
             <a:r>
+              <a:rPr lang="en-US" b="1" u="sng" dirty="0"/>
+              <a:t>Options</a:t>
+            </a:r>
+          </a:p>
+          <a:p>
+            <a:r>
               <a:rPr lang="en-US" dirty="0"/>
-              <a:t>Without even looking too far into the data we assume that the prices are going to continue to climb. </a:t>
-            </a:r>
-          </a:p>
+              <a:t>Bayesian Optimization - Tries to predict function shape</a:t>
+            </a:r>
+          </a:p>
+          <a:p>
+            <a:r>
+              <a:rPr lang="en-US" dirty="0"/>
+              <a:t>Grid Search – Cross references the data for optimal combinations</a:t>
+            </a:r>
+          </a:p>
+          <a:p>
+            <a:r>
+              <a:rPr lang="en-US" dirty="0"/>
+              <a:t>Random Search – Randomly selected cross references from the data pool</a:t>
+            </a:r>
+          </a:p>
+        </p:txBody>
+      </p:sp>
+      <p:sp>
+        <p:nvSpPr>
+          <p:cNvPr id="4" name="Content Placeholder 2">
+            <a:extLst>
+              <a:ext uri="{FF2B5EF4-FFF2-40B4-BE49-F238E27FC236}">
+                <a16:creationId xmlns:a16="http://schemas.microsoft.com/office/drawing/2014/main" id="{6F78DA9B-8BDF-BCB8-9B08-17CC6EC6466E}"/>
+              </a:ext>
+            </a:extLst>
+          </p:cNvPr>
+          <p:cNvSpPr txBox="1">
+            <a:spLocks/>
+          </p:cNvSpPr>
+          <p:nvPr/>
+        </p:nvSpPr>
+        <p:spPr>
+          <a:xfrm>
+            <a:off x="8471022" y="1911566"/>
+            <a:ext cx="3327160" cy="2187175"/>
+          </a:xfrm>
+          <a:prstGeom prst="rect">
+            <a:avLst/>
+          </a:prstGeom>
+        </p:spPr>
+        <p:txBody>
+          <a:bodyPr vert="horz" lIns="91440" tIns="45720" rIns="91440" bIns="45720" rtlCol="0">
+            <a:normAutofit fontScale="92500" lnSpcReduction="10000"/>
+          </a:bodyPr>
+          <a:lstStyle>
+            <a:lvl1pPr marL="228600" indent="-228600" algn="l" defTabSz="914400" rtl="0" eaLnBrk="1" latinLnBrk="0" hangingPunct="1">
+              <a:lnSpc>
+                <a:spcPct val="90000"/>
+              </a:lnSpc>
+              <a:spcBef>
+                <a:spcPts val="1000"/>
+              </a:spcBef>
+              <a:buFont typeface="Arial" panose="020B0604020202020204" pitchFamily="34" charset="0"/>
+              <a:buChar char="•"/>
+              <a:defRPr sz="2800" kern="1200">
+                <a:solidFill>
+                  <a:schemeClr val="tx1"/>
+                </a:solidFill>
+                <a:latin typeface="+mn-lt"/>
+                <a:ea typeface="+mn-ea"/>
+                <a:cs typeface="+mn-cs"/>
+              </a:defRPr>
+            </a:lvl1pPr>
+            <a:lvl2pPr marL="685800" indent="-228600" algn="l" defTabSz="914400" rtl="0" eaLnBrk="1" latinLnBrk="0" hangingPunct="1">
+              <a:lnSpc>
+                <a:spcPct val="90000"/>
+              </a:lnSpc>
+              <a:spcBef>
+                <a:spcPts val="500"/>
+              </a:spcBef>
+              <a:buFont typeface="Arial" panose="020B0604020202020204" pitchFamily="34" charset="0"/>
+              <a:buChar char="•"/>
+              <a:defRPr sz="2400" kern="1200">
+                <a:solidFill>
+                  <a:schemeClr val="tx1"/>
+                </a:solidFill>
+                <a:latin typeface="+mn-lt"/>
+                <a:ea typeface="+mn-ea"/>
+                <a:cs typeface="+mn-cs"/>
+              </a:defRPr>
+            </a:lvl2pPr>
+            <a:lvl3pPr marL="1143000" indent="-228600" algn="l" defTabSz="914400" rtl="0" eaLnBrk="1" latinLnBrk="0" hangingPunct="1">
+              <a:lnSpc>
+                <a:spcPct val="90000"/>
+              </a:lnSpc>
+              <a:spcBef>
+                <a:spcPts val="500"/>
+              </a:spcBef>
+              <a:buFont typeface="Arial" panose="020B0604020202020204" pitchFamily="34" charset="0"/>
+              <a:buChar char="•"/>
+              <a:defRPr sz="2000" kern="1200">
+                <a:solidFill>
+                  <a:schemeClr val="tx1"/>
+                </a:solidFill>
+                <a:latin typeface="+mn-lt"/>
+                <a:ea typeface="+mn-ea"/>
+                <a:cs typeface="+mn-cs"/>
+              </a:defRPr>
+            </a:lvl3pPr>
+            <a:lvl4pPr marL="1600200" indent="-228600" algn="l" defTabSz="914400" rtl="0" eaLnBrk="1" latinLnBrk="0" hangingPunct="1">
+              <a:lnSpc>
+                <a:spcPct val="90000"/>
+              </a:lnSpc>
+              <a:spcBef>
+                <a:spcPts val="500"/>
+              </a:spcBef>
+              <a:buFont typeface="Arial" panose="020B0604020202020204" pitchFamily="34" charset="0"/>
+              <a:buChar char="•"/>
+              <a:defRPr sz="1800" kern="1200">
+                <a:solidFill>
+                  <a:schemeClr val="tx1"/>
+                </a:solidFill>
+                <a:latin typeface="+mn-lt"/>
+                <a:ea typeface="+mn-ea"/>
+                <a:cs typeface="+mn-cs"/>
+              </a:defRPr>
+            </a:lvl4pPr>
+            <a:lvl5pPr marL="2057400" indent="-228600" algn="l" defTabSz="914400" rtl="0" eaLnBrk="1" latinLnBrk="0" hangingPunct="1">
+              <a:lnSpc>
+                <a:spcPct val="90000"/>
+              </a:lnSpc>
+              <a:spcBef>
+                <a:spcPts val="500"/>
+              </a:spcBef>
+              <a:buFont typeface="Arial" panose="020B0604020202020204" pitchFamily="34" charset="0"/>
+              <a:buChar char="•"/>
+              <a:defRPr sz="1800" kern="1200">
+                <a:solidFill>
+                  <a:schemeClr val="tx1"/>
+                </a:solidFill>
+                <a:latin typeface="+mn-lt"/>
+                <a:ea typeface="+mn-ea"/>
+                <a:cs typeface="+mn-cs"/>
+              </a:defRPr>
+            </a:lvl5pPr>
+            <a:lvl6pPr marL="2514600" indent="-228600" algn="l" defTabSz="914400" rtl="0" eaLnBrk="1" latinLnBrk="0" hangingPunct="1">
+              <a:lnSpc>
+                <a:spcPct val="90000"/>
+              </a:lnSpc>
+              <a:spcBef>
+                <a:spcPts val="500"/>
+              </a:spcBef>
+              <a:buFont typeface="Arial" panose="020B0604020202020204" pitchFamily="34" charset="0"/>
+              <a:buChar char="•"/>
+              <a:defRPr sz="1800" kern="1200">
+                <a:solidFill>
+                  <a:schemeClr val="tx1"/>
+                </a:solidFill>
+                <a:latin typeface="+mn-lt"/>
+                <a:ea typeface="+mn-ea"/>
+                <a:cs typeface="+mn-cs"/>
+              </a:defRPr>
+            </a:lvl6pPr>
+            <a:lvl7pPr marL="2971800" indent="-228600" algn="l" defTabSz="914400" rtl="0" eaLnBrk="1" latinLnBrk="0" hangingPunct="1">
+              <a:lnSpc>
+                <a:spcPct val="90000"/>
+              </a:lnSpc>
+              <a:spcBef>
+                <a:spcPts val="500"/>
+              </a:spcBef>
+              <a:buFont typeface="Arial" panose="020B0604020202020204" pitchFamily="34" charset="0"/>
+              <a:buChar char="•"/>
+              <a:defRPr sz="1800" kern="1200">
+                <a:solidFill>
+                  <a:schemeClr val="tx1"/>
+                </a:solidFill>
+                <a:latin typeface="+mn-lt"/>
+                <a:ea typeface="+mn-ea"/>
+                <a:cs typeface="+mn-cs"/>
+              </a:defRPr>
+            </a:lvl7pPr>
+            <a:lvl8pPr marL="3429000" indent="-228600" algn="l" defTabSz="914400" rtl="0" eaLnBrk="1" latinLnBrk="0" hangingPunct="1">
+              <a:lnSpc>
+                <a:spcPct val="90000"/>
+              </a:lnSpc>
+              <a:spcBef>
+                <a:spcPts val="500"/>
+              </a:spcBef>
+              <a:buFont typeface="Arial" panose="020B0604020202020204" pitchFamily="34" charset="0"/>
+              <a:buChar char="•"/>
+              <a:defRPr sz="1800" kern="1200">
+                <a:solidFill>
+                  <a:schemeClr val="tx1"/>
+                </a:solidFill>
+                <a:latin typeface="+mn-lt"/>
+                <a:ea typeface="+mn-ea"/>
+                <a:cs typeface="+mn-cs"/>
+              </a:defRPr>
+            </a:lvl8pPr>
+            <a:lvl9pPr marL="3886200" indent="-228600" algn="l" defTabSz="914400" rtl="0" eaLnBrk="1" latinLnBrk="0" hangingPunct="1">
+              <a:lnSpc>
+                <a:spcPct val="90000"/>
+              </a:lnSpc>
+              <a:spcBef>
+                <a:spcPts val="500"/>
+              </a:spcBef>
+              <a:buFont typeface="Arial" panose="020B0604020202020204" pitchFamily="34" charset="0"/>
+              <a:buChar char="•"/>
+              <a:defRPr sz="1800" kern="1200">
+                <a:solidFill>
+                  <a:schemeClr val="tx1"/>
+                </a:solidFill>
+                <a:latin typeface="+mn-lt"/>
+                <a:ea typeface="+mn-ea"/>
+                <a:cs typeface="+mn-cs"/>
+              </a:defRPr>
+            </a:lvl9pPr>
+          </a:lstStyle>
           <a:p>
             <a:pPr marL="0" indent="0" algn="ctr">
+              <a:buFont typeface="Arial" panose="020B0604020202020204" pitchFamily="34" charset="0"/>
               <a:buNone/>
             </a:pPr>
             <a:r>
+              <a:rPr lang="en-US" b="1" u="sng" dirty="0"/>
+              <a:t>End Goal</a:t>
+            </a:r>
+          </a:p>
+          <a:p>
+            <a:pPr marL="0" indent="0">
+              <a:buFont typeface="Arial" panose="020B0604020202020204" pitchFamily="34" charset="0"/>
+              <a:buNone/>
+            </a:pPr>
+            <a:r>
               <a:rPr lang="en-US" dirty="0"/>
-              <a:t>These prices are linked to larger-scale events such as economic and political events. </a:t>
-            </a:r>
-            <a:endParaRPr lang="en-CA" dirty="0"/>
+              <a:t>    To have a more efficient model with more accurate results. And not need a super-computer to process.</a:t>
+            </a:r>
+            <a:endParaRPr lang="en-US" b="1" u="sng" dirty="0"/>
+          </a:p>
+        </p:txBody>
+      </p:sp>
+      <p:sp>
+        <p:nvSpPr>
+          <p:cNvPr id="5" name="Content Placeholder 2">
+            <a:extLst>
+              <a:ext uri="{FF2B5EF4-FFF2-40B4-BE49-F238E27FC236}">
+                <a16:creationId xmlns:a16="http://schemas.microsoft.com/office/drawing/2014/main" id="{F4A16E5B-D7D9-49AD-AE31-A1F158320F3F}"/>
+              </a:ext>
+            </a:extLst>
+          </p:cNvPr>
+          <p:cNvSpPr txBox="1">
+            <a:spLocks/>
+          </p:cNvSpPr>
+          <p:nvPr/>
+        </p:nvSpPr>
+        <p:spPr>
+          <a:xfrm>
+            <a:off x="4876089" y="1687512"/>
+            <a:ext cx="2820824" cy="4368821"/>
+          </a:xfrm>
+          <a:prstGeom prst="rect">
+            <a:avLst/>
+          </a:prstGeom>
+        </p:spPr>
+        <p:txBody>
+          <a:bodyPr vert="horz" lIns="91440" tIns="45720" rIns="91440" bIns="45720" rtlCol="0">
+            <a:normAutofit fontScale="77500" lnSpcReduction="20000"/>
+          </a:bodyPr>
+          <a:lstStyle>
+            <a:lvl1pPr marL="228600" indent="-228600" algn="l" defTabSz="914400" rtl="0" eaLnBrk="1" latinLnBrk="0" hangingPunct="1">
+              <a:lnSpc>
+                <a:spcPct val="90000"/>
+              </a:lnSpc>
+              <a:spcBef>
+                <a:spcPts val="1000"/>
+              </a:spcBef>
+              <a:buFont typeface="Arial" panose="020B0604020202020204" pitchFamily="34" charset="0"/>
+              <a:buChar char="•"/>
+              <a:defRPr sz="2800" kern="1200">
+                <a:solidFill>
+                  <a:schemeClr val="tx1"/>
+                </a:solidFill>
+                <a:latin typeface="+mn-lt"/>
+                <a:ea typeface="+mn-ea"/>
+                <a:cs typeface="+mn-cs"/>
+              </a:defRPr>
+            </a:lvl1pPr>
+            <a:lvl2pPr marL="685800" indent="-228600" algn="l" defTabSz="914400" rtl="0" eaLnBrk="1" latinLnBrk="0" hangingPunct="1">
+              <a:lnSpc>
+                <a:spcPct val="90000"/>
+              </a:lnSpc>
+              <a:spcBef>
+                <a:spcPts val="500"/>
+              </a:spcBef>
+              <a:buFont typeface="Arial" panose="020B0604020202020204" pitchFamily="34" charset="0"/>
+              <a:buChar char="•"/>
+              <a:defRPr sz="2400" kern="1200">
+                <a:solidFill>
+                  <a:schemeClr val="tx1"/>
+                </a:solidFill>
+                <a:latin typeface="+mn-lt"/>
+                <a:ea typeface="+mn-ea"/>
+                <a:cs typeface="+mn-cs"/>
+              </a:defRPr>
+            </a:lvl2pPr>
+            <a:lvl3pPr marL="1143000" indent="-228600" algn="l" defTabSz="914400" rtl="0" eaLnBrk="1" latinLnBrk="0" hangingPunct="1">
+              <a:lnSpc>
+                <a:spcPct val="90000"/>
+              </a:lnSpc>
+              <a:spcBef>
+                <a:spcPts val="500"/>
+              </a:spcBef>
+              <a:buFont typeface="Arial" panose="020B0604020202020204" pitchFamily="34" charset="0"/>
+              <a:buChar char="•"/>
+              <a:defRPr sz="2000" kern="1200">
+                <a:solidFill>
+                  <a:schemeClr val="tx1"/>
+                </a:solidFill>
+                <a:latin typeface="+mn-lt"/>
+                <a:ea typeface="+mn-ea"/>
+                <a:cs typeface="+mn-cs"/>
+              </a:defRPr>
+            </a:lvl3pPr>
+            <a:lvl4pPr marL="1600200" indent="-228600" algn="l" defTabSz="914400" rtl="0" eaLnBrk="1" latinLnBrk="0" hangingPunct="1">
+              <a:lnSpc>
+                <a:spcPct val="90000"/>
+              </a:lnSpc>
+              <a:spcBef>
+                <a:spcPts val="500"/>
+              </a:spcBef>
+              <a:buFont typeface="Arial" panose="020B0604020202020204" pitchFamily="34" charset="0"/>
+              <a:buChar char="•"/>
+              <a:defRPr sz="1800" kern="1200">
+                <a:solidFill>
+                  <a:schemeClr val="tx1"/>
+                </a:solidFill>
+                <a:latin typeface="+mn-lt"/>
+                <a:ea typeface="+mn-ea"/>
+                <a:cs typeface="+mn-cs"/>
+              </a:defRPr>
+            </a:lvl4pPr>
+            <a:lvl5pPr marL="2057400" indent="-228600" algn="l" defTabSz="914400" rtl="0" eaLnBrk="1" latinLnBrk="0" hangingPunct="1">
+              <a:lnSpc>
+                <a:spcPct val="90000"/>
+              </a:lnSpc>
+              <a:spcBef>
+                <a:spcPts val="500"/>
+              </a:spcBef>
+              <a:buFont typeface="Arial" panose="020B0604020202020204" pitchFamily="34" charset="0"/>
+              <a:buChar char="•"/>
+              <a:defRPr sz="1800" kern="1200">
+                <a:solidFill>
+                  <a:schemeClr val="tx1"/>
+                </a:solidFill>
+                <a:latin typeface="+mn-lt"/>
+                <a:ea typeface="+mn-ea"/>
+                <a:cs typeface="+mn-cs"/>
+              </a:defRPr>
+            </a:lvl5pPr>
+            <a:lvl6pPr marL="2514600" indent="-228600" algn="l" defTabSz="914400" rtl="0" eaLnBrk="1" latinLnBrk="0" hangingPunct="1">
+              <a:lnSpc>
+                <a:spcPct val="90000"/>
+              </a:lnSpc>
+              <a:spcBef>
+                <a:spcPts val="500"/>
+              </a:spcBef>
+              <a:buFont typeface="Arial" panose="020B0604020202020204" pitchFamily="34" charset="0"/>
+              <a:buChar char="•"/>
+              <a:defRPr sz="1800" kern="1200">
+                <a:solidFill>
+                  <a:schemeClr val="tx1"/>
+                </a:solidFill>
+                <a:latin typeface="+mn-lt"/>
+                <a:ea typeface="+mn-ea"/>
+                <a:cs typeface="+mn-cs"/>
+              </a:defRPr>
+            </a:lvl6pPr>
+            <a:lvl7pPr marL="2971800" indent="-228600" algn="l" defTabSz="914400" rtl="0" eaLnBrk="1" latinLnBrk="0" hangingPunct="1">
+              <a:lnSpc>
+                <a:spcPct val="90000"/>
+              </a:lnSpc>
+              <a:spcBef>
+                <a:spcPts val="500"/>
+              </a:spcBef>
+              <a:buFont typeface="Arial" panose="020B0604020202020204" pitchFamily="34" charset="0"/>
+              <a:buChar char="•"/>
+              <a:defRPr sz="1800" kern="1200">
+                <a:solidFill>
+                  <a:schemeClr val="tx1"/>
+                </a:solidFill>
+                <a:latin typeface="+mn-lt"/>
+                <a:ea typeface="+mn-ea"/>
+                <a:cs typeface="+mn-cs"/>
+              </a:defRPr>
+            </a:lvl7pPr>
+            <a:lvl8pPr marL="3429000" indent="-228600" algn="l" defTabSz="914400" rtl="0" eaLnBrk="1" latinLnBrk="0" hangingPunct="1">
+              <a:lnSpc>
+                <a:spcPct val="90000"/>
+              </a:lnSpc>
+              <a:spcBef>
+                <a:spcPts val="500"/>
+              </a:spcBef>
+              <a:buFont typeface="Arial" panose="020B0604020202020204" pitchFamily="34" charset="0"/>
+              <a:buChar char="•"/>
+              <a:defRPr sz="1800" kern="1200">
+                <a:solidFill>
+                  <a:schemeClr val="tx1"/>
+                </a:solidFill>
+                <a:latin typeface="+mn-lt"/>
+                <a:ea typeface="+mn-ea"/>
+                <a:cs typeface="+mn-cs"/>
+              </a:defRPr>
+            </a:lvl8pPr>
+            <a:lvl9pPr marL="3886200" indent="-228600" algn="l" defTabSz="914400" rtl="0" eaLnBrk="1" latinLnBrk="0" hangingPunct="1">
+              <a:lnSpc>
+                <a:spcPct val="90000"/>
+              </a:lnSpc>
+              <a:spcBef>
+                <a:spcPts val="500"/>
+              </a:spcBef>
+              <a:buFont typeface="Arial" panose="020B0604020202020204" pitchFamily="34" charset="0"/>
+              <a:buChar char="•"/>
+              <a:defRPr sz="1800" kern="1200">
+                <a:solidFill>
+                  <a:schemeClr val="tx1"/>
+                </a:solidFill>
+                <a:latin typeface="+mn-lt"/>
+                <a:ea typeface="+mn-ea"/>
+                <a:cs typeface="+mn-cs"/>
+              </a:defRPr>
+            </a:lvl9pPr>
+          </a:lstStyle>
+          <a:p>
+            <a:pPr marL="0" indent="0" algn="ctr">
+              <a:buFont typeface="Arial" panose="020B0604020202020204" pitchFamily="34" charset="0"/>
+              <a:buNone/>
+            </a:pPr>
+            <a:r>
+              <a:rPr lang="en-US" b="1" u="sng" dirty="0"/>
+              <a:t>Available Tweaks</a:t>
+            </a:r>
+          </a:p>
+          <a:p>
+            <a:r>
+              <a:rPr lang="en-US" dirty="0"/>
+              <a:t>Learning Rate – Step size</a:t>
+            </a:r>
+          </a:p>
+          <a:p>
+            <a:r>
+              <a:rPr lang="en-US" dirty="0"/>
+              <a:t>Rate Decay – Reduce learning rate to find local minima</a:t>
+            </a:r>
+          </a:p>
+          <a:p>
+            <a:r>
+              <a:rPr lang="en-US" dirty="0"/>
+              <a:t>Momentum – Reducing noise by using previous iterations to clean up data</a:t>
+            </a:r>
+          </a:p>
+          <a:p>
+            <a:r>
+              <a:rPr lang="en-US" dirty="0"/>
+              <a:t>Data Size – How much input data is needed for prediction</a:t>
+            </a:r>
           </a:p>
         </p:txBody>
       </p:sp>
       <p:pic>
         <p:nvPicPr>
-          <p:cNvPr id="5" name="Picture 4" descr="A Crystal Ball">
-            <a:extLst>
-              <a:ext uri="{FF2B5EF4-FFF2-40B4-BE49-F238E27FC236}">
-                <a16:creationId xmlns:a16="http://schemas.microsoft.com/office/drawing/2014/main" id="{7C287FC7-EDE2-6968-6199-25798197E2C8}"/>
+          <p:cNvPr id="7" name="Picture 6" descr="Wrench">
+            <a:extLst>
+              <a:ext uri="{FF2B5EF4-FFF2-40B4-BE49-F238E27FC236}">
+                <a16:creationId xmlns:a16="http://schemas.microsoft.com/office/drawing/2014/main" id="{5689FAF1-150D-E92B-1D77-1813B0EF1708}"/>
               </a:ext>
             </a:extLst>
           </p:cNvPr>
@@ -3623,8 +4075,188 @@
         </p:blipFill>
         <p:spPr>
           <a:xfrm>
-            <a:off x="1700806" y="1884159"/>
-            <a:ext cx="3542145" cy="3542145"/>
+            <a:off x="8499948" y="4319619"/>
+            <a:ext cx="2853852" cy="2304789"/>
+          </a:xfrm>
+          <a:prstGeom prst="rect">
+            <a:avLst/>
+          </a:prstGeom>
+        </p:spPr>
+      </p:pic>
+      <p:pic>
+        <p:nvPicPr>
+          <p:cNvPr id="9" name="Picture 8" descr="Nuts">
+            <a:extLst>
+              <a:ext uri="{FF2B5EF4-FFF2-40B4-BE49-F238E27FC236}">
+                <a16:creationId xmlns:a16="http://schemas.microsoft.com/office/drawing/2014/main" id="{58E2F590-638B-1749-07E4-3B2FF4391496}"/>
+              </a:ext>
+            </a:extLst>
+          </p:cNvPr>
+          <p:cNvPicPr>
+            <a:picLocks noChangeAspect="1"/>
+          </p:cNvPicPr>
+          <p:nvPr/>
+        </p:nvPicPr>
+        <p:blipFill>
+          <a:blip r:embed="rId3">
+            <a:extLst>
+              <a:ext uri="{28A0092B-C50C-407E-A947-70E740481C1C}">
+                <a14:useLocalDpi xmlns:a14="http://schemas.microsoft.com/office/drawing/2010/main" val="0"/>
+              </a:ext>
+            </a:extLst>
+          </a:blip>
+          <a:stretch>
+            <a:fillRect/>
+          </a:stretch>
+        </p:blipFill>
+        <p:spPr>
+          <a:xfrm>
+            <a:off x="595096" y="4528158"/>
+            <a:ext cx="3033837" cy="2022953"/>
+          </a:xfrm>
+          <a:prstGeom prst="rect">
+            <a:avLst/>
+          </a:prstGeom>
+        </p:spPr>
+      </p:pic>
+    </p:spTree>
+    <p:extLst>
+      <p:ext uri="{BB962C8B-B14F-4D97-AF65-F5344CB8AC3E}">
+        <p14:creationId xmlns:p14="http://schemas.microsoft.com/office/powerpoint/2010/main" val="3327013567"/>
+      </p:ext>
+    </p:extLst>
+  </p:cSld>
+  <p:clrMapOvr>
+    <a:masterClrMapping/>
+  </p:clrMapOvr>
+</p:sld>
+</file>
+
+<file path=ppt/slides/slide11.xml><?xml version="1.0" encoding="utf-8"?>
+<p:sld xmlns:a="http://schemas.openxmlformats.org/drawingml/2006/main" xmlns:r="http://schemas.openxmlformats.org/officeDocument/2006/relationships" xmlns:p="http://schemas.openxmlformats.org/presentationml/2006/main">
+  <p:cSld>
+    <p:spTree>
+      <p:nvGrpSpPr>
+        <p:cNvPr id="1" name=""/>
+        <p:cNvGrpSpPr/>
+        <p:nvPr/>
+      </p:nvGrpSpPr>
+      <p:grpSpPr>
+        <a:xfrm>
+          <a:off x="0" y="0"/>
+          <a:ext cx="0" cy="0"/>
+          <a:chOff x="0" y="0"/>
+          <a:chExt cx="0" cy="0"/>
+        </a:xfrm>
+      </p:grpSpPr>
+      <p:sp>
+        <p:nvSpPr>
+          <p:cNvPr id="2" name="Title 1">
+            <a:extLst>
+              <a:ext uri="{FF2B5EF4-FFF2-40B4-BE49-F238E27FC236}">
+                <a16:creationId xmlns:a16="http://schemas.microsoft.com/office/drawing/2014/main" id="{4B2B725A-33EB-91CB-5B64-50C7C3A6B768}"/>
+              </a:ext>
+            </a:extLst>
+          </p:cNvPr>
+          <p:cNvSpPr>
+            <a:spLocks noGrp="1"/>
+          </p:cNvSpPr>
+          <p:nvPr>
+            <p:ph type="title"/>
+          </p:nvPr>
+        </p:nvSpPr>
+        <p:spPr/>
+        <p:txBody>
+          <a:bodyPr/>
+          <a:lstStyle/>
+          <a:p>
+            <a:pPr algn="ctr"/>
+            <a:r>
+              <a:rPr lang="en-US" b="1" dirty="0"/>
+              <a:t>Prediction</a:t>
+            </a:r>
+            <a:endParaRPr lang="en-CA" b="1" dirty="0"/>
+          </a:p>
+        </p:txBody>
+      </p:sp>
+      <p:sp>
+        <p:nvSpPr>
+          <p:cNvPr id="3" name="Content Placeholder 2">
+            <a:extLst>
+              <a:ext uri="{FF2B5EF4-FFF2-40B4-BE49-F238E27FC236}">
+                <a16:creationId xmlns:a16="http://schemas.microsoft.com/office/drawing/2014/main" id="{FFADFE04-371F-D6C1-42F3-0BA0ADB73606}"/>
+              </a:ext>
+            </a:extLst>
+          </p:cNvPr>
+          <p:cNvSpPr>
+            <a:spLocks noGrp="1"/>
+          </p:cNvSpPr>
+          <p:nvPr>
+            <p:ph idx="1"/>
+          </p:nvPr>
+        </p:nvSpPr>
+        <p:spPr>
+          <a:xfrm>
+            <a:off x="6942122" y="3329552"/>
+            <a:ext cx="4913120" cy="3163323"/>
+          </a:xfrm>
+        </p:spPr>
+        <p:txBody>
+          <a:bodyPr>
+            <a:normAutofit lnSpcReduction="10000"/>
+          </a:bodyPr>
+          <a:lstStyle/>
+          <a:p>
+            <a:pPr marL="0" indent="0" algn="ctr">
+              <a:buNone/>
+            </a:pPr>
+            <a:r>
+              <a:rPr lang="en-US" dirty="0"/>
+              <a:t>Without even looking too far into the data we assume that the prices are going to continue to climb. </a:t>
+            </a:r>
+          </a:p>
+          <a:p>
+            <a:pPr marL="0" indent="0" algn="ctr">
+              <a:buNone/>
+            </a:pPr>
+            <a:r>
+              <a:rPr lang="en-US" dirty="0"/>
+              <a:t>These prices are linked to larger-scale events such as economic and political events that are not quantified in the data. </a:t>
+            </a:r>
+            <a:endParaRPr lang="en-CA" dirty="0"/>
+          </a:p>
+        </p:txBody>
+      </p:sp>
+      <p:pic>
+        <p:nvPicPr>
+          <p:cNvPr id="5" name="Picture 4" descr="A Crystal Ball">
+            <a:extLst>
+              <a:ext uri="{FF2B5EF4-FFF2-40B4-BE49-F238E27FC236}">
+                <a16:creationId xmlns:a16="http://schemas.microsoft.com/office/drawing/2014/main" id="{7C287FC7-EDE2-6968-6199-25798197E2C8}"/>
+              </a:ext>
+            </a:extLst>
+          </p:cNvPr>
+          <p:cNvPicPr>
+            <a:picLocks noChangeAspect="1"/>
+          </p:cNvPicPr>
+          <p:nvPr/>
+        </p:nvPicPr>
+        <p:blipFill>
+          <a:blip r:embed="rId2">
+            <a:extLst>
+              <a:ext uri="{28A0092B-C50C-407E-A947-70E740481C1C}">
+                <a14:useLocalDpi xmlns:a14="http://schemas.microsoft.com/office/drawing/2010/main" val="0"/>
+              </a:ext>
+            </a:extLst>
+          </a:blip>
+          <a:stretch>
+            <a:fillRect/>
+          </a:stretch>
+        </p:blipFill>
+        <p:spPr>
+          <a:xfrm>
+            <a:off x="8399227" y="691233"/>
+            <a:ext cx="1998909" cy="1998909"/>
           </a:xfrm>
           <a:prstGeom prst="ellipse">
             <a:avLst/>
@@ -3653,6 +4285,84 @@
               <a:srgbClr val="333333"/>
             </a:contourClr>
           </a:sp3d>
+        </p:spPr>
+      </p:pic>
+      <p:pic>
+        <p:nvPicPr>
+          <p:cNvPr id="6" name="Graphic 5">
+            <a:extLst>
+              <a:ext uri="{FF2B5EF4-FFF2-40B4-BE49-F238E27FC236}">
+                <a16:creationId xmlns:a16="http://schemas.microsoft.com/office/drawing/2014/main" id="{2353AE36-CDEE-A171-9657-94B44DB00316}"/>
+              </a:ext>
+            </a:extLst>
+          </p:cNvPr>
+          <p:cNvPicPr>
+            <a:picLocks noChangeAspect="1"/>
+          </p:cNvPicPr>
+          <p:nvPr/>
+        </p:nvPicPr>
+        <p:blipFill>
+          <a:blip r:embed="rId3">
+            <a:extLst>
+              <a:ext uri="{28A0092B-C50C-407E-A947-70E740481C1C}">
+                <a14:useLocalDpi xmlns:a14="http://schemas.microsoft.com/office/drawing/2010/main" val="0"/>
+              </a:ext>
+              <a:ext uri="{96DAC541-7B7A-43D3-8B79-37D633B846F1}">
+                <asvg:svgBlip xmlns:asvg="http://schemas.microsoft.com/office/drawing/2016/SVG/main" r:embed="rId4"/>
+              </a:ext>
+            </a:extLst>
+          </a:blip>
+          <a:stretch>
+            <a:fillRect/>
+          </a:stretch>
+        </p:blipFill>
+        <p:spPr>
+          <a:xfrm>
+            <a:off x="0" y="1019929"/>
+            <a:ext cx="3920829" cy="2919489"/>
+          </a:xfrm>
+          <a:prstGeom prst="rect">
+            <a:avLst/>
+          </a:prstGeom>
+        </p:spPr>
+      </p:pic>
+      <p:pic>
+        <p:nvPicPr>
+          <p:cNvPr id="8" name="Graphic 7">
+            <a:extLst>
+              <a:ext uri="{FF2B5EF4-FFF2-40B4-BE49-F238E27FC236}">
+                <a16:creationId xmlns:a16="http://schemas.microsoft.com/office/drawing/2014/main" id="{DCEFE586-C14B-6C9E-47B3-F119B3B4B801}"/>
+              </a:ext>
+            </a:extLst>
+          </p:cNvPr>
+          <p:cNvPicPr>
+            <a:picLocks noChangeAspect="1"/>
+          </p:cNvPicPr>
+          <p:nvPr/>
+        </p:nvPicPr>
+        <p:blipFill>
+          <a:blip r:embed="rId5">
+            <a:extLst>
+              <a:ext uri="{28A0092B-C50C-407E-A947-70E740481C1C}">
+                <a14:useLocalDpi xmlns:a14="http://schemas.microsoft.com/office/drawing/2010/main" val="0"/>
+              </a:ext>
+              <a:ext uri="{96DAC541-7B7A-43D3-8B79-37D633B846F1}">
+                <asvg:svgBlip xmlns:asvg="http://schemas.microsoft.com/office/drawing/2016/SVG/main" r:embed="rId6"/>
+              </a:ext>
+            </a:extLst>
+          </a:blip>
+          <a:stretch>
+            <a:fillRect/>
+          </a:stretch>
+        </p:blipFill>
+        <p:spPr>
+          <a:xfrm>
+            <a:off x="3137770" y="3939418"/>
+            <a:ext cx="3804352" cy="2832759"/>
+          </a:xfrm>
+          <a:prstGeom prst="rect">
+            <a:avLst/>
+          </a:prstGeom>
         </p:spPr>
       </p:pic>
     </p:spTree>
@@ -3961,13 +4671,7 @@
           <a:p>
             <a:r>
               <a:rPr lang="en-US" dirty="0"/>
-              <a:t>R&amp;D Software Developer</a:t>
-            </a:r>
-          </a:p>
-          <a:p>
-            <a:r>
-              <a:rPr lang="en-US" dirty="0"/>
-              <a:t>Full-Stack ERP Developer</a:t>
+              <a:t>Full-Stack Software Developer</a:t>
             </a:r>
           </a:p>
           <a:p>
@@ -3979,7 +4683,7 @@
           <a:p>
             <a:r>
               <a:rPr lang="en-US" dirty="0"/>
-              <a:t>Computer &amp; Network Technician</a:t>
+              <a:t>Computer &amp; Network Tech.</a:t>
             </a:r>
           </a:p>
           <a:p>
@@ -3993,9 +4697,6 @@
               <a:rPr lang="en-US" dirty="0"/>
               <a:t>Lived all over Ontario</a:t>
             </a:r>
-          </a:p>
-          <a:p>
-            <a:endParaRPr lang="en-US" dirty="0"/>
           </a:p>
         </p:txBody>
       </p:sp>
@@ -4094,7 +4795,7 @@
             </a:pPr>
             <a:r>
               <a:rPr lang="en-US" dirty="0"/>
-              <a:t>	We would like to predict what the range of house prices will be in the future and try to narrow down if there is a better year in a decade and a month in a year to purchase a home. </a:t>
+              <a:t>	We would like to predict the range of house prices will be in the future and if possible, try to narrow down if there is a better year in a decade and a month in a year to purchase a home. </a:t>
             </a:r>
           </a:p>
           <a:p>
@@ -4134,6 +4835,186 @@
 </file>
 
 <file path=ppt/slides/slide4.xml><?xml version="1.0" encoding="utf-8"?>
+<p:sld xmlns:a="http://schemas.openxmlformats.org/drawingml/2006/main" xmlns:r="http://schemas.openxmlformats.org/officeDocument/2006/relationships" xmlns:p="http://schemas.openxmlformats.org/presentationml/2006/main">
+  <p:cSld>
+    <p:spTree>
+      <p:nvGrpSpPr>
+        <p:cNvPr id="1" name=""/>
+        <p:cNvGrpSpPr/>
+        <p:nvPr/>
+      </p:nvGrpSpPr>
+      <p:grpSpPr>
+        <a:xfrm>
+          <a:off x="0" y="0"/>
+          <a:ext cx="0" cy="0"/>
+          <a:chOff x="0" y="0"/>
+          <a:chExt cx="0" cy="0"/>
+        </a:xfrm>
+      </p:grpSpPr>
+      <p:sp>
+        <p:nvSpPr>
+          <p:cNvPr id="2" name="Title 1">
+            <a:extLst>
+              <a:ext uri="{FF2B5EF4-FFF2-40B4-BE49-F238E27FC236}">
+                <a16:creationId xmlns:a16="http://schemas.microsoft.com/office/drawing/2014/main" id="{27A6CCBC-4D2E-167A-2B06-B4B1F3A357A3}"/>
+              </a:ext>
+            </a:extLst>
+          </p:cNvPr>
+          <p:cNvSpPr>
+            <a:spLocks noGrp="1"/>
+          </p:cNvSpPr>
+          <p:nvPr>
+            <p:ph type="title"/>
+          </p:nvPr>
+        </p:nvSpPr>
+        <p:spPr>
+          <a:xfrm>
+            <a:off x="838200" y="365125"/>
+            <a:ext cx="10515600" cy="849313"/>
+          </a:xfrm>
+        </p:spPr>
+        <p:txBody>
+          <a:bodyPr/>
+          <a:lstStyle/>
+          <a:p>
+            <a:pPr algn="ctr"/>
+            <a:r>
+              <a:rPr lang="en-US" b="1" dirty="0"/>
+              <a:t>Timeline</a:t>
+            </a:r>
+            <a:endParaRPr lang="en-CA" b="1" dirty="0"/>
+          </a:p>
+        </p:txBody>
+      </p:sp>
+      <p:pic>
+        <p:nvPicPr>
+          <p:cNvPr id="5" name="Content Placeholder 4">
+            <a:extLst>
+              <a:ext uri="{FF2B5EF4-FFF2-40B4-BE49-F238E27FC236}">
+                <a16:creationId xmlns:a16="http://schemas.microsoft.com/office/drawing/2014/main" id="{6A1F0026-C3E8-C952-11F1-06AEDBD9C352}"/>
+              </a:ext>
+            </a:extLst>
+          </p:cNvPr>
+          <p:cNvPicPr>
+            <a:picLocks noGrp="1" noChangeAspect="1"/>
+          </p:cNvPicPr>
+          <p:nvPr>
+            <p:ph idx="1"/>
+          </p:nvPr>
+        </p:nvPicPr>
+        <p:blipFill>
+          <a:blip r:embed="rId2">
+            <a:extLst>
+              <a:ext uri="{28A0092B-C50C-407E-A947-70E740481C1C}">
+                <a14:useLocalDpi xmlns:a14="http://schemas.microsoft.com/office/drawing/2010/main" val="0"/>
+              </a:ext>
+              <a:ext uri="{96DAC541-7B7A-43D3-8B79-37D633B846F1}">
+                <asvg:svgBlip xmlns:asvg="http://schemas.microsoft.com/office/drawing/2016/SVG/main" r:embed="rId3"/>
+              </a:ext>
+            </a:extLst>
+          </a:blip>
+          <a:stretch>
+            <a:fillRect/>
+          </a:stretch>
+        </p:blipFill>
+        <p:spPr>
+          <a:xfrm>
+            <a:off x="3588707" y="1214438"/>
+            <a:ext cx="8603293" cy="5464967"/>
+          </a:xfrm>
+        </p:spPr>
+      </p:pic>
+      <p:sp>
+        <p:nvSpPr>
+          <p:cNvPr id="6" name="TextBox 5">
+            <a:extLst>
+              <a:ext uri="{FF2B5EF4-FFF2-40B4-BE49-F238E27FC236}">
+                <a16:creationId xmlns:a16="http://schemas.microsoft.com/office/drawing/2014/main" id="{0A22DFAD-C9A9-545A-E81C-D2B8063A85EC}"/>
+              </a:ext>
+            </a:extLst>
+          </p:cNvPr>
+          <p:cNvSpPr txBox="1"/>
+          <p:nvPr/>
+        </p:nvSpPr>
+        <p:spPr>
+          <a:xfrm>
+            <a:off x="159993" y="1214438"/>
+            <a:ext cx="3428714" cy="1477328"/>
+          </a:xfrm>
+          <a:prstGeom prst="rect">
+            <a:avLst/>
+          </a:prstGeom>
+          <a:noFill/>
+        </p:spPr>
+        <p:txBody>
+          <a:bodyPr wrap="square" rtlCol="0">
+            <a:spAutoFit/>
+          </a:bodyPr>
+          <a:lstStyle/>
+          <a:p>
+            <a:pPr algn="ctr"/>
+            <a:r>
+              <a:rPr lang="en-US" b="1" dirty="0"/>
+              <a:t>Major Factors</a:t>
+            </a:r>
+          </a:p>
+          <a:p>
+            <a:pPr marL="285750" indent="-285750">
+              <a:buFont typeface="Arial" panose="020B0604020202020204" pitchFamily="34" charset="0"/>
+              <a:buChar char="•"/>
+            </a:pPr>
+            <a:r>
+              <a:rPr lang="en-US" dirty="0"/>
+              <a:t>Procrastination</a:t>
+            </a:r>
+          </a:p>
+          <a:p>
+            <a:pPr marL="285750" indent="-285750">
+              <a:buFont typeface="Arial" panose="020B0604020202020204" pitchFamily="34" charset="0"/>
+              <a:buChar char="•"/>
+            </a:pPr>
+            <a:r>
+              <a:rPr lang="en-US" dirty="0"/>
+              <a:t>Gathering Data</a:t>
+            </a:r>
+          </a:p>
+          <a:p>
+            <a:pPr marL="285750" indent="-285750">
+              <a:buFont typeface="Arial" panose="020B0604020202020204" pitchFamily="34" charset="0"/>
+              <a:buChar char="•"/>
+            </a:pPr>
+            <a:r>
+              <a:rPr lang="en-US" dirty="0"/>
+              <a:t>Building a model that works</a:t>
+            </a:r>
+          </a:p>
+          <a:p>
+            <a:pPr marL="285750" indent="-285750">
+              <a:buFont typeface="Arial" panose="020B0604020202020204" pitchFamily="34" charset="0"/>
+              <a:buChar char="•"/>
+            </a:pPr>
+            <a:r>
+              <a:rPr lang="en-US" dirty="0"/>
+              <a:t>Fine Tuning</a:t>
+            </a:r>
+            <a:endParaRPr lang="en-CA" dirty="0"/>
+          </a:p>
+        </p:txBody>
+      </p:sp>
+    </p:spTree>
+    <p:extLst>
+      <p:ext uri="{BB962C8B-B14F-4D97-AF65-F5344CB8AC3E}">
+        <p14:creationId xmlns:p14="http://schemas.microsoft.com/office/powerpoint/2010/main" val="2298539802"/>
+      </p:ext>
+    </p:extLst>
+  </p:cSld>
+  <p:clrMapOvr>
+    <a:masterClrMapping/>
+  </p:clrMapOvr>
+</p:sld>
+</file>
+
+<file path=ppt/slides/slide5.xml><?xml version="1.0" encoding="utf-8"?>
 <p:sld xmlns:a="http://schemas.openxmlformats.org/drawingml/2006/main" xmlns:r="http://schemas.openxmlformats.org/officeDocument/2006/relationships" xmlns:p="http://schemas.openxmlformats.org/presentationml/2006/main">
   <p:cSld>
     <p:spTree>
@@ -4484,7 +5365,7 @@
 </p:sld>
 </file>
 
-<file path=ppt/slides/slide5.xml><?xml version="1.0" encoding="utf-8"?>
+<file path=ppt/slides/slide6.xml><?xml version="1.0" encoding="utf-8"?>
 <p:sld xmlns:a="http://schemas.openxmlformats.org/drawingml/2006/main" xmlns:r="http://schemas.openxmlformats.org/officeDocument/2006/relationships" xmlns:p="http://schemas.openxmlformats.org/presentationml/2006/main">
   <p:cSld>
     <p:spTree>
@@ -4554,7 +5435,9 @@
           </a:xfrm>
         </p:spPr>
         <p:txBody>
-          <a:bodyPr/>
+          <a:bodyPr>
+            <a:normAutofit lnSpcReduction="10000"/>
+          </a:bodyPr>
           <a:lstStyle/>
           <a:p>
             <a:pPr marL="0" indent="0" algn="ctr">
@@ -4575,6 +5458,18 @@
             <a:r>
               <a:rPr lang="en-US" dirty="0"/>
               <a:t>Stats CREA – MLS Home Price Index </a:t>
+            </a:r>
+          </a:p>
+          <a:p>
+            <a:r>
+              <a:rPr lang="en-US" dirty="0"/>
+              <a:t>Statistics Canada – Consumer Price Index (Shelters)</a:t>
+            </a:r>
+          </a:p>
+          <a:p>
+            <a:r>
+              <a:rPr lang="en-US" dirty="0"/>
+              <a:t>Statistics Canada – Mortgage Interest Rates</a:t>
             </a:r>
           </a:p>
           <a:p>
@@ -4661,7 +5556,7 @@
 </p:sld>
 </file>
 
-<file path=ppt/slides/slide6.xml><?xml version="1.0" encoding="utf-8"?>
+<file path=ppt/slides/slide7.xml><?xml version="1.0" encoding="utf-8"?>
 <p:sld xmlns:a="http://schemas.openxmlformats.org/drawingml/2006/main" xmlns:r="http://schemas.openxmlformats.org/officeDocument/2006/relationships" xmlns:p="http://schemas.openxmlformats.org/presentationml/2006/main">
   <p:cSld>
     <p:spTree>
@@ -4758,6 +5653,12 @@
             <a:r>
               <a:rPr lang="en-US" dirty="0"/>
               <a:t>Overfitting data</a:t>
+            </a:r>
+          </a:p>
+          <a:p>
+            <a:r>
+              <a:rPr lang="en-US" dirty="0"/>
+              <a:t>Weird Data Formats</a:t>
             </a:r>
           </a:p>
           <a:p>
@@ -4983,6 +5884,12 @@
           </a:p>
           <a:p>
             <a:r>
+              <a:rPr lang="en-US" dirty="0"/>
+              <a:t>Transpose data to one table</a:t>
+            </a:r>
+          </a:p>
+          <a:p>
+            <a:r>
               <a:rPr lang="en-CA" b="1" u="sng" dirty="0"/>
               <a:t>Not sure yet</a:t>
             </a:r>
@@ -5002,7 +5909,7 @@
 </p:sld>
 </file>
 
-<file path=ppt/slides/slide7.xml><?xml version="1.0" encoding="utf-8"?>
+<file path=ppt/slides/slide8.xml><?xml version="1.0" encoding="utf-8"?>
 <p:sld xmlns:a="http://schemas.openxmlformats.org/drawingml/2006/main" xmlns:r="http://schemas.openxmlformats.org/officeDocument/2006/relationships" xmlns:p="http://schemas.openxmlformats.org/presentationml/2006/main">
   <p:cSld>
     <p:spTree>
@@ -5068,7 +5975,7 @@
         <p:spPr>
           <a:xfrm>
             <a:off x="838200" y="1825625"/>
-            <a:ext cx="4836207" cy="4351338"/>
+            <a:ext cx="4836207" cy="2445750"/>
           </a:xfrm>
         </p:spPr>
         <p:txBody>
@@ -5100,13 +6007,6 @@
               <a:rPr lang="en-US" dirty="0"/>
               <a:t>Random Forest Regression</a:t>
             </a:r>
-          </a:p>
-          <a:p>
-            <a:r>
-              <a:rPr lang="en-US" dirty="0"/>
-              <a:t>Lasso regression</a:t>
-            </a:r>
-            <a:endParaRPr lang="en-CA" dirty="0"/>
           </a:p>
         </p:txBody>
       </p:sp>
@@ -5138,8 +6038,8 @@
         </p:blipFill>
         <p:spPr>
           <a:xfrm>
-            <a:off x="6096000" y="1585912"/>
-            <a:ext cx="2257174" cy="1843088"/>
+            <a:off x="5883056" y="1500649"/>
+            <a:ext cx="2221283" cy="1813782"/>
           </a:xfrm>
           <a:prstGeom prst="rect">
             <a:avLst/>
@@ -5204,8 +6104,8 @@
         </p:blipFill>
         <p:spPr>
           <a:xfrm>
-            <a:off x="8774767" y="2449772"/>
-            <a:ext cx="3067680" cy="1946715"/>
+            <a:off x="7327595" y="3543570"/>
+            <a:ext cx="3919734" cy="2487419"/>
           </a:xfrm>
           <a:prstGeom prst="rect">
             <a:avLst/>
@@ -5242,6 +6142,66 @@
           </a:sp3d>
         </p:spPr>
       </p:pic>
+      <p:pic>
+        <p:nvPicPr>
+          <p:cNvPr id="5" name="Picture 4" descr="Real Forest">
+            <a:extLst>
+              <a:ext uri="{FF2B5EF4-FFF2-40B4-BE49-F238E27FC236}">
+                <a16:creationId xmlns:a16="http://schemas.microsoft.com/office/drawing/2014/main" id="{86964966-39BB-5C1E-965C-A52900EFDDD1}"/>
+              </a:ext>
+            </a:extLst>
+          </p:cNvPr>
+          <p:cNvPicPr>
+            <a:picLocks noChangeAspect="1"/>
+          </p:cNvPicPr>
+          <p:nvPr/>
+        </p:nvPicPr>
+        <p:blipFill>
+          <a:blip r:embed="rId4">
+            <a:extLst>
+              <a:ext uri="{28A0092B-C50C-407E-A947-70E740481C1C}">
+                <a14:useLocalDpi xmlns:a14="http://schemas.microsoft.com/office/drawing/2010/main" val="0"/>
+              </a:ext>
+            </a:extLst>
+          </a:blip>
+          <a:stretch>
+            <a:fillRect/>
+          </a:stretch>
+        </p:blipFill>
+        <p:spPr>
+          <a:xfrm>
+            <a:off x="1578278" y="4169044"/>
+            <a:ext cx="3630045" cy="2410577"/>
+          </a:xfrm>
+          <a:prstGeom prst="rect">
+            <a:avLst/>
+          </a:prstGeom>
+          <a:ln w="127000" cap="rnd">
+            <a:solidFill>
+              <a:srgbClr val="FFFFFF"/>
+            </a:solidFill>
+          </a:ln>
+          <a:effectLst>
+            <a:outerShdw blurRad="76200" dist="95250" dir="10500000" sx="97000" sy="23000" kx="900000" algn="br" rotWithShape="0">
+              <a:srgbClr val="000000">
+                <a:alpha val="20000"/>
+              </a:srgbClr>
+            </a:outerShdw>
+          </a:effectLst>
+          <a:scene3d>
+            <a:camera prst="orthographicFront"/>
+            <a:lightRig rig="twoPt" dir="t">
+              <a:rot lat="0" lon="0" rev="7800000"/>
+            </a:lightRig>
+          </a:scene3d>
+          <a:sp3d contourW="6350">
+            <a:bevelT w="50800" h="16510"/>
+            <a:contourClr>
+              <a:srgbClr val="C0C0C0"/>
+            </a:contourClr>
+          </a:sp3d>
+        </p:spPr>
+      </p:pic>
     </p:spTree>
     <p:extLst>
       <p:ext uri="{BB962C8B-B14F-4D97-AF65-F5344CB8AC3E}">
@@ -5255,7 +6215,7 @@
 </p:sld>
 </file>
 
-<file path=ppt/slides/slide8.xml><?xml version="1.0" encoding="utf-8"?>
+<file path=ppt/slides/slide9.xml><?xml version="1.0" encoding="utf-8"?>
 <p:sld xmlns:a="http://schemas.openxmlformats.org/drawingml/2006/main" xmlns:r="http://schemas.openxmlformats.org/officeDocument/2006/relationships" xmlns:p="http://schemas.openxmlformats.org/presentationml/2006/main">
   <p:cSld>
     <p:spTree>
@@ -5333,9 +6293,41 @@
             </a:pPr>
             <a:r>
               <a:rPr lang="en-US" b="1" dirty="0"/>
-              <a:t>Place holder</a:t>
-            </a:r>
-            <a:endParaRPr lang="en-CA" b="1" dirty="0"/>
+              <a:t>Training</a:t>
+            </a:r>
+          </a:p>
+          <a:p>
+            <a:r>
+              <a:rPr lang="en-US" sz="1800" dirty="0"/>
+              <a:t>Break the HPI, CPI, and Interest Rates into features</a:t>
+            </a:r>
+          </a:p>
+          <a:p>
+            <a:r>
+              <a:rPr lang="en-US" sz="1800" dirty="0"/>
+              <a:t>Divide up the sets into training and test sets</a:t>
+            </a:r>
+          </a:p>
+          <a:p>
+            <a:pPr marL="0" indent="0" algn="ctr">
+              <a:buNone/>
+            </a:pPr>
+            <a:r>
+              <a:rPr lang="en-US" sz="2400" b="1" dirty="0"/>
+              <a:t>Evaluation</a:t>
+            </a:r>
+          </a:p>
+          <a:p>
+            <a:r>
+              <a:rPr lang="en-CA" sz="1800" dirty="0"/>
+              <a:t>Mean Squared Error – Percent Accuracy</a:t>
+            </a:r>
+          </a:p>
+          <a:p>
+            <a:r>
+              <a:rPr lang="en-CA" sz="1800" dirty="0"/>
+              <a:t>R-Squared Score – Percent of Relationship between Dependant and Independent variables</a:t>
+            </a:r>
           </a:p>
         </p:txBody>
       </p:sp>
@@ -5544,567 +6536,6 @@
     <p:extLst>
       <p:ext uri="{BB962C8B-B14F-4D97-AF65-F5344CB8AC3E}">
         <p14:creationId xmlns:p14="http://schemas.microsoft.com/office/powerpoint/2010/main" val="865718683"/>
-      </p:ext>
-    </p:extLst>
-  </p:cSld>
-  <p:clrMapOvr>
-    <a:masterClrMapping/>
-  </p:clrMapOvr>
-</p:sld>
-</file>
-
-<file path=ppt/slides/slide9.xml><?xml version="1.0" encoding="utf-8"?>
-<p:sld xmlns:a="http://schemas.openxmlformats.org/drawingml/2006/main" xmlns:r="http://schemas.openxmlformats.org/officeDocument/2006/relationships" xmlns:p="http://schemas.openxmlformats.org/presentationml/2006/main">
-  <p:cSld>
-    <p:spTree>
-      <p:nvGrpSpPr>
-        <p:cNvPr id="1" name=""/>
-        <p:cNvGrpSpPr/>
-        <p:nvPr/>
-      </p:nvGrpSpPr>
-      <p:grpSpPr>
-        <a:xfrm>
-          <a:off x="0" y="0"/>
-          <a:ext cx="0" cy="0"/>
-          <a:chOff x="0" y="0"/>
-          <a:chExt cx="0" cy="0"/>
-        </a:xfrm>
-      </p:grpSpPr>
-      <p:sp>
-        <p:nvSpPr>
-          <p:cNvPr id="2" name="Title 1">
-            <a:extLst>
-              <a:ext uri="{FF2B5EF4-FFF2-40B4-BE49-F238E27FC236}">
-                <a16:creationId xmlns:a16="http://schemas.microsoft.com/office/drawing/2014/main" id="{52AC7041-8E7C-B59E-FEC1-4B16CE386AE0}"/>
-              </a:ext>
-            </a:extLst>
-          </p:cNvPr>
-          <p:cNvSpPr>
-            <a:spLocks noGrp="1"/>
-          </p:cNvSpPr>
-          <p:nvPr>
-            <p:ph type="title"/>
-          </p:nvPr>
-        </p:nvSpPr>
-        <p:spPr/>
-        <p:txBody>
-          <a:bodyPr/>
-          <a:lstStyle/>
-          <a:p>
-            <a:pPr algn="ctr"/>
-            <a:r>
-              <a:rPr lang="en-US" b="1" dirty="0"/>
-              <a:t>Methodology – Hyperparameter Tuning</a:t>
-            </a:r>
-            <a:endParaRPr lang="en-CA" b="1" dirty="0"/>
-          </a:p>
-        </p:txBody>
-      </p:sp>
-      <p:sp>
-        <p:nvSpPr>
-          <p:cNvPr id="3" name="Content Placeholder 2">
-            <a:extLst>
-              <a:ext uri="{FF2B5EF4-FFF2-40B4-BE49-F238E27FC236}">
-                <a16:creationId xmlns:a16="http://schemas.microsoft.com/office/drawing/2014/main" id="{FDE586A0-8DCF-408E-9ECB-45EF619B717D}"/>
-              </a:ext>
-            </a:extLst>
-          </p:cNvPr>
-          <p:cNvSpPr>
-            <a:spLocks noGrp="1"/>
-          </p:cNvSpPr>
-          <p:nvPr>
-            <p:ph idx="1"/>
-          </p:nvPr>
-        </p:nvSpPr>
-        <p:spPr>
-          <a:xfrm>
-            <a:off x="393818" y="1687514"/>
-            <a:ext cx="3708163" cy="2635280"/>
-          </a:xfrm>
-        </p:spPr>
-        <p:txBody>
-          <a:bodyPr/>
-          <a:lstStyle/>
-          <a:p>
-            <a:pPr marL="0" indent="0" algn="ctr">
-              <a:buNone/>
-            </a:pPr>
-            <a:r>
-              <a:rPr lang="en-US" b="1" u="sng" dirty="0"/>
-              <a:t>Options</a:t>
-            </a:r>
-          </a:p>
-          <a:p>
-            <a:r>
-              <a:rPr lang="en-US" dirty="0"/>
-              <a:t>Manual or Automated</a:t>
-            </a:r>
-          </a:p>
-          <a:p>
-            <a:r>
-              <a:rPr lang="en-US" dirty="0"/>
-              <a:t>Bayesian Optimization</a:t>
-            </a:r>
-          </a:p>
-          <a:p>
-            <a:r>
-              <a:rPr lang="en-US" dirty="0"/>
-              <a:t>Grid Search</a:t>
-            </a:r>
-          </a:p>
-          <a:p>
-            <a:r>
-              <a:rPr lang="en-US" dirty="0"/>
-              <a:t>Random Search</a:t>
-            </a:r>
-          </a:p>
-        </p:txBody>
-      </p:sp>
-      <p:sp>
-        <p:nvSpPr>
-          <p:cNvPr id="4" name="Content Placeholder 2">
-            <a:extLst>
-              <a:ext uri="{FF2B5EF4-FFF2-40B4-BE49-F238E27FC236}">
-                <a16:creationId xmlns:a16="http://schemas.microsoft.com/office/drawing/2014/main" id="{6F78DA9B-8BDF-BCB8-9B08-17CC6EC6466E}"/>
-              </a:ext>
-            </a:extLst>
-          </p:cNvPr>
-          <p:cNvSpPr txBox="1">
-            <a:spLocks/>
-          </p:cNvSpPr>
-          <p:nvPr/>
-        </p:nvSpPr>
-        <p:spPr>
-          <a:xfrm>
-            <a:off x="8471022" y="1911566"/>
-            <a:ext cx="3327160" cy="2187175"/>
-          </a:xfrm>
-          <a:prstGeom prst="rect">
-            <a:avLst/>
-          </a:prstGeom>
-        </p:spPr>
-        <p:txBody>
-          <a:bodyPr vert="horz" lIns="91440" tIns="45720" rIns="91440" bIns="45720" rtlCol="0">
-            <a:normAutofit fontScale="92500" lnSpcReduction="10000"/>
-          </a:bodyPr>
-          <a:lstStyle>
-            <a:lvl1pPr marL="228600" indent="-228600" algn="l" defTabSz="914400" rtl="0" eaLnBrk="1" latinLnBrk="0" hangingPunct="1">
-              <a:lnSpc>
-                <a:spcPct val="90000"/>
-              </a:lnSpc>
-              <a:spcBef>
-                <a:spcPts val="1000"/>
-              </a:spcBef>
-              <a:buFont typeface="Arial" panose="020B0604020202020204" pitchFamily="34" charset="0"/>
-              <a:buChar char="•"/>
-              <a:defRPr sz="2800" kern="1200">
-                <a:solidFill>
-                  <a:schemeClr val="tx1"/>
-                </a:solidFill>
-                <a:latin typeface="+mn-lt"/>
-                <a:ea typeface="+mn-ea"/>
-                <a:cs typeface="+mn-cs"/>
-              </a:defRPr>
-            </a:lvl1pPr>
-            <a:lvl2pPr marL="685800" indent="-228600" algn="l" defTabSz="914400" rtl="0" eaLnBrk="1" latinLnBrk="0" hangingPunct="1">
-              <a:lnSpc>
-                <a:spcPct val="90000"/>
-              </a:lnSpc>
-              <a:spcBef>
-                <a:spcPts val="500"/>
-              </a:spcBef>
-              <a:buFont typeface="Arial" panose="020B0604020202020204" pitchFamily="34" charset="0"/>
-              <a:buChar char="•"/>
-              <a:defRPr sz="2400" kern="1200">
-                <a:solidFill>
-                  <a:schemeClr val="tx1"/>
-                </a:solidFill>
-                <a:latin typeface="+mn-lt"/>
-                <a:ea typeface="+mn-ea"/>
-                <a:cs typeface="+mn-cs"/>
-              </a:defRPr>
-            </a:lvl2pPr>
-            <a:lvl3pPr marL="1143000" indent="-228600" algn="l" defTabSz="914400" rtl="0" eaLnBrk="1" latinLnBrk="0" hangingPunct="1">
-              <a:lnSpc>
-                <a:spcPct val="90000"/>
-              </a:lnSpc>
-              <a:spcBef>
-                <a:spcPts val="500"/>
-              </a:spcBef>
-              <a:buFont typeface="Arial" panose="020B0604020202020204" pitchFamily="34" charset="0"/>
-              <a:buChar char="•"/>
-              <a:defRPr sz="2000" kern="1200">
-                <a:solidFill>
-                  <a:schemeClr val="tx1"/>
-                </a:solidFill>
-                <a:latin typeface="+mn-lt"/>
-                <a:ea typeface="+mn-ea"/>
-                <a:cs typeface="+mn-cs"/>
-              </a:defRPr>
-            </a:lvl3pPr>
-            <a:lvl4pPr marL="1600200" indent="-228600" algn="l" defTabSz="914400" rtl="0" eaLnBrk="1" latinLnBrk="0" hangingPunct="1">
-              <a:lnSpc>
-                <a:spcPct val="90000"/>
-              </a:lnSpc>
-              <a:spcBef>
-                <a:spcPts val="500"/>
-              </a:spcBef>
-              <a:buFont typeface="Arial" panose="020B0604020202020204" pitchFamily="34" charset="0"/>
-              <a:buChar char="•"/>
-              <a:defRPr sz="1800" kern="1200">
-                <a:solidFill>
-                  <a:schemeClr val="tx1"/>
-                </a:solidFill>
-                <a:latin typeface="+mn-lt"/>
-                <a:ea typeface="+mn-ea"/>
-                <a:cs typeface="+mn-cs"/>
-              </a:defRPr>
-            </a:lvl4pPr>
-            <a:lvl5pPr marL="2057400" indent="-228600" algn="l" defTabSz="914400" rtl="0" eaLnBrk="1" latinLnBrk="0" hangingPunct="1">
-              <a:lnSpc>
-                <a:spcPct val="90000"/>
-              </a:lnSpc>
-              <a:spcBef>
-                <a:spcPts val="500"/>
-              </a:spcBef>
-              <a:buFont typeface="Arial" panose="020B0604020202020204" pitchFamily="34" charset="0"/>
-              <a:buChar char="•"/>
-              <a:defRPr sz="1800" kern="1200">
-                <a:solidFill>
-                  <a:schemeClr val="tx1"/>
-                </a:solidFill>
-                <a:latin typeface="+mn-lt"/>
-                <a:ea typeface="+mn-ea"/>
-                <a:cs typeface="+mn-cs"/>
-              </a:defRPr>
-            </a:lvl5pPr>
-            <a:lvl6pPr marL="2514600" indent="-228600" algn="l" defTabSz="914400" rtl="0" eaLnBrk="1" latinLnBrk="0" hangingPunct="1">
-              <a:lnSpc>
-                <a:spcPct val="90000"/>
-              </a:lnSpc>
-              <a:spcBef>
-                <a:spcPts val="500"/>
-              </a:spcBef>
-              <a:buFont typeface="Arial" panose="020B0604020202020204" pitchFamily="34" charset="0"/>
-              <a:buChar char="•"/>
-              <a:defRPr sz="1800" kern="1200">
-                <a:solidFill>
-                  <a:schemeClr val="tx1"/>
-                </a:solidFill>
-                <a:latin typeface="+mn-lt"/>
-                <a:ea typeface="+mn-ea"/>
-                <a:cs typeface="+mn-cs"/>
-              </a:defRPr>
-            </a:lvl6pPr>
-            <a:lvl7pPr marL="2971800" indent="-228600" algn="l" defTabSz="914400" rtl="0" eaLnBrk="1" latinLnBrk="0" hangingPunct="1">
-              <a:lnSpc>
-                <a:spcPct val="90000"/>
-              </a:lnSpc>
-              <a:spcBef>
-                <a:spcPts val="500"/>
-              </a:spcBef>
-              <a:buFont typeface="Arial" panose="020B0604020202020204" pitchFamily="34" charset="0"/>
-              <a:buChar char="•"/>
-              <a:defRPr sz="1800" kern="1200">
-                <a:solidFill>
-                  <a:schemeClr val="tx1"/>
-                </a:solidFill>
-                <a:latin typeface="+mn-lt"/>
-                <a:ea typeface="+mn-ea"/>
-                <a:cs typeface="+mn-cs"/>
-              </a:defRPr>
-            </a:lvl7pPr>
-            <a:lvl8pPr marL="3429000" indent="-228600" algn="l" defTabSz="914400" rtl="0" eaLnBrk="1" latinLnBrk="0" hangingPunct="1">
-              <a:lnSpc>
-                <a:spcPct val="90000"/>
-              </a:lnSpc>
-              <a:spcBef>
-                <a:spcPts val="500"/>
-              </a:spcBef>
-              <a:buFont typeface="Arial" panose="020B0604020202020204" pitchFamily="34" charset="0"/>
-              <a:buChar char="•"/>
-              <a:defRPr sz="1800" kern="1200">
-                <a:solidFill>
-                  <a:schemeClr val="tx1"/>
-                </a:solidFill>
-                <a:latin typeface="+mn-lt"/>
-                <a:ea typeface="+mn-ea"/>
-                <a:cs typeface="+mn-cs"/>
-              </a:defRPr>
-            </a:lvl8pPr>
-            <a:lvl9pPr marL="3886200" indent="-228600" algn="l" defTabSz="914400" rtl="0" eaLnBrk="1" latinLnBrk="0" hangingPunct="1">
-              <a:lnSpc>
-                <a:spcPct val="90000"/>
-              </a:lnSpc>
-              <a:spcBef>
-                <a:spcPts val="500"/>
-              </a:spcBef>
-              <a:buFont typeface="Arial" panose="020B0604020202020204" pitchFamily="34" charset="0"/>
-              <a:buChar char="•"/>
-              <a:defRPr sz="1800" kern="1200">
-                <a:solidFill>
-                  <a:schemeClr val="tx1"/>
-                </a:solidFill>
-                <a:latin typeface="+mn-lt"/>
-                <a:ea typeface="+mn-ea"/>
-                <a:cs typeface="+mn-cs"/>
-              </a:defRPr>
-            </a:lvl9pPr>
-          </a:lstStyle>
-          <a:p>
-            <a:pPr marL="0" indent="0" algn="ctr">
-              <a:buFont typeface="Arial" panose="020B0604020202020204" pitchFamily="34" charset="0"/>
-              <a:buNone/>
-            </a:pPr>
-            <a:r>
-              <a:rPr lang="en-US" b="1" u="sng" dirty="0"/>
-              <a:t>End Goal</a:t>
-            </a:r>
-          </a:p>
-          <a:p>
-            <a:pPr marL="0" indent="0">
-              <a:buFont typeface="Arial" panose="020B0604020202020204" pitchFamily="34" charset="0"/>
-              <a:buNone/>
-            </a:pPr>
-            <a:r>
-              <a:rPr lang="en-US" dirty="0"/>
-              <a:t>    To have a more efficient model with more accurate results. And not need a super-computer to process.</a:t>
-            </a:r>
-            <a:endParaRPr lang="en-US" b="1" u="sng" dirty="0"/>
-          </a:p>
-        </p:txBody>
-      </p:sp>
-      <p:sp>
-        <p:nvSpPr>
-          <p:cNvPr id="5" name="Content Placeholder 2">
-            <a:extLst>
-              <a:ext uri="{FF2B5EF4-FFF2-40B4-BE49-F238E27FC236}">
-                <a16:creationId xmlns:a16="http://schemas.microsoft.com/office/drawing/2014/main" id="{F4A16E5B-D7D9-49AD-AE31-A1F158320F3F}"/>
-              </a:ext>
-            </a:extLst>
-          </p:cNvPr>
-          <p:cNvSpPr txBox="1">
-            <a:spLocks/>
-          </p:cNvSpPr>
-          <p:nvPr/>
-        </p:nvSpPr>
-        <p:spPr>
-          <a:xfrm>
-            <a:off x="4876089" y="1687513"/>
-            <a:ext cx="2820824" cy="2635280"/>
-          </a:xfrm>
-          <a:prstGeom prst="rect">
-            <a:avLst/>
-          </a:prstGeom>
-        </p:spPr>
-        <p:txBody>
-          <a:bodyPr vert="horz" lIns="91440" tIns="45720" rIns="91440" bIns="45720" rtlCol="0">
-            <a:normAutofit/>
-          </a:bodyPr>
-          <a:lstStyle>
-            <a:lvl1pPr marL="228600" indent="-228600" algn="l" defTabSz="914400" rtl="0" eaLnBrk="1" latinLnBrk="0" hangingPunct="1">
-              <a:lnSpc>
-                <a:spcPct val="90000"/>
-              </a:lnSpc>
-              <a:spcBef>
-                <a:spcPts val="1000"/>
-              </a:spcBef>
-              <a:buFont typeface="Arial" panose="020B0604020202020204" pitchFamily="34" charset="0"/>
-              <a:buChar char="•"/>
-              <a:defRPr sz="2800" kern="1200">
-                <a:solidFill>
-                  <a:schemeClr val="tx1"/>
-                </a:solidFill>
-                <a:latin typeface="+mn-lt"/>
-                <a:ea typeface="+mn-ea"/>
-                <a:cs typeface="+mn-cs"/>
-              </a:defRPr>
-            </a:lvl1pPr>
-            <a:lvl2pPr marL="685800" indent="-228600" algn="l" defTabSz="914400" rtl="0" eaLnBrk="1" latinLnBrk="0" hangingPunct="1">
-              <a:lnSpc>
-                <a:spcPct val="90000"/>
-              </a:lnSpc>
-              <a:spcBef>
-                <a:spcPts val="500"/>
-              </a:spcBef>
-              <a:buFont typeface="Arial" panose="020B0604020202020204" pitchFamily="34" charset="0"/>
-              <a:buChar char="•"/>
-              <a:defRPr sz="2400" kern="1200">
-                <a:solidFill>
-                  <a:schemeClr val="tx1"/>
-                </a:solidFill>
-                <a:latin typeface="+mn-lt"/>
-                <a:ea typeface="+mn-ea"/>
-                <a:cs typeface="+mn-cs"/>
-              </a:defRPr>
-            </a:lvl2pPr>
-            <a:lvl3pPr marL="1143000" indent="-228600" algn="l" defTabSz="914400" rtl="0" eaLnBrk="1" latinLnBrk="0" hangingPunct="1">
-              <a:lnSpc>
-                <a:spcPct val="90000"/>
-              </a:lnSpc>
-              <a:spcBef>
-                <a:spcPts val="500"/>
-              </a:spcBef>
-              <a:buFont typeface="Arial" panose="020B0604020202020204" pitchFamily="34" charset="0"/>
-              <a:buChar char="•"/>
-              <a:defRPr sz="2000" kern="1200">
-                <a:solidFill>
-                  <a:schemeClr val="tx1"/>
-                </a:solidFill>
-                <a:latin typeface="+mn-lt"/>
-                <a:ea typeface="+mn-ea"/>
-                <a:cs typeface="+mn-cs"/>
-              </a:defRPr>
-            </a:lvl3pPr>
-            <a:lvl4pPr marL="1600200" indent="-228600" algn="l" defTabSz="914400" rtl="0" eaLnBrk="1" latinLnBrk="0" hangingPunct="1">
-              <a:lnSpc>
-                <a:spcPct val="90000"/>
-              </a:lnSpc>
-              <a:spcBef>
-                <a:spcPts val="500"/>
-              </a:spcBef>
-              <a:buFont typeface="Arial" panose="020B0604020202020204" pitchFamily="34" charset="0"/>
-              <a:buChar char="•"/>
-              <a:defRPr sz="1800" kern="1200">
-                <a:solidFill>
-                  <a:schemeClr val="tx1"/>
-                </a:solidFill>
-                <a:latin typeface="+mn-lt"/>
-                <a:ea typeface="+mn-ea"/>
-                <a:cs typeface="+mn-cs"/>
-              </a:defRPr>
-            </a:lvl4pPr>
-            <a:lvl5pPr marL="2057400" indent="-228600" algn="l" defTabSz="914400" rtl="0" eaLnBrk="1" latinLnBrk="0" hangingPunct="1">
-              <a:lnSpc>
-                <a:spcPct val="90000"/>
-              </a:lnSpc>
-              <a:spcBef>
-                <a:spcPts val="500"/>
-              </a:spcBef>
-              <a:buFont typeface="Arial" panose="020B0604020202020204" pitchFamily="34" charset="0"/>
-              <a:buChar char="•"/>
-              <a:defRPr sz="1800" kern="1200">
-                <a:solidFill>
-                  <a:schemeClr val="tx1"/>
-                </a:solidFill>
-                <a:latin typeface="+mn-lt"/>
-                <a:ea typeface="+mn-ea"/>
-                <a:cs typeface="+mn-cs"/>
-              </a:defRPr>
-            </a:lvl5pPr>
-            <a:lvl6pPr marL="2514600" indent="-228600" algn="l" defTabSz="914400" rtl="0" eaLnBrk="1" latinLnBrk="0" hangingPunct="1">
-              <a:lnSpc>
-                <a:spcPct val="90000"/>
-              </a:lnSpc>
-              <a:spcBef>
-                <a:spcPts val="500"/>
-              </a:spcBef>
-              <a:buFont typeface="Arial" panose="020B0604020202020204" pitchFamily="34" charset="0"/>
-              <a:buChar char="•"/>
-              <a:defRPr sz="1800" kern="1200">
-                <a:solidFill>
-                  <a:schemeClr val="tx1"/>
-                </a:solidFill>
-                <a:latin typeface="+mn-lt"/>
-                <a:ea typeface="+mn-ea"/>
-                <a:cs typeface="+mn-cs"/>
-              </a:defRPr>
-            </a:lvl6pPr>
-            <a:lvl7pPr marL="2971800" indent="-228600" algn="l" defTabSz="914400" rtl="0" eaLnBrk="1" latinLnBrk="0" hangingPunct="1">
-              <a:lnSpc>
-                <a:spcPct val="90000"/>
-              </a:lnSpc>
-              <a:spcBef>
-                <a:spcPts val="500"/>
-              </a:spcBef>
-              <a:buFont typeface="Arial" panose="020B0604020202020204" pitchFamily="34" charset="0"/>
-              <a:buChar char="•"/>
-              <a:defRPr sz="1800" kern="1200">
-                <a:solidFill>
-                  <a:schemeClr val="tx1"/>
-                </a:solidFill>
-                <a:latin typeface="+mn-lt"/>
-                <a:ea typeface="+mn-ea"/>
-                <a:cs typeface="+mn-cs"/>
-              </a:defRPr>
-            </a:lvl7pPr>
-            <a:lvl8pPr marL="3429000" indent="-228600" algn="l" defTabSz="914400" rtl="0" eaLnBrk="1" latinLnBrk="0" hangingPunct="1">
-              <a:lnSpc>
-                <a:spcPct val="90000"/>
-              </a:lnSpc>
-              <a:spcBef>
-                <a:spcPts val="500"/>
-              </a:spcBef>
-              <a:buFont typeface="Arial" panose="020B0604020202020204" pitchFamily="34" charset="0"/>
-              <a:buChar char="•"/>
-              <a:defRPr sz="1800" kern="1200">
-                <a:solidFill>
-                  <a:schemeClr val="tx1"/>
-                </a:solidFill>
-                <a:latin typeface="+mn-lt"/>
-                <a:ea typeface="+mn-ea"/>
-                <a:cs typeface="+mn-cs"/>
-              </a:defRPr>
-            </a:lvl8pPr>
-            <a:lvl9pPr marL="3886200" indent="-228600" algn="l" defTabSz="914400" rtl="0" eaLnBrk="1" latinLnBrk="0" hangingPunct="1">
-              <a:lnSpc>
-                <a:spcPct val="90000"/>
-              </a:lnSpc>
-              <a:spcBef>
-                <a:spcPts val="500"/>
-              </a:spcBef>
-              <a:buFont typeface="Arial" panose="020B0604020202020204" pitchFamily="34" charset="0"/>
-              <a:buChar char="•"/>
-              <a:defRPr sz="1800" kern="1200">
-                <a:solidFill>
-                  <a:schemeClr val="tx1"/>
-                </a:solidFill>
-                <a:latin typeface="+mn-lt"/>
-                <a:ea typeface="+mn-ea"/>
-                <a:cs typeface="+mn-cs"/>
-              </a:defRPr>
-            </a:lvl9pPr>
-          </a:lstStyle>
-          <a:p>
-            <a:pPr marL="0" indent="0" algn="ctr">
-              <a:buFont typeface="Arial" panose="020B0604020202020204" pitchFamily="34" charset="0"/>
-              <a:buNone/>
-            </a:pPr>
-            <a:r>
-              <a:rPr lang="en-US" b="1" u="sng" dirty="0"/>
-              <a:t>Available Tweaks</a:t>
-            </a:r>
-          </a:p>
-          <a:p>
-            <a:r>
-              <a:rPr lang="en-US" dirty="0"/>
-              <a:t>Learning Rate</a:t>
-            </a:r>
-          </a:p>
-          <a:p>
-            <a:r>
-              <a:rPr lang="en-US" dirty="0"/>
-              <a:t>Rate Decay</a:t>
-            </a:r>
-          </a:p>
-          <a:p>
-            <a:r>
-              <a:rPr lang="en-US" dirty="0"/>
-              <a:t>Momentum</a:t>
-            </a:r>
-          </a:p>
-          <a:p>
-            <a:r>
-              <a:rPr lang="en-US" dirty="0"/>
-              <a:t>Data Sizes</a:t>
-            </a:r>
-          </a:p>
-        </p:txBody>
-      </p:sp>
-    </p:spTree>
-    <p:extLst>
-      <p:ext uri="{BB962C8B-B14F-4D97-AF65-F5344CB8AC3E}">
-        <p14:creationId xmlns:p14="http://schemas.microsoft.com/office/powerpoint/2010/main" val="3327013567"/>
       </p:ext>
     </p:extLst>
   </p:cSld>

</xml_diff>

<commit_message>
-Finalized the presentation and archive for submission
P@ (Ray e-mailed presentation back)

Signed-off-by: P@ <patmaynard452@gmail.com>
</commit_message>
<xml_diff>
--- a/Presentation/Presentation_1.pptx
+++ b/Presentation/Presentation_1.pptx
@@ -16,6 +16,7 @@
     <p:sldId id="263" r:id="rId10"/>
     <p:sldId id="264" r:id="rId11"/>
     <p:sldId id="265" r:id="rId12"/>
+    <p:sldId id="267" r:id="rId13"/>
   </p:sldIdLst>
   <p:sldSz cx="12192000" cy="6858000"/>
   <p:notesSz cx="6858000" cy="9144000"/>
@@ -271,7 +272,7 @@
           <a:p>
             <a:fld id="{B8925DE7-249B-45F1-B0F9-77BC9CF6C486}" type="datetimeFigureOut">
               <a:rPr lang="en-CA" smtClean="0"/>
-              <a:t>2024-02-11</a:t>
+              <a:t>2024-02-13</a:t>
             </a:fld>
             <a:endParaRPr lang="en-CA"/>
           </a:p>
@@ -471,7 +472,7 @@
           <a:p>
             <a:fld id="{B8925DE7-249B-45F1-B0F9-77BC9CF6C486}" type="datetimeFigureOut">
               <a:rPr lang="en-CA" smtClean="0"/>
-              <a:t>2024-02-11</a:t>
+              <a:t>2024-02-13</a:t>
             </a:fld>
             <a:endParaRPr lang="en-CA"/>
           </a:p>
@@ -681,7 +682,7 @@
           <a:p>
             <a:fld id="{B8925DE7-249B-45F1-B0F9-77BC9CF6C486}" type="datetimeFigureOut">
               <a:rPr lang="en-CA" smtClean="0"/>
-              <a:t>2024-02-11</a:t>
+              <a:t>2024-02-13</a:t>
             </a:fld>
             <a:endParaRPr lang="en-CA"/>
           </a:p>
@@ -881,7 +882,7 @@
           <a:p>
             <a:fld id="{B8925DE7-249B-45F1-B0F9-77BC9CF6C486}" type="datetimeFigureOut">
               <a:rPr lang="en-CA" smtClean="0"/>
-              <a:t>2024-02-11</a:t>
+              <a:t>2024-02-13</a:t>
             </a:fld>
             <a:endParaRPr lang="en-CA"/>
           </a:p>
@@ -1157,7 +1158,7 @@
           <a:p>
             <a:fld id="{B8925DE7-249B-45F1-B0F9-77BC9CF6C486}" type="datetimeFigureOut">
               <a:rPr lang="en-CA" smtClean="0"/>
-              <a:t>2024-02-11</a:t>
+              <a:t>2024-02-13</a:t>
             </a:fld>
             <a:endParaRPr lang="en-CA"/>
           </a:p>
@@ -1425,7 +1426,7 @@
           <a:p>
             <a:fld id="{B8925DE7-249B-45F1-B0F9-77BC9CF6C486}" type="datetimeFigureOut">
               <a:rPr lang="en-CA" smtClean="0"/>
-              <a:t>2024-02-11</a:t>
+              <a:t>2024-02-13</a:t>
             </a:fld>
             <a:endParaRPr lang="en-CA"/>
           </a:p>
@@ -1840,7 +1841,7 @@
           <a:p>
             <a:fld id="{B8925DE7-249B-45F1-B0F9-77BC9CF6C486}" type="datetimeFigureOut">
               <a:rPr lang="en-CA" smtClean="0"/>
-              <a:t>2024-02-11</a:t>
+              <a:t>2024-02-13</a:t>
             </a:fld>
             <a:endParaRPr lang="en-CA"/>
           </a:p>
@@ -1982,7 +1983,7 @@
           <a:p>
             <a:fld id="{B8925DE7-249B-45F1-B0F9-77BC9CF6C486}" type="datetimeFigureOut">
               <a:rPr lang="en-CA" smtClean="0"/>
-              <a:t>2024-02-11</a:t>
+              <a:t>2024-02-13</a:t>
             </a:fld>
             <a:endParaRPr lang="en-CA"/>
           </a:p>
@@ -2095,7 +2096,7 @@
           <a:p>
             <a:fld id="{B8925DE7-249B-45F1-B0F9-77BC9CF6C486}" type="datetimeFigureOut">
               <a:rPr lang="en-CA" smtClean="0"/>
-              <a:t>2024-02-11</a:t>
+              <a:t>2024-02-13</a:t>
             </a:fld>
             <a:endParaRPr lang="en-CA"/>
           </a:p>
@@ -2408,7 +2409,7 @@
           <a:p>
             <a:fld id="{B8925DE7-249B-45F1-B0F9-77BC9CF6C486}" type="datetimeFigureOut">
               <a:rPr lang="en-CA" smtClean="0"/>
-              <a:t>2024-02-11</a:t>
+              <a:t>2024-02-13</a:t>
             </a:fld>
             <a:endParaRPr lang="en-CA"/>
           </a:p>
@@ -2697,7 +2698,7 @@
           <a:p>
             <a:fld id="{B8925DE7-249B-45F1-B0F9-77BC9CF6C486}" type="datetimeFigureOut">
               <a:rPr lang="en-CA" smtClean="0"/>
-              <a:t>2024-02-11</a:t>
+              <a:t>2024-02-13</a:t>
             </a:fld>
             <a:endParaRPr lang="en-CA"/>
           </a:p>
@@ -2940,7 +2941,7 @@
           <a:p>
             <a:fld id="{B8925DE7-249B-45F1-B0F9-77BC9CF6C486}" type="datetimeFigureOut">
               <a:rPr lang="en-CA" smtClean="0"/>
-              <a:t>2024-02-11</a:t>
+              <a:t>2024-02-13</a:t>
             </a:fld>
             <a:endParaRPr lang="en-CA"/>
           </a:p>
@@ -3425,7 +3426,7 @@
           <a:p>
             <a:r>
               <a:rPr lang="en-US" dirty="0"/>
-              <a:t>Raymon Ali</a:t>
+              <a:t>Raymond Ali</a:t>
             </a:r>
             <a:endParaRPr lang="en-CA" dirty="0"/>
           </a:p>
@@ -4378,6 +4379,94 @@
 </p:sld>
 </file>
 
+<file path=ppt/slides/slide12.xml><?xml version="1.0" encoding="utf-8"?>
+<p:sld xmlns:a="http://schemas.openxmlformats.org/drawingml/2006/main" xmlns:r="http://schemas.openxmlformats.org/officeDocument/2006/relationships" xmlns:p="http://schemas.openxmlformats.org/presentationml/2006/main">
+  <p:cSld>
+    <p:spTree>
+      <p:nvGrpSpPr>
+        <p:cNvPr id="1" name=""/>
+        <p:cNvGrpSpPr/>
+        <p:nvPr/>
+      </p:nvGrpSpPr>
+      <p:grpSpPr>
+        <a:xfrm>
+          <a:off x="0" y="0"/>
+          <a:ext cx="0" cy="0"/>
+          <a:chOff x="0" y="0"/>
+          <a:chExt cx="0" cy="0"/>
+        </a:xfrm>
+      </p:grpSpPr>
+      <p:sp>
+        <p:nvSpPr>
+          <p:cNvPr id="2" name="Title 1">
+            <a:extLst>
+              <a:ext uri="{FF2B5EF4-FFF2-40B4-BE49-F238E27FC236}">
+                <a16:creationId xmlns:a16="http://schemas.microsoft.com/office/drawing/2014/main" id="{FF699D1C-8D49-07D9-787F-21E9A9A63DC9}"/>
+              </a:ext>
+            </a:extLst>
+          </p:cNvPr>
+          <p:cNvSpPr>
+            <a:spLocks noGrp="1"/>
+          </p:cNvSpPr>
+          <p:nvPr>
+            <p:ph type="ctrTitle"/>
+          </p:nvPr>
+        </p:nvSpPr>
+        <p:spPr/>
+        <p:txBody>
+          <a:bodyPr/>
+          <a:lstStyle/>
+          <a:p>
+            <a:r>
+              <a:rPr lang="en-US" dirty="0"/>
+              <a:t>Thank you</a:t>
+            </a:r>
+            <a:endParaRPr lang="en-CA" dirty="0"/>
+          </a:p>
+        </p:txBody>
+      </p:sp>
+      <p:sp>
+        <p:nvSpPr>
+          <p:cNvPr id="3" name="Subtitle 2">
+            <a:extLst>
+              <a:ext uri="{FF2B5EF4-FFF2-40B4-BE49-F238E27FC236}">
+                <a16:creationId xmlns:a16="http://schemas.microsoft.com/office/drawing/2014/main" id="{9C2F9B04-0226-CD29-9920-7389B1D21AE4}"/>
+              </a:ext>
+            </a:extLst>
+          </p:cNvPr>
+          <p:cNvSpPr>
+            <a:spLocks noGrp="1"/>
+          </p:cNvSpPr>
+          <p:nvPr>
+            <p:ph type="subTitle" idx="1"/>
+          </p:nvPr>
+        </p:nvSpPr>
+        <p:spPr/>
+        <p:txBody>
+          <a:bodyPr/>
+          <a:lstStyle/>
+          <a:p>
+            <a:r>
+              <a:rPr lang="en-US" dirty="0"/>
+              <a:t>Any questions?</a:t>
+            </a:r>
+            <a:endParaRPr lang="en-CA" dirty="0"/>
+          </a:p>
+        </p:txBody>
+      </p:sp>
+    </p:spTree>
+    <p:extLst>
+      <p:ext uri="{BB962C8B-B14F-4D97-AF65-F5344CB8AC3E}">
+        <p14:creationId xmlns:p14="http://schemas.microsoft.com/office/powerpoint/2010/main" val="3349532290"/>
+      </p:ext>
+    </p:extLst>
+  </p:cSld>
+  <p:clrMapOvr>
+    <a:masterClrMapping/>
+  </p:clrMapOvr>
+</p:sld>
+</file>
+
 <file path=ppt/slides/slide2.xml><?xml version="1.0" encoding="utf-8"?>
 <p:sld xmlns:a="http://schemas.openxmlformats.org/drawingml/2006/main" xmlns:r="http://schemas.openxmlformats.org/officeDocument/2006/relationships" xmlns:p="http://schemas.openxmlformats.org/presentationml/2006/main">
   <p:cSld>
@@ -4462,7 +4551,25 @@
           <a:p>
             <a:r>
               <a:rPr lang="en-US" dirty="0"/>
-              <a:t>Placeholder</a:t>
+              <a:t>Engineering student</a:t>
+            </a:r>
+          </a:p>
+          <a:p>
+            <a:r>
+              <a:rPr lang="en-US" dirty="0"/>
+              <a:t>Background in Toolmaking</a:t>
+            </a:r>
+          </a:p>
+          <a:p>
+            <a:r>
+              <a:rPr lang="en-US" dirty="0"/>
+              <a:t>Worked in a variety of machine shops and assembly plants</a:t>
+            </a:r>
+          </a:p>
+          <a:p>
+            <a:r>
+              <a:rPr lang="en-US" dirty="0"/>
+              <a:t>Very new to this field</a:t>
             </a:r>
           </a:p>
         </p:txBody>
@@ -4795,7 +4902,7 @@
             </a:pPr>
             <a:r>
               <a:rPr lang="en-US" dirty="0"/>
-              <a:t>	We would like to predict the range of house prices will be in the future and if possible, try to narrow down if there is a better year in a decade and a month in a year to purchase a home. </a:t>
+              <a:t>	We would like to predict the range of house prices (HPI: House Price Index) will be in the future and if possible, try to narrow down if there is a better year in a decade and a month in a year to purchase a home. </a:t>
             </a:r>
           </a:p>
           <a:p>
@@ -4919,8 +5026,8 @@
         </p:blipFill>
         <p:spPr>
           <a:xfrm>
-            <a:off x="3588707" y="1214438"/>
-            <a:ext cx="8603293" cy="5464967"/>
+            <a:off x="3412067" y="1066800"/>
+            <a:ext cx="8779933" cy="5612605"/>
           </a:xfrm>
         </p:spPr>
       </p:pic>

</xml_diff>